<commit_message>
A proposal for scenarios and semantic challenges added.
</commit_message>
<xml_diff>
--- a/plugfest/2018-prague/semantic integration/Semantic-Integration-Prague-PlugFest-Preparation.pptx
+++ b/plugfest/2018-prague/semantic integration/Semantic-Integration-Prague-PlugFest-Preparation.pptx
@@ -11,6 +11,8 @@
     <p:sldId id="257" r:id="rId5"/>
     <p:sldId id="258" r:id="rId6"/>
     <p:sldId id="260" r:id="rId7"/>
+    <p:sldId id="262" r:id="rId8"/>
+    <p:sldId id="263" r:id="rId9"/>
   </p:sldIdLst>
   <p:sldSz cx="9144000" cy="6858000" type="screen4x3"/>
   <p:notesSz cx="6858000" cy="9144000"/>
@@ -294,7 +296,7 @@
             <a:fld id="{1EFAB2E7-15A8-48F2-861E-A5AFD18AE688}" type="datetimeFigureOut">
               <a:rPr lang="de-DE" smtClean="0"/>
               <a:pPr/>
-              <a:t>05.02.2018</a:t>
+              <a:t>09.02.2018</a:t>
             </a:fld>
             <a:endParaRPr lang="de-DE"/>
           </a:p>
@@ -461,7 +463,7 @@
             <a:fld id="{1EFAB2E7-15A8-48F2-861E-A5AFD18AE688}" type="datetimeFigureOut">
               <a:rPr lang="de-DE" smtClean="0"/>
               <a:pPr/>
-              <a:t>05.02.2018</a:t>
+              <a:t>09.02.2018</a:t>
             </a:fld>
             <a:endParaRPr lang="de-DE"/>
           </a:p>
@@ -638,7 +640,7 @@
             <a:fld id="{1EFAB2E7-15A8-48F2-861E-A5AFD18AE688}" type="datetimeFigureOut">
               <a:rPr lang="de-DE" smtClean="0"/>
               <a:pPr/>
-              <a:t>05.02.2018</a:t>
+              <a:t>09.02.2018</a:t>
             </a:fld>
             <a:endParaRPr lang="de-DE"/>
           </a:p>
@@ -805,7 +807,7 @@
             <a:fld id="{1EFAB2E7-15A8-48F2-861E-A5AFD18AE688}" type="datetimeFigureOut">
               <a:rPr lang="de-DE" smtClean="0"/>
               <a:pPr/>
-              <a:t>05.02.2018</a:t>
+              <a:t>09.02.2018</a:t>
             </a:fld>
             <a:endParaRPr lang="de-DE"/>
           </a:p>
@@ -1048,7 +1050,7 @@
             <a:fld id="{1EFAB2E7-15A8-48F2-861E-A5AFD18AE688}" type="datetimeFigureOut">
               <a:rPr lang="de-DE" smtClean="0"/>
               <a:pPr/>
-              <a:t>05.02.2018</a:t>
+              <a:t>09.02.2018</a:t>
             </a:fld>
             <a:endParaRPr lang="de-DE"/>
           </a:p>
@@ -1333,7 +1335,7 @@
             <a:fld id="{1EFAB2E7-15A8-48F2-861E-A5AFD18AE688}" type="datetimeFigureOut">
               <a:rPr lang="de-DE" smtClean="0"/>
               <a:pPr/>
-              <a:t>05.02.2018</a:t>
+              <a:t>09.02.2018</a:t>
             </a:fld>
             <a:endParaRPr lang="de-DE"/>
           </a:p>
@@ -1752,7 +1754,7 @@
             <a:fld id="{1EFAB2E7-15A8-48F2-861E-A5AFD18AE688}" type="datetimeFigureOut">
               <a:rPr lang="de-DE" smtClean="0"/>
               <a:pPr/>
-              <a:t>05.02.2018</a:t>
+              <a:t>09.02.2018</a:t>
             </a:fld>
             <a:endParaRPr lang="de-DE"/>
           </a:p>
@@ -1867,7 +1869,7 @@
             <a:fld id="{1EFAB2E7-15A8-48F2-861E-A5AFD18AE688}" type="datetimeFigureOut">
               <a:rPr lang="de-DE" smtClean="0"/>
               <a:pPr/>
-              <a:t>05.02.2018</a:t>
+              <a:t>09.02.2018</a:t>
             </a:fld>
             <a:endParaRPr lang="de-DE"/>
           </a:p>
@@ -1959,7 +1961,7 @@
             <a:fld id="{1EFAB2E7-15A8-48F2-861E-A5AFD18AE688}" type="datetimeFigureOut">
               <a:rPr lang="de-DE" smtClean="0"/>
               <a:pPr/>
-              <a:t>05.02.2018</a:t>
+              <a:t>09.02.2018</a:t>
             </a:fld>
             <a:endParaRPr lang="de-DE"/>
           </a:p>
@@ -2233,7 +2235,7 @@
             <a:fld id="{1EFAB2E7-15A8-48F2-861E-A5AFD18AE688}" type="datetimeFigureOut">
               <a:rPr lang="de-DE" smtClean="0"/>
               <a:pPr/>
-              <a:t>05.02.2018</a:t>
+              <a:t>09.02.2018</a:t>
             </a:fld>
             <a:endParaRPr lang="de-DE"/>
           </a:p>
@@ -2483,7 +2485,7 @@
             <a:fld id="{1EFAB2E7-15A8-48F2-861E-A5AFD18AE688}" type="datetimeFigureOut">
               <a:rPr lang="de-DE" smtClean="0"/>
               <a:pPr/>
-              <a:t>05.02.2018</a:t>
+              <a:t>09.02.2018</a:t>
             </a:fld>
             <a:endParaRPr lang="de-DE"/>
           </a:p>
@@ -2693,7 +2695,7 @@
             <a:fld id="{1EFAB2E7-15A8-48F2-861E-A5AFD18AE688}" type="datetimeFigureOut">
               <a:rPr lang="de-DE" smtClean="0"/>
               <a:pPr/>
-              <a:t>05.02.2018</a:t>
+              <a:t>09.02.2018</a:t>
             </a:fld>
             <a:endParaRPr lang="de-DE"/>
           </a:p>
@@ -3085,15 +3087,7 @@
             </a:r>
             <a:r>
               <a:rPr lang="en-US" smtClean="0"/>
-              <a:t>WoT </a:t>
-            </a:r>
-            <a:r>
-              <a:rPr lang="en-US" smtClean="0"/>
-              <a:t>- </a:t>
-            </a:r>
-            <a:r>
-              <a:rPr lang="en-US" smtClean="0"/>
-              <a:t>Prague </a:t>
+              <a:t>WoT - Prague </a:t>
             </a:r>
             <a:r>
               <a:rPr lang="en-US" dirty="0" err="1" smtClean="0"/>
@@ -3629,10 +3623,10 @@
           <a:lstStyle/>
           <a:p>
             <a:r>
-              <a:rPr lang="en-US" smtClean="0"/>
+              <a:rPr lang="en-US" dirty="0" smtClean="0"/>
               <a:t>Next Steps</a:t>
             </a:r>
-            <a:endParaRPr lang="en-US"/>
+            <a:endParaRPr lang="en-US" dirty="0"/>
           </a:p>
         </p:txBody>
       </p:sp>
@@ -3653,12 +3647,20 @@
           </a:bodyPr>
           <a:lstStyle/>
           <a:p>
+            <a:pPr marL="514350" indent="-514350">
+              <a:buFont typeface="+mj-lt"/>
+              <a:buAutoNum type="arabicPeriod"/>
+            </a:pPr>
             <a:r>
               <a:rPr lang="en-US" dirty="0" smtClean="0"/>
               <a:t>Define a set of scenarios that can be implemented with available things (TDs)</a:t>
             </a:r>
           </a:p>
           <a:p>
+            <a:pPr marL="514350" indent="-514350">
+              <a:buFont typeface="+mj-lt"/>
+              <a:buAutoNum type="arabicPeriod"/>
+            </a:pPr>
             <a:r>
               <a:rPr lang="en-US" dirty="0" smtClean="0"/>
               <a:t>Extend scenarios into WoT challenges, which in order to be implemented require </a:t>
@@ -3673,6 +3675,10 @@
             </a:r>
           </a:p>
           <a:p>
+            <a:pPr marL="514350" indent="-514350">
+              <a:buFont typeface="+mj-lt"/>
+              <a:buAutoNum type="arabicPeriod"/>
+            </a:pPr>
             <a:r>
               <a:rPr lang="en-US" dirty="0" smtClean="0"/>
               <a:t>Provide semantic artifacts required for these scenarios, i.e., semantic queries, iot.schema.org Capabilities, Recipes etc.</a:t>
@@ -3682,6 +3688,426 @@
             <a:pPr>
               <a:buNone/>
             </a:pPr>
+            <a:endParaRPr lang="de-DE" dirty="0"/>
+          </a:p>
+        </p:txBody>
+      </p:sp>
+    </p:spTree>
+  </p:cSld>
+  <p:clrMapOvr>
+    <a:masterClrMapping/>
+  </p:clrMapOvr>
+</p:sld>
+</file>
+
+<file path=ppt/slides/slide7.xml><?xml version="1.0" encoding="utf-8"?>
+<p:sld xmlns:a="http://schemas.openxmlformats.org/drawingml/2006/main" xmlns:r="http://schemas.openxmlformats.org/officeDocument/2006/relationships" xmlns:p="http://schemas.openxmlformats.org/presentationml/2006/main">
+  <p:cSld>
+    <p:spTree>
+      <p:nvGrpSpPr>
+        <p:cNvPr id="1" name=""/>
+        <p:cNvGrpSpPr/>
+        <p:nvPr/>
+      </p:nvGrpSpPr>
+      <p:grpSpPr>
+        <a:xfrm>
+          <a:off x="0" y="0"/>
+          <a:ext cx="0" cy="0"/>
+          <a:chOff x="0" y="0"/>
+          <a:chExt cx="0" cy="0"/>
+        </a:xfrm>
+      </p:grpSpPr>
+      <p:sp>
+        <p:nvSpPr>
+          <p:cNvPr id="2" name="Titel 1"/>
+          <p:cNvSpPr>
+            <a:spLocks noGrp="1"/>
+          </p:cNvSpPr>
+          <p:nvPr>
+            <p:ph type="title"/>
+          </p:nvPr>
+        </p:nvSpPr>
+        <p:spPr/>
+        <p:txBody>
+          <a:bodyPr>
+            <a:normAutofit fontScale="90000"/>
+          </a:bodyPr>
+          <a:lstStyle/>
+          <a:p>
+            <a:r>
+              <a:rPr lang="de-DE" dirty="0" smtClean="0"/>
+              <a:t>Scenarios </a:t>
+            </a:r>
+            <a:r>
+              <a:rPr lang="en-US" dirty="0" smtClean="0"/>
+              <a:t>that can be implemented with available things </a:t>
+            </a:r>
+            <a:endParaRPr lang="de-DE" dirty="0"/>
+          </a:p>
+        </p:txBody>
+      </p:sp>
+      <p:sp>
+        <p:nvSpPr>
+          <p:cNvPr id="3" name="Inhaltsplatzhalter 2"/>
+          <p:cNvSpPr>
+            <a:spLocks noGrp="1"/>
+          </p:cNvSpPr>
+          <p:nvPr>
+            <p:ph idx="1"/>
+          </p:nvPr>
+        </p:nvSpPr>
+        <p:spPr/>
+        <p:txBody>
+          <a:bodyPr>
+            <a:normAutofit/>
+          </a:bodyPr>
+          <a:lstStyle/>
+          <a:p>
+            <a:pPr>
+              <a:buNone/>
+            </a:pPr>
+            <a:r>
+              <a:rPr lang="en-US" sz="1600" dirty="0" smtClean="0"/>
+              <a:t>1. An </a:t>
+            </a:r>
+            <a:r>
+              <a:rPr lang="en-US" sz="1600" dirty="0" smtClean="0"/>
+              <a:t>application which detects the motion in a room and controls the AC operation in  a </a:t>
+            </a:r>
+            <a:r>
+              <a:rPr lang="en-US" sz="1600" dirty="0" smtClean="0"/>
+              <a:t>room. </a:t>
+            </a:r>
+          </a:p>
+          <a:p>
+            <a:pPr>
+              <a:buNone/>
+            </a:pPr>
+            <a:r>
+              <a:rPr lang="en-US" sz="1600" dirty="0" smtClean="0"/>
+              <a:t>	Devices</a:t>
+            </a:r>
+            <a:r>
+              <a:rPr lang="en-US" sz="1600" dirty="0" smtClean="0"/>
+              <a:t>: air conditioner (Fujitsu and Panasonic), human detection sensor (Panasonic and </a:t>
+            </a:r>
+            <a:r>
+              <a:rPr lang="en-US" sz="1600" dirty="0" err="1" smtClean="0"/>
+              <a:t>SmartThings</a:t>
+            </a:r>
+            <a:r>
+              <a:rPr lang="en-US" sz="1600" dirty="0" smtClean="0"/>
+              <a:t>)</a:t>
+            </a:r>
+          </a:p>
+          <a:p>
+            <a:pPr>
+              <a:buNone/>
+            </a:pPr>
+            <a:endParaRPr lang="en-US" sz="1600" dirty="0" smtClean="0"/>
+          </a:p>
+          <a:p>
+            <a:pPr>
+              <a:buNone/>
+            </a:pPr>
+            <a:r>
+              <a:rPr lang="en-US" sz="1600" dirty="0" smtClean="0"/>
+              <a:t>2. An application which controls the AC in  a room based on the room temperature.</a:t>
+            </a:r>
+          </a:p>
+          <a:p>
+            <a:pPr>
+              <a:buNone/>
+            </a:pPr>
+            <a:r>
+              <a:rPr lang="en-US" sz="1600" dirty="0" smtClean="0"/>
+              <a:t>	Devices</a:t>
+            </a:r>
+            <a:r>
+              <a:rPr lang="en-US" sz="1600" dirty="0" smtClean="0"/>
+              <a:t>: air conditioner (Fujitsu and Panasonic), temperature sensor (</a:t>
+            </a:r>
+            <a:r>
+              <a:rPr lang="en-US" sz="1600" dirty="0" err="1" smtClean="0"/>
+              <a:t>Lemonbeat</a:t>
+            </a:r>
+            <a:r>
+              <a:rPr lang="en-US" sz="1600" dirty="0" smtClean="0"/>
+              <a:t>, Intel, </a:t>
+            </a:r>
+            <a:r>
+              <a:rPr lang="en-US" sz="1600" dirty="0" err="1" smtClean="0"/>
+              <a:t>SmartThings</a:t>
+            </a:r>
+            <a:r>
+              <a:rPr lang="en-US" sz="1600" dirty="0" smtClean="0"/>
+              <a:t>)</a:t>
+            </a:r>
+          </a:p>
+          <a:p>
+            <a:pPr>
+              <a:buNone/>
+            </a:pPr>
+            <a:endParaRPr lang="en-US" sz="1600" dirty="0" smtClean="0"/>
+          </a:p>
+          <a:p>
+            <a:pPr>
+              <a:buNone/>
+            </a:pPr>
+            <a:r>
+              <a:rPr lang="en-US" sz="1600" dirty="0" smtClean="0"/>
+              <a:t>3. An application which controls a lamp in  a room based on the brightness in the room.</a:t>
+            </a:r>
+          </a:p>
+          <a:p>
+            <a:pPr>
+              <a:buNone/>
+            </a:pPr>
+            <a:r>
+              <a:rPr lang="en-US" sz="1600" dirty="0" smtClean="0"/>
+              <a:t>	Devices</a:t>
+            </a:r>
+            <a:r>
+              <a:rPr lang="en-US" sz="1600" dirty="0" smtClean="0"/>
+              <a:t>: light (Fujitsu, Intel, </a:t>
+            </a:r>
+            <a:r>
+              <a:rPr lang="en-US" sz="1600" dirty="0" err="1" smtClean="0"/>
+              <a:t>SmartThings</a:t>
+            </a:r>
+            <a:r>
+              <a:rPr lang="en-US" sz="1600" dirty="0" smtClean="0"/>
+              <a:t>), Luminous sensor (</a:t>
+            </a:r>
+            <a:r>
+              <a:rPr lang="en-US" sz="1600" dirty="0" err="1" smtClean="0"/>
+              <a:t>Lemonbeat</a:t>
+            </a:r>
+            <a:r>
+              <a:rPr lang="en-US" sz="1600" dirty="0" smtClean="0"/>
+              <a:t>, </a:t>
+            </a:r>
+            <a:r>
+              <a:rPr lang="en-US" sz="1600" dirty="0" err="1" smtClean="0"/>
+              <a:t>SmartThings</a:t>
+            </a:r>
+            <a:r>
+              <a:rPr lang="en-US" sz="1600" dirty="0" smtClean="0"/>
+              <a:t>)</a:t>
+            </a:r>
+          </a:p>
+          <a:p>
+            <a:pPr>
+              <a:buNone/>
+            </a:pPr>
+            <a:endParaRPr lang="en-US" sz="1600" dirty="0" smtClean="0"/>
+          </a:p>
+          <a:p>
+            <a:pPr>
+              <a:buNone/>
+            </a:pPr>
+            <a:r>
+              <a:rPr lang="en-US" sz="1600" dirty="0" smtClean="0"/>
+              <a:t>4. An application which controls a lamp in  a room based on the motion detection in the room.</a:t>
+            </a:r>
+          </a:p>
+          <a:p>
+            <a:pPr>
+              <a:buNone/>
+            </a:pPr>
+            <a:r>
+              <a:rPr lang="en-US" sz="1600" dirty="0" smtClean="0"/>
+              <a:t>	Devices</a:t>
+            </a:r>
+            <a:r>
+              <a:rPr lang="en-US" sz="1600" dirty="0" smtClean="0"/>
+              <a:t>: light (Fujitsu, Intel, </a:t>
+            </a:r>
+            <a:r>
+              <a:rPr lang="en-US" sz="1600" dirty="0" err="1" smtClean="0"/>
+              <a:t>SmartThings</a:t>
+            </a:r>
+            <a:r>
+              <a:rPr lang="en-US" sz="1600" dirty="0" smtClean="0"/>
+              <a:t>), human detection sensor (Panasonic and </a:t>
+            </a:r>
+            <a:r>
+              <a:rPr lang="en-US" sz="1600" dirty="0" err="1" smtClean="0"/>
+              <a:t>SmartThings</a:t>
+            </a:r>
+            <a:r>
+              <a:rPr lang="en-US" sz="1600" dirty="0" smtClean="0"/>
+              <a:t>)</a:t>
+            </a:r>
+            <a:endParaRPr lang="de-DE" sz="1600" dirty="0"/>
+          </a:p>
+        </p:txBody>
+      </p:sp>
+    </p:spTree>
+  </p:cSld>
+  <p:clrMapOvr>
+    <a:masterClrMapping/>
+  </p:clrMapOvr>
+</p:sld>
+</file>
+
+<file path=ppt/slides/slide8.xml><?xml version="1.0" encoding="utf-8"?>
+<p:sld xmlns:a="http://schemas.openxmlformats.org/drawingml/2006/main" xmlns:r="http://schemas.openxmlformats.org/officeDocument/2006/relationships" xmlns:p="http://schemas.openxmlformats.org/presentationml/2006/main">
+  <p:cSld>
+    <p:spTree>
+      <p:nvGrpSpPr>
+        <p:cNvPr id="1" name=""/>
+        <p:cNvGrpSpPr/>
+        <p:nvPr/>
+      </p:nvGrpSpPr>
+      <p:grpSpPr>
+        <a:xfrm>
+          <a:off x="0" y="0"/>
+          <a:ext cx="0" cy="0"/>
+          <a:chOff x="0" y="0"/>
+          <a:chExt cx="0" cy="0"/>
+        </a:xfrm>
+      </p:grpSpPr>
+      <p:sp>
+        <p:nvSpPr>
+          <p:cNvPr id="2" name="Titel 1"/>
+          <p:cNvSpPr>
+            <a:spLocks noGrp="1"/>
+          </p:cNvSpPr>
+          <p:nvPr>
+            <p:ph type="title"/>
+          </p:nvPr>
+        </p:nvSpPr>
+        <p:spPr/>
+        <p:txBody>
+          <a:bodyPr/>
+          <a:lstStyle/>
+          <a:p>
+            <a:r>
+              <a:rPr lang="en-US" dirty="0" smtClean="0"/>
+              <a:t>Semantic challenges</a:t>
+            </a:r>
+            <a:endParaRPr lang="en-US" dirty="0"/>
+          </a:p>
+        </p:txBody>
+      </p:sp>
+      <p:sp>
+        <p:nvSpPr>
+          <p:cNvPr id="3" name="Inhaltsplatzhalter 2"/>
+          <p:cNvSpPr>
+            <a:spLocks noGrp="1"/>
+          </p:cNvSpPr>
+          <p:nvPr>
+            <p:ph idx="1"/>
+          </p:nvPr>
+        </p:nvSpPr>
+        <p:spPr/>
+        <p:txBody>
+          <a:bodyPr>
+            <a:normAutofit fontScale="62500" lnSpcReduction="20000"/>
+          </a:bodyPr>
+          <a:lstStyle/>
+          <a:p>
+            <a:pPr>
+              <a:buNone/>
+            </a:pPr>
+            <a:r>
+              <a:rPr lang="en-US" dirty="0" smtClean="0"/>
+              <a:t>1. Semantic discovery</a:t>
+            </a:r>
+          </a:p>
+          <a:p>
+            <a:pPr>
+              <a:buNone/>
+            </a:pPr>
+            <a:r>
+              <a:rPr lang="en-US" dirty="0" smtClean="0"/>
+              <a:t>   - A client discovers things that implement, e.g. the air conditioner </a:t>
+            </a:r>
+            <a:r>
+              <a:rPr lang="en-US" dirty="0" smtClean="0"/>
+              <a:t>Capability</a:t>
+            </a:r>
+            <a:endParaRPr lang="en-US" dirty="0" smtClean="0"/>
+          </a:p>
+          <a:p>
+            <a:pPr>
+              <a:buNone/>
+            </a:pPr>
+            <a:r>
+              <a:rPr lang="en-US" dirty="0" smtClean="0"/>
+              <a:t>2. Dynamic binding to the things</a:t>
+            </a:r>
+          </a:p>
+          <a:p>
+            <a:pPr>
+              <a:buNone/>
+            </a:pPr>
+            <a:r>
+              <a:rPr lang="en-US" dirty="0" smtClean="0"/>
+              <a:t>   - Thing A interacts with thing B (as it supports </a:t>
+            </a:r>
+            <a:r>
+              <a:rPr lang="en-US" dirty="0" smtClean="0"/>
+              <a:t>Capability </a:t>
+            </a:r>
+            <a:r>
+              <a:rPr lang="en-US" dirty="0" smtClean="0"/>
+              <a:t>C). If B does not function, then A dynamically establishes an interaction with another thing, which implements C. </a:t>
+            </a:r>
+          </a:p>
+          <a:p>
+            <a:pPr>
+              <a:buNone/>
+            </a:pPr>
+            <a:r>
+              <a:rPr lang="en-US" dirty="0" smtClean="0"/>
+              <a:t>3. Semantic validation</a:t>
+            </a:r>
+          </a:p>
+          <a:p>
+            <a:pPr>
+              <a:buNone/>
+            </a:pPr>
+            <a:r>
+              <a:rPr lang="en-US" dirty="0" smtClean="0"/>
+              <a:t>   - Check whether a TD implements </a:t>
+            </a:r>
+            <a:r>
+              <a:rPr lang="en-US" dirty="0" smtClean="0"/>
+              <a:t>everything </a:t>
+            </a:r>
+            <a:r>
+              <a:rPr lang="en-US" dirty="0" smtClean="0"/>
+              <a:t>as specified by a Capability it claims to support.</a:t>
+            </a:r>
+          </a:p>
+          <a:p>
+            <a:pPr>
+              <a:buNone/>
+            </a:pPr>
+            <a:r>
+              <a:rPr lang="en-US" dirty="0" smtClean="0"/>
+              <a:t>   - Check whether an interaction at the data level is possible: Integer, 0 &lt;= value &lt;= 255.</a:t>
+            </a:r>
+          </a:p>
+          <a:p>
+            <a:pPr>
+              <a:buNone/>
+            </a:pPr>
+            <a:r>
+              <a:rPr lang="en-US" dirty="0" smtClean="0"/>
+              <a:t>   - If writable is true, then the Interaction Property should have input data. </a:t>
+            </a:r>
+          </a:p>
+          <a:p>
+            <a:pPr>
+              <a:buNone/>
+            </a:pPr>
+            <a:r>
+              <a:rPr lang="en-US" dirty="0" smtClean="0"/>
+              <a:t>   - More examples?</a:t>
+            </a:r>
             <a:endParaRPr lang="de-DE" dirty="0"/>
           </a:p>
         </p:txBody>

</xml_diff>

<commit_message>
Update of Semantic-Integration-Prague-PlugFest-Preparation slides based on minutes from the web meeting 2018-02-09.
</commit_message>
<xml_diff>
--- a/plugfest/2018-prague/semantic integration/Semantic-Integration-Prague-PlugFest-Preparation.pptx
+++ b/plugfest/2018-prague/semantic integration/Semantic-Integration-Prague-PlugFest-Preparation.pptx
@@ -3697,6 +3697,13 @@
   <p:clrMapOvr>
     <a:masterClrMapping/>
   </p:clrMapOvr>
+  <p:timing>
+    <p:tnLst>
+      <p:par>
+        <p:cTn id="1" dur="indefinite" restart="never" nodeType="tmRoot"/>
+      </p:par>
+    </p:tnLst>
+  </p:timing>
 </p:sld>
 </file>
 
@@ -3768,28 +3775,16 @@
             </a:pPr>
             <a:r>
               <a:rPr lang="en-US" sz="1600" dirty="0" smtClean="0"/>
-              <a:t>1. An </a:t>
-            </a:r>
+              <a:t>1. An application which detects the motion in a room and controls the AC operation in  a room. </a:t>
+            </a:r>
+          </a:p>
+          <a:p>
+            <a:pPr>
+              <a:buNone/>
+            </a:pPr>
             <a:r>
               <a:rPr lang="en-US" sz="1600" dirty="0" smtClean="0"/>
-              <a:t>application which detects the motion in a room and controls the AC operation in  a </a:t>
-            </a:r>
-            <a:r>
-              <a:rPr lang="en-US" sz="1600" dirty="0" smtClean="0"/>
-              <a:t>room. </a:t>
-            </a:r>
-          </a:p>
-          <a:p>
-            <a:pPr>
-              <a:buNone/>
-            </a:pPr>
-            <a:r>
-              <a:rPr lang="en-US" sz="1600" dirty="0" smtClean="0"/>
-              <a:t>	Devices</a:t>
-            </a:r>
-            <a:r>
-              <a:rPr lang="en-US" sz="1600" dirty="0" smtClean="0"/>
-              <a:t>: air conditioner (Fujitsu and Panasonic), human detection sensor (Panasonic and </a:t>
+              <a:t>	Devices: air conditioner (Fujitsu and Panasonic), human detection sensor (Panasonic and </a:t>
             </a:r>
             <a:r>
               <a:rPr lang="en-US" sz="1600" dirty="0" err="1" smtClean="0"/>
@@ -3821,11 +3816,7 @@
             </a:pPr>
             <a:r>
               <a:rPr lang="en-US" sz="1600" dirty="0" smtClean="0"/>
-              <a:t>	Devices</a:t>
-            </a:r>
-            <a:r>
-              <a:rPr lang="en-US" sz="1600" dirty="0" smtClean="0"/>
-              <a:t>: air conditioner (Fujitsu and Panasonic), temperature sensor (</a:t>
+              <a:t>	Devices: air conditioner (Fujitsu and Panasonic), temperature sensor (</a:t>
             </a:r>
             <a:r>
               <a:rPr lang="en-US" sz="1600" dirty="0" err="1" smtClean="0"/>
@@ -3865,11 +3856,7 @@
             </a:pPr>
             <a:r>
               <a:rPr lang="en-US" sz="1600" dirty="0" smtClean="0"/>
-              <a:t>	Devices</a:t>
-            </a:r>
-            <a:r>
-              <a:rPr lang="en-US" sz="1600" dirty="0" smtClean="0"/>
-              <a:t>: light (Fujitsu, Intel, </a:t>
+              <a:t>	Devices: light (Fujitsu, Intel, </a:t>
             </a:r>
             <a:r>
               <a:rPr lang="en-US" sz="1600" dirty="0" err="1" smtClean="0"/>
@@ -3917,11 +3904,7 @@
             </a:pPr>
             <a:r>
               <a:rPr lang="en-US" sz="1600" dirty="0" smtClean="0"/>
-              <a:t>	Devices</a:t>
-            </a:r>
-            <a:r>
-              <a:rPr lang="en-US" sz="1600" dirty="0" smtClean="0"/>
-              <a:t>: light (Fujitsu, Intel, </a:t>
+              <a:t>	Devices: light (Fujitsu, Intel, </a:t>
             </a:r>
             <a:r>
               <a:rPr lang="en-US" sz="1600" dirty="0" err="1" smtClean="0"/>
@@ -3948,6 +3931,13 @@
   <p:clrMapOvr>
     <a:masterClrMapping/>
   </p:clrMapOvr>
+  <p:timing>
+    <p:tnLst>
+      <p:par>
+        <p:cTn id="1" dur="indefinite" restart="never" nodeType="tmRoot"/>
+      </p:par>
+    </p:tnLst>
+  </p:timing>
 </p:sld>
 </file>
 
@@ -4004,7 +3994,7 @@
         <p:spPr/>
         <p:txBody>
           <a:bodyPr>
-            <a:normAutofit fontScale="62500" lnSpcReduction="20000"/>
+            <a:normAutofit fontScale="55000" lnSpcReduction="20000"/>
           </a:bodyPr>
           <a:lstStyle/>
           <a:p>
@@ -4022,11 +4012,65 @@
             </a:pPr>
             <a:r>
               <a:rPr lang="en-US" dirty="0" smtClean="0"/>
-              <a:t>   - A client discovers things that implement, e.g. the air conditioner </a:t>
-            </a:r>
-            <a:r>
-              <a:rPr lang="en-US" dirty="0" smtClean="0"/>
-              <a:t>Capability</a:t>
+              <a:t>   - A client discovers things that implement, e.g. the air conditioner Capability</a:t>
+            </a:r>
+          </a:p>
+          <a:p>
+            <a:pPr>
+              <a:buNone/>
+            </a:pPr>
+            <a:r>
+              <a:rPr lang="en-US" dirty="0" smtClean="0"/>
+              <a:t>2. Dynamic binding to the things</a:t>
+            </a:r>
+          </a:p>
+          <a:p>
+            <a:pPr>
+              <a:buNone/>
+            </a:pPr>
+            <a:r>
+              <a:rPr lang="en-US" dirty="0" smtClean="0"/>
+              <a:t>   - Thing A interacts with thing B (as it supports Capability C). If B does not function, then A dynamically establishes an interaction with another thing, which implements C. </a:t>
+            </a:r>
+          </a:p>
+          <a:p>
+            <a:pPr>
+              <a:buNone/>
+            </a:pPr>
+            <a:r>
+              <a:rPr lang="en-US" dirty="0" smtClean="0"/>
+              <a:t>  -  Interoperability at the interaction level, e.g., a replacement thing with Int. Property</a:t>
+            </a:r>
+          </a:p>
+          <a:p>
+            <a:pPr>
+              <a:buNone/>
+            </a:pPr>
+            <a:r>
+              <a:rPr lang="en-US" dirty="0" smtClean="0"/>
+              <a:t>3. Semantic validation</a:t>
+            </a:r>
+          </a:p>
+          <a:p>
+            <a:pPr>
+              <a:buNone/>
+            </a:pPr>
+            <a:r>
+              <a:rPr lang="en-US" dirty="0" smtClean="0"/>
+              <a:t>   - Check whether a TD implements everything as specified by a Capability it claims to support.</a:t>
+            </a:r>
+          </a:p>
+          <a:p>
+            <a:pPr>
+              <a:buNone/>
+            </a:pPr>
+            <a:r>
+              <a:rPr lang="en-US" dirty="0" smtClean="0"/>
+              <a:t>   - Check whether an interaction at the data level is possible: Integer, 0 &lt;= value &lt;= </a:t>
+            </a:r>
+            <a:r>
+              <a:rPr lang="en-US" dirty="0" smtClean="0"/>
+              <a:t>255, or check the units</a:t>
             </a:r>
             <a:endParaRPr lang="en-US" dirty="0" smtClean="0"/>
           </a:p>
@@ -4036,7 +4080,7 @@
             </a:pPr>
             <a:r>
               <a:rPr lang="en-US" dirty="0" smtClean="0"/>
-              <a:t>2. Dynamic binding to the things</a:t>
+              <a:t>   - If writable is true, then the Interaction Property should have input data. </a:t>
             </a:r>
           </a:p>
           <a:p>
@@ -4045,15 +4089,7 @@
             </a:pPr>
             <a:r>
               <a:rPr lang="en-US" dirty="0" smtClean="0"/>
-              <a:t>   - Thing A interacts with thing B (as it supports </a:t>
-            </a:r>
-            <a:r>
-              <a:rPr lang="en-US" dirty="0" smtClean="0"/>
-              <a:t>Capability </a:t>
-            </a:r>
-            <a:r>
-              <a:rPr lang="en-US" dirty="0" smtClean="0"/>
-              <a:t>C). If B does not function, then A dynamically establishes an interaction with another thing, which implements C. </a:t>
+              <a:t>   - More examples?</a:t>
             </a:r>
           </a:p>
           <a:p>
@@ -4061,52 +4097,34 @@
               <a:buNone/>
             </a:pPr>
             <a:r>
-              <a:rPr lang="en-US" dirty="0" smtClean="0"/>
-              <a:t>3. Semantic validation</a:t>
-            </a:r>
-          </a:p>
-          <a:p>
-            <a:pPr>
-              <a:buNone/>
+              <a:rPr lang="en-US" smtClean="0"/>
+              <a:t> 4. Introduce </a:t>
+            </a:r>
+            <a:r>
+              <a:rPr lang="en-US" dirty="0" smtClean="0"/>
+              <a:t>the Feature of Interest (</a:t>
+            </a:r>
+            <a:r>
+              <a:rPr lang="en-US" dirty="0" err="1" smtClean="0"/>
+              <a:t>FoI</a:t>
+            </a:r>
+            <a:r>
+              <a:rPr lang="en-US" dirty="0" smtClean="0"/>
+              <a:t>) as a pattern in iot.schema.org</a:t>
+            </a:r>
+          </a:p>
+          <a:p>
+            <a:pPr lvl="1">
+              <a:buFontTx/>
+              <a:buChar char="-"/>
             </a:pPr>
             <a:r>
               <a:rPr lang="en-US" dirty="0" smtClean="0"/>
-              <a:t>   - Check whether a TD implements </a:t>
-            </a:r>
-            <a:r>
-              <a:rPr lang="en-US" dirty="0" smtClean="0"/>
-              <a:t>everything </a:t>
-            </a:r>
-            <a:r>
-              <a:rPr lang="en-US" dirty="0" smtClean="0"/>
-              <a:t>as specified by a Capability it claims to support.</a:t>
-            </a:r>
-          </a:p>
-          <a:p>
-            <a:pPr>
-              <a:buNone/>
-            </a:pPr>
-            <a:r>
-              <a:rPr lang="en-US" dirty="0" smtClean="0"/>
-              <a:t>   - Check whether an interaction at the data level is possible: Integer, 0 &lt;= value &lt;= 255.</a:t>
-            </a:r>
-          </a:p>
-          <a:p>
-            <a:pPr>
-              <a:buNone/>
-            </a:pPr>
-            <a:r>
-              <a:rPr lang="en-US" dirty="0" smtClean="0"/>
-              <a:t>   - If writable is true, then the Interaction Property should have input data. </a:t>
-            </a:r>
-          </a:p>
-          <a:p>
-            <a:pPr>
-              <a:buNone/>
-            </a:pPr>
-            <a:r>
-              <a:rPr lang="en-US" dirty="0" smtClean="0"/>
-              <a:t>   - More examples?</a:t>
+              <a:t>Replacement possible only for things with the same </a:t>
+            </a:r>
+            <a:r>
+              <a:rPr lang="en-US" dirty="0" err="1" smtClean="0"/>
+              <a:t>FoI</a:t>
             </a:r>
             <a:endParaRPr lang="de-DE" dirty="0"/>
           </a:p>
@@ -4117,6 +4135,13 @@
   <p:clrMapOvr>
     <a:masterClrMapping/>
   </p:clrMapOvr>
+  <p:timing>
+    <p:tnLst>
+      <p:par>
+        <p:cTn id="1" dur="indefinite" restart="never" nodeType="tmRoot"/>
+      </p:par>
+    </p:tnLst>
+  </p:timing>
 </p:sld>
 </file>
 

</xml_diff>

<commit_message>
Update slide Semantic-Integration slide
Add two semantic discovery examples using SPARQL and GraphQL
</commit_message>
<xml_diff>
--- a/plugfest/2018-prague/semantic integration/Semantic-Integration-Prague-PlugFest-Preparation.pptx
+++ b/plugfest/2018-prague/semantic integration/Semantic-Integration-Prague-PlugFest-Preparation.pptx
@@ -4,6 +4,9 @@
   <p:sldMasterIdLst>
     <p:sldMasterId id="2147483648" r:id="rId1"/>
   </p:sldMasterIdLst>
+  <p:notesMasterIdLst>
+    <p:notesMasterId r:id="rId13"/>
+  </p:notesMasterIdLst>
   <p:sldIdLst>
     <p:sldId id="256" r:id="rId2"/>
     <p:sldId id="261" r:id="rId3"/>
@@ -13,6 +16,9 @@
     <p:sldId id="260" r:id="rId7"/>
     <p:sldId id="262" r:id="rId8"/>
     <p:sldId id="263" r:id="rId9"/>
+    <p:sldId id="266" r:id="rId10"/>
+    <p:sldId id="265" r:id="rId11"/>
+    <p:sldId id="264" r:id="rId12"/>
   </p:sldIdLst>
   <p:sldSz cx="9144000" cy="6858000" type="screen4x3"/>
   <p:notesSz cx="6858000" cy="9144000"/>
@@ -111,7 +117,540 @@
       </a:defRPr>
     </a:lvl9pPr>
   </p:defaultTextStyle>
+  <p:extLst>
+    <p:ext uri="{EFAFB233-063F-42B5-8137-9DF3F51BA10A}">
+      <p15:sldGuideLst xmlns:p15="http://schemas.microsoft.com/office/powerpoint/2012/main">
+        <p15:guide id="1" orient="horz" pos="2160">
+          <p15:clr>
+            <a:srgbClr val="A4A3A4"/>
+          </p15:clr>
+        </p15:guide>
+        <p15:guide id="2" pos="2880">
+          <p15:clr>
+            <a:srgbClr val="A4A3A4"/>
+          </p15:clr>
+        </p15:guide>
+      </p15:sldGuideLst>
+    </p:ext>
+  </p:extLst>
 </p:presentation>
+</file>
+
+<file path=ppt/notesMasters/notesMaster1.xml><?xml version="1.0" encoding="utf-8"?>
+<p:notesMaster xmlns:a="http://schemas.openxmlformats.org/drawingml/2006/main" xmlns:r="http://schemas.openxmlformats.org/officeDocument/2006/relationships" xmlns:p="http://schemas.openxmlformats.org/presentationml/2006/main">
+  <p:cSld>
+    <p:bg>
+      <p:bgRef idx="1001">
+        <a:schemeClr val="bg1"/>
+      </p:bgRef>
+    </p:bg>
+    <p:spTree>
+      <p:nvGrpSpPr>
+        <p:cNvPr id="1" name=""/>
+        <p:cNvGrpSpPr/>
+        <p:nvPr/>
+      </p:nvGrpSpPr>
+      <p:grpSpPr>
+        <a:xfrm>
+          <a:off x="0" y="0"/>
+          <a:ext cx="0" cy="0"/>
+          <a:chOff x="0" y="0"/>
+          <a:chExt cx="0" cy="0"/>
+        </a:xfrm>
+      </p:grpSpPr>
+      <p:sp>
+        <p:nvSpPr>
+          <p:cNvPr id="2" name="Header Placeholder 1"/>
+          <p:cNvSpPr>
+            <a:spLocks noGrp="1"/>
+          </p:cNvSpPr>
+          <p:nvPr>
+            <p:ph type="hdr" sz="quarter"/>
+          </p:nvPr>
+        </p:nvSpPr>
+        <p:spPr>
+          <a:xfrm>
+            <a:off x="0" y="0"/>
+            <a:ext cx="2971800" cy="458788"/>
+          </a:xfrm>
+          <a:prstGeom prst="rect">
+            <a:avLst/>
+          </a:prstGeom>
+        </p:spPr>
+        <p:txBody>
+          <a:bodyPr vert="horz" lIns="91440" tIns="45720" rIns="91440" bIns="45720" rtlCol="0"/>
+          <a:lstStyle>
+            <a:lvl1pPr algn="l">
+              <a:defRPr sz="1200"/>
+            </a:lvl1pPr>
+          </a:lstStyle>
+          <a:p>
+            <a:endParaRPr lang="en-US"/>
+          </a:p>
+        </p:txBody>
+      </p:sp>
+      <p:sp>
+        <p:nvSpPr>
+          <p:cNvPr id="3" name="Date Placeholder 2"/>
+          <p:cNvSpPr>
+            <a:spLocks noGrp="1"/>
+          </p:cNvSpPr>
+          <p:nvPr>
+            <p:ph type="dt" idx="1"/>
+          </p:nvPr>
+        </p:nvSpPr>
+        <p:spPr>
+          <a:xfrm>
+            <a:off x="3884613" y="0"/>
+            <a:ext cx="2971800" cy="458788"/>
+          </a:xfrm>
+          <a:prstGeom prst="rect">
+            <a:avLst/>
+          </a:prstGeom>
+        </p:spPr>
+        <p:txBody>
+          <a:bodyPr vert="horz" lIns="91440" tIns="45720" rIns="91440" bIns="45720" rtlCol="0"/>
+          <a:lstStyle>
+            <a:lvl1pPr algn="r">
+              <a:defRPr sz="1200"/>
+            </a:lvl1pPr>
+          </a:lstStyle>
+          <a:p>
+            <a:fld id="{64A761EF-E662-884E-865C-1D40417B0DAC}" type="datetimeFigureOut">
+              <a:rPr lang="en-US" smtClean="0"/>
+              <a:t>3/7/18</a:t>
+            </a:fld>
+            <a:endParaRPr lang="en-US"/>
+          </a:p>
+        </p:txBody>
+      </p:sp>
+      <p:sp>
+        <p:nvSpPr>
+          <p:cNvPr id="4" name="Slide Image Placeholder 3"/>
+          <p:cNvSpPr>
+            <a:spLocks noGrp="1" noRot="1" noChangeAspect="1"/>
+          </p:cNvSpPr>
+          <p:nvPr>
+            <p:ph type="sldImg" idx="2"/>
+          </p:nvPr>
+        </p:nvSpPr>
+        <p:spPr>
+          <a:xfrm>
+            <a:off x="1371600" y="1143000"/>
+            <a:ext cx="4114800" cy="3086100"/>
+          </a:xfrm>
+          <a:prstGeom prst="rect">
+            <a:avLst/>
+          </a:prstGeom>
+          <a:noFill/>
+          <a:ln w="12700">
+            <a:solidFill>
+              <a:prstClr val="black"/>
+            </a:solidFill>
+          </a:ln>
+        </p:spPr>
+        <p:txBody>
+          <a:bodyPr vert="horz" lIns="91440" tIns="45720" rIns="91440" bIns="45720" rtlCol="0" anchor="ctr"/>
+          <a:lstStyle/>
+          <a:p>
+            <a:endParaRPr lang="en-US"/>
+          </a:p>
+        </p:txBody>
+      </p:sp>
+      <p:sp>
+        <p:nvSpPr>
+          <p:cNvPr id="5" name="Notes Placeholder 4"/>
+          <p:cNvSpPr>
+            <a:spLocks noGrp="1"/>
+          </p:cNvSpPr>
+          <p:nvPr>
+            <p:ph type="body" sz="quarter" idx="3"/>
+          </p:nvPr>
+        </p:nvSpPr>
+        <p:spPr>
+          <a:xfrm>
+            <a:off x="685800" y="4400550"/>
+            <a:ext cx="5486400" cy="3600450"/>
+          </a:xfrm>
+          <a:prstGeom prst="rect">
+            <a:avLst/>
+          </a:prstGeom>
+        </p:spPr>
+        <p:txBody>
+          <a:bodyPr vert="horz" lIns="91440" tIns="45720" rIns="91440" bIns="45720" rtlCol="0"/>
+          <a:lstStyle/>
+          <a:p>
+            <a:pPr lvl="0"/>
+            <a:r>
+              <a:rPr lang="en-US"/>
+              <a:t>Edit Master text styles</a:t>
+            </a:r>
+          </a:p>
+          <a:p>
+            <a:pPr lvl="1"/>
+            <a:r>
+              <a:rPr lang="en-US"/>
+              <a:t>Second level</a:t>
+            </a:r>
+          </a:p>
+          <a:p>
+            <a:pPr lvl="2"/>
+            <a:r>
+              <a:rPr lang="en-US"/>
+              <a:t>Third level</a:t>
+            </a:r>
+          </a:p>
+          <a:p>
+            <a:pPr lvl="3"/>
+            <a:r>
+              <a:rPr lang="en-US"/>
+              <a:t>Fourth level</a:t>
+            </a:r>
+          </a:p>
+          <a:p>
+            <a:pPr lvl="4"/>
+            <a:r>
+              <a:rPr lang="en-US"/>
+              <a:t>Fifth level</a:t>
+            </a:r>
+          </a:p>
+        </p:txBody>
+      </p:sp>
+      <p:sp>
+        <p:nvSpPr>
+          <p:cNvPr id="6" name="Footer Placeholder 5"/>
+          <p:cNvSpPr>
+            <a:spLocks noGrp="1"/>
+          </p:cNvSpPr>
+          <p:nvPr>
+            <p:ph type="ftr" sz="quarter" idx="4"/>
+          </p:nvPr>
+        </p:nvSpPr>
+        <p:spPr>
+          <a:xfrm>
+            <a:off x="0" y="8685213"/>
+            <a:ext cx="2971800" cy="458787"/>
+          </a:xfrm>
+          <a:prstGeom prst="rect">
+            <a:avLst/>
+          </a:prstGeom>
+        </p:spPr>
+        <p:txBody>
+          <a:bodyPr vert="horz" lIns="91440" tIns="45720" rIns="91440" bIns="45720" rtlCol="0" anchor="b"/>
+          <a:lstStyle>
+            <a:lvl1pPr algn="l">
+              <a:defRPr sz="1200"/>
+            </a:lvl1pPr>
+          </a:lstStyle>
+          <a:p>
+            <a:endParaRPr lang="en-US"/>
+          </a:p>
+        </p:txBody>
+      </p:sp>
+      <p:sp>
+        <p:nvSpPr>
+          <p:cNvPr id="7" name="Slide Number Placeholder 6"/>
+          <p:cNvSpPr>
+            <a:spLocks noGrp="1"/>
+          </p:cNvSpPr>
+          <p:nvPr>
+            <p:ph type="sldNum" sz="quarter" idx="5"/>
+          </p:nvPr>
+        </p:nvSpPr>
+        <p:spPr>
+          <a:xfrm>
+            <a:off x="3884613" y="8685213"/>
+            <a:ext cx="2971800" cy="458787"/>
+          </a:xfrm>
+          <a:prstGeom prst="rect">
+            <a:avLst/>
+          </a:prstGeom>
+        </p:spPr>
+        <p:txBody>
+          <a:bodyPr vert="horz" lIns="91440" tIns="45720" rIns="91440" bIns="45720" rtlCol="0" anchor="b"/>
+          <a:lstStyle>
+            <a:lvl1pPr algn="r">
+              <a:defRPr sz="1200"/>
+            </a:lvl1pPr>
+          </a:lstStyle>
+          <a:p>
+            <a:fld id="{7E36A064-6958-9144-B759-EC2DFA53721A}" type="slidenum">
+              <a:rPr lang="en-US" smtClean="0"/>
+              <a:t>‹#›</a:t>
+            </a:fld>
+            <a:endParaRPr lang="en-US"/>
+          </a:p>
+        </p:txBody>
+      </p:sp>
+    </p:spTree>
+    <p:extLst>
+      <p:ext uri="{BB962C8B-B14F-4D97-AF65-F5344CB8AC3E}">
+        <p14:creationId xmlns:p14="http://schemas.microsoft.com/office/powerpoint/2010/main" val="2061509498"/>
+      </p:ext>
+    </p:extLst>
+  </p:cSld>
+  <p:clrMap bg1="lt1" tx1="dk1" bg2="lt2" tx2="dk2" accent1="accent1" accent2="accent2" accent3="accent3" accent4="accent4" accent5="accent5" accent6="accent6" hlink="hlink" folHlink="folHlink"/>
+  <p:notesStyle>
+    <a:lvl1pPr marL="0" algn="l" defTabSz="914400" rtl="0" eaLnBrk="1" latinLnBrk="0" hangingPunct="1">
+      <a:defRPr sz="1200" kern="1200">
+        <a:solidFill>
+          <a:schemeClr val="tx1"/>
+        </a:solidFill>
+        <a:latin typeface="+mn-lt"/>
+        <a:ea typeface="+mn-ea"/>
+        <a:cs typeface="+mn-cs"/>
+      </a:defRPr>
+    </a:lvl1pPr>
+    <a:lvl2pPr marL="457200" algn="l" defTabSz="914400" rtl="0" eaLnBrk="1" latinLnBrk="0" hangingPunct="1">
+      <a:defRPr sz="1200" kern="1200">
+        <a:solidFill>
+          <a:schemeClr val="tx1"/>
+        </a:solidFill>
+        <a:latin typeface="+mn-lt"/>
+        <a:ea typeface="+mn-ea"/>
+        <a:cs typeface="+mn-cs"/>
+      </a:defRPr>
+    </a:lvl2pPr>
+    <a:lvl3pPr marL="914400" algn="l" defTabSz="914400" rtl="0" eaLnBrk="1" latinLnBrk="0" hangingPunct="1">
+      <a:defRPr sz="1200" kern="1200">
+        <a:solidFill>
+          <a:schemeClr val="tx1"/>
+        </a:solidFill>
+        <a:latin typeface="+mn-lt"/>
+        <a:ea typeface="+mn-ea"/>
+        <a:cs typeface="+mn-cs"/>
+      </a:defRPr>
+    </a:lvl3pPr>
+    <a:lvl4pPr marL="1371600" algn="l" defTabSz="914400" rtl="0" eaLnBrk="1" latinLnBrk="0" hangingPunct="1">
+      <a:defRPr sz="1200" kern="1200">
+        <a:solidFill>
+          <a:schemeClr val="tx1"/>
+        </a:solidFill>
+        <a:latin typeface="+mn-lt"/>
+        <a:ea typeface="+mn-ea"/>
+        <a:cs typeface="+mn-cs"/>
+      </a:defRPr>
+    </a:lvl4pPr>
+    <a:lvl5pPr marL="1828800" algn="l" defTabSz="914400" rtl="0" eaLnBrk="1" latinLnBrk="0" hangingPunct="1">
+      <a:defRPr sz="1200" kern="1200">
+        <a:solidFill>
+          <a:schemeClr val="tx1"/>
+        </a:solidFill>
+        <a:latin typeface="+mn-lt"/>
+        <a:ea typeface="+mn-ea"/>
+        <a:cs typeface="+mn-cs"/>
+      </a:defRPr>
+    </a:lvl5pPr>
+    <a:lvl6pPr marL="2286000" algn="l" defTabSz="914400" rtl="0" eaLnBrk="1" latinLnBrk="0" hangingPunct="1">
+      <a:defRPr sz="1200" kern="1200">
+        <a:solidFill>
+          <a:schemeClr val="tx1"/>
+        </a:solidFill>
+        <a:latin typeface="+mn-lt"/>
+        <a:ea typeface="+mn-ea"/>
+        <a:cs typeface="+mn-cs"/>
+      </a:defRPr>
+    </a:lvl6pPr>
+    <a:lvl7pPr marL="2743200" algn="l" defTabSz="914400" rtl="0" eaLnBrk="1" latinLnBrk="0" hangingPunct="1">
+      <a:defRPr sz="1200" kern="1200">
+        <a:solidFill>
+          <a:schemeClr val="tx1"/>
+        </a:solidFill>
+        <a:latin typeface="+mn-lt"/>
+        <a:ea typeface="+mn-ea"/>
+        <a:cs typeface="+mn-cs"/>
+      </a:defRPr>
+    </a:lvl7pPr>
+    <a:lvl8pPr marL="3200400" algn="l" defTabSz="914400" rtl="0" eaLnBrk="1" latinLnBrk="0" hangingPunct="1">
+      <a:defRPr sz="1200" kern="1200">
+        <a:solidFill>
+          <a:schemeClr val="tx1"/>
+        </a:solidFill>
+        <a:latin typeface="+mn-lt"/>
+        <a:ea typeface="+mn-ea"/>
+        <a:cs typeface="+mn-cs"/>
+      </a:defRPr>
+    </a:lvl8pPr>
+    <a:lvl9pPr marL="3657600" algn="l" defTabSz="914400" rtl="0" eaLnBrk="1" latinLnBrk="0" hangingPunct="1">
+      <a:defRPr sz="1200" kern="1200">
+        <a:solidFill>
+          <a:schemeClr val="tx1"/>
+        </a:solidFill>
+        <a:latin typeface="+mn-lt"/>
+        <a:ea typeface="+mn-ea"/>
+        <a:cs typeface="+mn-cs"/>
+      </a:defRPr>
+    </a:lvl9pPr>
+  </p:notesStyle>
+</p:notesMaster>
+</file>
+
+<file path=ppt/notesSlides/notesSlide1.xml><?xml version="1.0" encoding="utf-8"?>
+<p:notes xmlns:a="http://schemas.openxmlformats.org/drawingml/2006/main" xmlns:r="http://schemas.openxmlformats.org/officeDocument/2006/relationships" xmlns:p="http://schemas.openxmlformats.org/presentationml/2006/main">
+  <p:cSld>
+    <p:spTree>
+      <p:nvGrpSpPr>
+        <p:cNvPr id="1" name=""/>
+        <p:cNvGrpSpPr/>
+        <p:nvPr/>
+      </p:nvGrpSpPr>
+      <p:grpSpPr>
+        <a:xfrm>
+          <a:off x="0" y="0"/>
+          <a:ext cx="0" cy="0"/>
+          <a:chOff x="0" y="0"/>
+          <a:chExt cx="0" cy="0"/>
+        </a:xfrm>
+      </p:grpSpPr>
+      <p:sp>
+        <p:nvSpPr>
+          <p:cNvPr id="2" name="Slide Image Placeholder 1"/>
+          <p:cNvSpPr>
+            <a:spLocks noGrp="1" noRot="1" noChangeAspect="1"/>
+          </p:cNvSpPr>
+          <p:nvPr>
+            <p:ph type="sldImg"/>
+          </p:nvPr>
+        </p:nvSpPr>
+        <p:spPr/>
+      </p:sp>
+      <p:sp>
+        <p:nvSpPr>
+          <p:cNvPr id="3" name="Notes Placeholder 2"/>
+          <p:cNvSpPr>
+            <a:spLocks noGrp="1"/>
+          </p:cNvSpPr>
+          <p:nvPr>
+            <p:ph type="body" idx="1"/>
+          </p:nvPr>
+        </p:nvSpPr>
+        <p:spPr/>
+        <p:txBody>
+          <a:bodyPr/>
+          <a:lstStyle/>
+          <a:p>
+            <a:endParaRPr lang="en-US" dirty="0"/>
+          </a:p>
+        </p:txBody>
+      </p:sp>
+      <p:sp>
+        <p:nvSpPr>
+          <p:cNvPr id="4" name="Slide Number Placeholder 3"/>
+          <p:cNvSpPr>
+            <a:spLocks noGrp="1"/>
+          </p:cNvSpPr>
+          <p:nvPr>
+            <p:ph type="sldNum" sz="quarter" idx="10"/>
+          </p:nvPr>
+        </p:nvSpPr>
+        <p:spPr/>
+        <p:txBody>
+          <a:bodyPr/>
+          <a:lstStyle/>
+          <a:p>
+            <a:fld id="{7E36A064-6958-9144-B759-EC2DFA53721A}" type="slidenum">
+              <a:rPr lang="en-US" smtClean="0"/>
+              <a:t>10</a:t>
+            </a:fld>
+            <a:endParaRPr lang="en-US"/>
+          </a:p>
+        </p:txBody>
+      </p:sp>
+    </p:spTree>
+    <p:extLst>
+      <p:ext uri="{BB962C8B-B14F-4D97-AF65-F5344CB8AC3E}">
+        <p14:creationId xmlns:p14="http://schemas.microsoft.com/office/powerpoint/2010/main" val="1635101812"/>
+      </p:ext>
+    </p:extLst>
+  </p:cSld>
+  <p:clrMapOvr>
+    <a:masterClrMapping/>
+  </p:clrMapOvr>
+</p:notes>
+</file>
+
+<file path=ppt/notesSlides/notesSlide2.xml><?xml version="1.0" encoding="utf-8"?>
+<p:notes xmlns:a="http://schemas.openxmlformats.org/drawingml/2006/main" xmlns:r="http://schemas.openxmlformats.org/officeDocument/2006/relationships" xmlns:p="http://schemas.openxmlformats.org/presentationml/2006/main">
+  <p:cSld>
+    <p:spTree>
+      <p:nvGrpSpPr>
+        <p:cNvPr id="1" name=""/>
+        <p:cNvGrpSpPr/>
+        <p:nvPr/>
+      </p:nvGrpSpPr>
+      <p:grpSpPr>
+        <a:xfrm>
+          <a:off x="0" y="0"/>
+          <a:ext cx="0" cy="0"/>
+          <a:chOff x="0" y="0"/>
+          <a:chExt cx="0" cy="0"/>
+        </a:xfrm>
+      </p:grpSpPr>
+      <p:sp>
+        <p:nvSpPr>
+          <p:cNvPr id="2" name="Slide Image Placeholder 1"/>
+          <p:cNvSpPr>
+            <a:spLocks noGrp="1" noRot="1" noChangeAspect="1"/>
+          </p:cNvSpPr>
+          <p:nvPr>
+            <p:ph type="sldImg"/>
+          </p:nvPr>
+        </p:nvSpPr>
+        <p:spPr/>
+      </p:sp>
+      <p:sp>
+        <p:nvSpPr>
+          <p:cNvPr id="3" name="Notes Placeholder 2"/>
+          <p:cNvSpPr>
+            <a:spLocks noGrp="1"/>
+          </p:cNvSpPr>
+          <p:nvPr>
+            <p:ph type="body" idx="1"/>
+          </p:nvPr>
+        </p:nvSpPr>
+        <p:spPr/>
+        <p:txBody>
+          <a:bodyPr/>
+          <a:lstStyle/>
+          <a:p>
+            <a:endParaRPr lang="en-US" dirty="0"/>
+          </a:p>
+        </p:txBody>
+      </p:sp>
+      <p:sp>
+        <p:nvSpPr>
+          <p:cNvPr id="4" name="Slide Number Placeholder 3"/>
+          <p:cNvSpPr>
+            <a:spLocks noGrp="1"/>
+          </p:cNvSpPr>
+          <p:nvPr>
+            <p:ph type="sldNum" sz="quarter" idx="10"/>
+          </p:nvPr>
+        </p:nvSpPr>
+        <p:spPr/>
+        <p:txBody>
+          <a:bodyPr/>
+          <a:lstStyle/>
+          <a:p>
+            <a:fld id="{7E36A064-6958-9144-B759-EC2DFA53721A}" type="slidenum">
+              <a:rPr lang="en-US" smtClean="0"/>
+              <a:t>11</a:t>
+            </a:fld>
+            <a:endParaRPr lang="en-US"/>
+          </a:p>
+        </p:txBody>
+      </p:sp>
+    </p:spTree>
+    <p:extLst>
+      <p:ext uri="{BB962C8B-B14F-4D97-AF65-F5344CB8AC3E}">
+        <p14:creationId xmlns:p14="http://schemas.microsoft.com/office/powerpoint/2010/main" val="3180862955"/>
+      </p:ext>
+    </p:extLst>
+  </p:cSld>
+  <p:clrMapOvr>
+    <a:masterClrMapping/>
+  </p:clrMapOvr>
+</p:notes>
 </file>
 
 <file path=ppt/slideLayouts/slideLayout1.xml><?xml version="1.0" encoding="utf-8"?>
@@ -152,10 +691,9 @@
           <a:lstStyle/>
           <a:p>
             <a:r>
-              <a:rPr lang="de-DE" smtClean="0"/>
+              <a:rPr lang="de-DE"/>
               <a:t>Titelmasterformat durch Klicken bearbeiten</a:t>
             </a:r>
-            <a:endParaRPr lang="de-DE"/>
           </a:p>
         </p:txBody>
       </p:sp>
@@ -271,10 +809,9 @@
           </a:lstStyle>
           <a:p>
             <a:r>
-              <a:rPr lang="de-DE" smtClean="0"/>
+              <a:rPr lang="de-DE"/>
               <a:t>Formatvorlage des Untertitelmasters durch Klicken bearbeiten</a:t>
             </a:r>
-            <a:endParaRPr lang="de-DE"/>
           </a:p>
         </p:txBody>
       </p:sp>
@@ -296,7 +833,7 @@
             <a:fld id="{1EFAB2E7-15A8-48F2-861E-A5AFD18AE688}" type="datetimeFigureOut">
               <a:rPr lang="de-DE" smtClean="0"/>
               <a:pPr/>
-              <a:t>09.02.2018</a:t>
+              <a:t>06.03.18</a:t>
             </a:fld>
             <a:endParaRPr lang="de-DE"/>
           </a:p>
@@ -339,7 +876,7 @@
             <a:fld id="{2B6CA301-5879-49B1-A708-5ED718A0C0A4}" type="slidenum">
               <a:rPr lang="de-DE" smtClean="0"/>
               <a:pPr/>
-              <a:t>‹Nr.›</a:t>
+              <a:t>‹#›</a:t>
             </a:fld>
             <a:endParaRPr lang="de-DE"/>
           </a:p>
@@ -386,10 +923,9 @@
           <a:lstStyle/>
           <a:p>
             <a:r>
-              <a:rPr lang="de-DE" smtClean="0"/>
+              <a:rPr lang="de-DE"/>
               <a:t>Titelmasterformat durch Klicken bearbeiten</a:t>
             </a:r>
-            <a:endParaRPr lang="de-DE"/>
           </a:p>
         </p:txBody>
       </p:sp>
@@ -410,38 +946,37 @@
           <a:p>
             <a:pPr lvl="0"/>
             <a:r>
-              <a:rPr lang="de-DE" smtClean="0"/>
+              <a:rPr lang="de-DE"/>
               <a:t>Textmasterformate durch Klicken bearbeiten</a:t>
             </a:r>
           </a:p>
           <a:p>
             <a:pPr lvl="1"/>
             <a:r>
-              <a:rPr lang="de-DE" smtClean="0"/>
+              <a:rPr lang="de-DE"/>
               <a:t>Zweite Ebene</a:t>
             </a:r>
           </a:p>
           <a:p>
             <a:pPr lvl="2"/>
             <a:r>
-              <a:rPr lang="de-DE" smtClean="0"/>
+              <a:rPr lang="de-DE"/>
               <a:t>Dritte Ebene</a:t>
             </a:r>
           </a:p>
           <a:p>
             <a:pPr lvl="3"/>
             <a:r>
-              <a:rPr lang="de-DE" smtClean="0"/>
+              <a:rPr lang="de-DE"/>
               <a:t>Vierte Ebene</a:t>
             </a:r>
           </a:p>
           <a:p>
             <a:pPr lvl="4"/>
             <a:r>
-              <a:rPr lang="de-DE" smtClean="0"/>
+              <a:rPr lang="de-DE"/>
               <a:t>Fünfte Ebene</a:t>
             </a:r>
-            <a:endParaRPr lang="de-DE"/>
           </a:p>
         </p:txBody>
       </p:sp>
@@ -463,7 +998,7 @@
             <a:fld id="{1EFAB2E7-15A8-48F2-861E-A5AFD18AE688}" type="datetimeFigureOut">
               <a:rPr lang="de-DE" smtClean="0"/>
               <a:pPr/>
-              <a:t>09.02.2018</a:t>
+              <a:t>06.03.18</a:t>
             </a:fld>
             <a:endParaRPr lang="de-DE"/>
           </a:p>
@@ -506,7 +1041,7 @@
             <a:fld id="{2B6CA301-5879-49B1-A708-5ED718A0C0A4}" type="slidenum">
               <a:rPr lang="de-DE" smtClean="0"/>
               <a:pPr/>
-              <a:t>‹Nr.›</a:t>
+              <a:t>‹#›</a:t>
             </a:fld>
             <a:endParaRPr lang="de-DE"/>
           </a:p>
@@ -558,10 +1093,9 @@
           <a:lstStyle/>
           <a:p>
             <a:r>
-              <a:rPr lang="de-DE" smtClean="0"/>
+              <a:rPr lang="de-DE"/>
               <a:t>Titelmasterformat durch Klicken bearbeiten</a:t>
             </a:r>
-            <a:endParaRPr lang="de-DE"/>
           </a:p>
         </p:txBody>
       </p:sp>
@@ -587,38 +1121,37 @@
           <a:p>
             <a:pPr lvl="0"/>
             <a:r>
-              <a:rPr lang="de-DE" smtClean="0"/>
+              <a:rPr lang="de-DE"/>
               <a:t>Textmasterformate durch Klicken bearbeiten</a:t>
             </a:r>
           </a:p>
           <a:p>
             <a:pPr lvl="1"/>
             <a:r>
-              <a:rPr lang="de-DE" smtClean="0"/>
+              <a:rPr lang="de-DE"/>
               <a:t>Zweite Ebene</a:t>
             </a:r>
           </a:p>
           <a:p>
             <a:pPr lvl="2"/>
             <a:r>
-              <a:rPr lang="de-DE" smtClean="0"/>
+              <a:rPr lang="de-DE"/>
               <a:t>Dritte Ebene</a:t>
             </a:r>
           </a:p>
           <a:p>
             <a:pPr lvl="3"/>
             <a:r>
-              <a:rPr lang="de-DE" smtClean="0"/>
+              <a:rPr lang="de-DE"/>
               <a:t>Vierte Ebene</a:t>
             </a:r>
           </a:p>
           <a:p>
             <a:pPr lvl="4"/>
             <a:r>
-              <a:rPr lang="de-DE" smtClean="0"/>
+              <a:rPr lang="de-DE"/>
               <a:t>Fünfte Ebene</a:t>
             </a:r>
-            <a:endParaRPr lang="de-DE"/>
           </a:p>
         </p:txBody>
       </p:sp>
@@ -640,7 +1173,7 @@
             <a:fld id="{1EFAB2E7-15A8-48F2-861E-A5AFD18AE688}" type="datetimeFigureOut">
               <a:rPr lang="de-DE" smtClean="0"/>
               <a:pPr/>
-              <a:t>09.02.2018</a:t>
+              <a:t>06.03.18</a:t>
             </a:fld>
             <a:endParaRPr lang="de-DE"/>
           </a:p>
@@ -683,7 +1216,7 @@
             <a:fld id="{2B6CA301-5879-49B1-A708-5ED718A0C0A4}" type="slidenum">
               <a:rPr lang="de-DE" smtClean="0"/>
               <a:pPr/>
-              <a:t>‹Nr.›</a:t>
+              <a:t>‹#›</a:t>
             </a:fld>
             <a:endParaRPr lang="de-DE"/>
           </a:p>
@@ -730,10 +1263,9 @@
           <a:lstStyle/>
           <a:p>
             <a:r>
-              <a:rPr lang="de-DE" smtClean="0"/>
+              <a:rPr lang="de-DE"/>
               <a:t>Titelmasterformat durch Klicken bearbeiten</a:t>
             </a:r>
-            <a:endParaRPr lang="de-DE"/>
           </a:p>
         </p:txBody>
       </p:sp>
@@ -754,38 +1286,37 @@
           <a:p>
             <a:pPr lvl="0"/>
             <a:r>
-              <a:rPr lang="de-DE" smtClean="0"/>
+              <a:rPr lang="de-DE"/>
               <a:t>Textmasterformate durch Klicken bearbeiten</a:t>
             </a:r>
           </a:p>
           <a:p>
             <a:pPr lvl="1"/>
             <a:r>
-              <a:rPr lang="de-DE" smtClean="0"/>
+              <a:rPr lang="de-DE"/>
               <a:t>Zweite Ebene</a:t>
             </a:r>
           </a:p>
           <a:p>
             <a:pPr lvl="2"/>
             <a:r>
-              <a:rPr lang="de-DE" smtClean="0"/>
+              <a:rPr lang="de-DE"/>
               <a:t>Dritte Ebene</a:t>
             </a:r>
           </a:p>
           <a:p>
             <a:pPr lvl="3"/>
             <a:r>
-              <a:rPr lang="de-DE" smtClean="0"/>
+              <a:rPr lang="de-DE"/>
               <a:t>Vierte Ebene</a:t>
             </a:r>
           </a:p>
           <a:p>
             <a:pPr lvl="4"/>
             <a:r>
-              <a:rPr lang="de-DE" smtClean="0"/>
+              <a:rPr lang="de-DE"/>
               <a:t>Fünfte Ebene</a:t>
             </a:r>
-            <a:endParaRPr lang="de-DE"/>
           </a:p>
         </p:txBody>
       </p:sp>
@@ -807,7 +1338,7 @@
             <a:fld id="{1EFAB2E7-15A8-48F2-861E-A5AFD18AE688}" type="datetimeFigureOut">
               <a:rPr lang="de-DE" smtClean="0"/>
               <a:pPr/>
-              <a:t>09.02.2018</a:t>
+              <a:t>06.03.18</a:t>
             </a:fld>
             <a:endParaRPr lang="de-DE"/>
           </a:p>
@@ -850,7 +1381,7 @@
             <a:fld id="{2B6CA301-5879-49B1-A708-5ED718A0C0A4}" type="slidenum">
               <a:rPr lang="de-DE" smtClean="0"/>
               <a:pPr/>
-              <a:t>‹Nr.›</a:t>
+              <a:t>‹#›</a:t>
             </a:fld>
             <a:endParaRPr lang="de-DE"/>
           </a:p>
@@ -906,10 +1437,9 @@
           </a:lstStyle>
           <a:p>
             <a:r>
-              <a:rPr lang="de-DE" smtClean="0"/>
+              <a:rPr lang="de-DE"/>
               <a:t>Titelmasterformat durch Klicken bearbeiten</a:t>
             </a:r>
-            <a:endParaRPr lang="de-DE"/>
           </a:p>
         </p:txBody>
       </p:sp>
@@ -1026,7 +1556,7 @@
           <a:p>
             <a:pPr lvl="0"/>
             <a:r>
-              <a:rPr lang="de-DE" smtClean="0"/>
+              <a:rPr lang="de-DE"/>
               <a:t>Textmasterformate durch Klicken bearbeiten</a:t>
             </a:r>
           </a:p>
@@ -1050,7 +1580,7 @@
             <a:fld id="{1EFAB2E7-15A8-48F2-861E-A5AFD18AE688}" type="datetimeFigureOut">
               <a:rPr lang="de-DE" smtClean="0"/>
               <a:pPr/>
-              <a:t>09.02.2018</a:t>
+              <a:t>06.03.18</a:t>
             </a:fld>
             <a:endParaRPr lang="de-DE"/>
           </a:p>
@@ -1093,7 +1623,7 @@
             <a:fld id="{2B6CA301-5879-49B1-A708-5ED718A0C0A4}" type="slidenum">
               <a:rPr lang="de-DE" smtClean="0"/>
               <a:pPr/>
-              <a:t>‹Nr.›</a:t>
+              <a:t>‹#›</a:t>
             </a:fld>
             <a:endParaRPr lang="de-DE"/>
           </a:p>
@@ -1140,10 +1670,9 @@
           <a:lstStyle/>
           <a:p>
             <a:r>
-              <a:rPr lang="de-DE" smtClean="0"/>
+              <a:rPr lang="de-DE"/>
               <a:t>Titelmasterformat durch Klicken bearbeiten</a:t>
             </a:r>
-            <a:endParaRPr lang="de-DE"/>
           </a:p>
         </p:txBody>
       </p:sp>
@@ -1197,38 +1726,37 @@
           <a:p>
             <a:pPr lvl="0"/>
             <a:r>
-              <a:rPr lang="de-DE" smtClean="0"/>
+              <a:rPr lang="de-DE"/>
               <a:t>Textmasterformate durch Klicken bearbeiten</a:t>
             </a:r>
           </a:p>
           <a:p>
             <a:pPr lvl="1"/>
             <a:r>
-              <a:rPr lang="de-DE" smtClean="0"/>
+              <a:rPr lang="de-DE"/>
               <a:t>Zweite Ebene</a:t>
             </a:r>
           </a:p>
           <a:p>
             <a:pPr lvl="2"/>
             <a:r>
-              <a:rPr lang="de-DE" smtClean="0"/>
+              <a:rPr lang="de-DE"/>
               <a:t>Dritte Ebene</a:t>
             </a:r>
           </a:p>
           <a:p>
             <a:pPr lvl="3"/>
             <a:r>
-              <a:rPr lang="de-DE" smtClean="0"/>
+              <a:rPr lang="de-DE"/>
               <a:t>Vierte Ebene</a:t>
             </a:r>
           </a:p>
           <a:p>
             <a:pPr lvl="4"/>
             <a:r>
-              <a:rPr lang="de-DE" smtClean="0"/>
+              <a:rPr lang="de-DE"/>
               <a:t>Fünfte Ebene</a:t>
             </a:r>
-            <a:endParaRPr lang="de-DE"/>
           </a:p>
         </p:txBody>
       </p:sp>
@@ -1282,38 +1810,37 @@
           <a:p>
             <a:pPr lvl="0"/>
             <a:r>
-              <a:rPr lang="de-DE" smtClean="0"/>
+              <a:rPr lang="de-DE"/>
               <a:t>Textmasterformate durch Klicken bearbeiten</a:t>
             </a:r>
           </a:p>
           <a:p>
             <a:pPr lvl="1"/>
             <a:r>
-              <a:rPr lang="de-DE" smtClean="0"/>
+              <a:rPr lang="de-DE"/>
               <a:t>Zweite Ebene</a:t>
             </a:r>
           </a:p>
           <a:p>
             <a:pPr lvl="2"/>
             <a:r>
-              <a:rPr lang="de-DE" smtClean="0"/>
+              <a:rPr lang="de-DE"/>
               <a:t>Dritte Ebene</a:t>
             </a:r>
           </a:p>
           <a:p>
             <a:pPr lvl="3"/>
             <a:r>
-              <a:rPr lang="de-DE" smtClean="0"/>
+              <a:rPr lang="de-DE"/>
               <a:t>Vierte Ebene</a:t>
             </a:r>
           </a:p>
           <a:p>
             <a:pPr lvl="4"/>
             <a:r>
-              <a:rPr lang="de-DE" smtClean="0"/>
+              <a:rPr lang="de-DE"/>
               <a:t>Fünfte Ebene</a:t>
             </a:r>
-            <a:endParaRPr lang="de-DE"/>
           </a:p>
         </p:txBody>
       </p:sp>
@@ -1335,7 +1862,7 @@
             <a:fld id="{1EFAB2E7-15A8-48F2-861E-A5AFD18AE688}" type="datetimeFigureOut">
               <a:rPr lang="de-DE" smtClean="0"/>
               <a:pPr/>
-              <a:t>09.02.2018</a:t>
+              <a:t>06.03.18</a:t>
             </a:fld>
             <a:endParaRPr lang="de-DE"/>
           </a:p>
@@ -1378,7 +1905,7 @@
             <a:fld id="{2B6CA301-5879-49B1-A708-5ED718A0C0A4}" type="slidenum">
               <a:rPr lang="de-DE" smtClean="0"/>
               <a:pPr/>
-              <a:t>‹Nr.›</a:t>
+              <a:t>‹#›</a:t>
             </a:fld>
             <a:endParaRPr lang="de-DE"/>
           </a:p>
@@ -1429,10 +1956,9 @@
           </a:lstStyle>
           <a:p>
             <a:r>
-              <a:rPr lang="de-DE" smtClean="0"/>
+              <a:rPr lang="de-DE"/>
               <a:t>Titelmasterformat durch Klicken bearbeiten</a:t>
             </a:r>
-            <a:endParaRPr lang="de-DE"/>
           </a:p>
         </p:txBody>
       </p:sp>
@@ -1495,7 +2021,7 @@
           <a:p>
             <a:pPr lvl="0"/>
             <a:r>
-              <a:rPr lang="de-DE" smtClean="0"/>
+              <a:rPr lang="de-DE"/>
               <a:t>Textmasterformate durch Klicken bearbeiten</a:t>
             </a:r>
           </a:p>
@@ -1551,38 +2077,37 @@
           <a:p>
             <a:pPr lvl="0"/>
             <a:r>
-              <a:rPr lang="de-DE" smtClean="0"/>
+              <a:rPr lang="de-DE"/>
               <a:t>Textmasterformate durch Klicken bearbeiten</a:t>
             </a:r>
           </a:p>
           <a:p>
             <a:pPr lvl="1"/>
             <a:r>
-              <a:rPr lang="de-DE" smtClean="0"/>
+              <a:rPr lang="de-DE"/>
               <a:t>Zweite Ebene</a:t>
             </a:r>
           </a:p>
           <a:p>
             <a:pPr lvl="2"/>
             <a:r>
-              <a:rPr lang="de-DE" smtClean="0"/>
+              <a:rPr lang="de-DE"/>
               <a:t>Dritte Ebene</a:t>
             </a:r>
           </a:p>
           <a:p>
             <a:pPr lvl="3"/>
             <a:r>
-              <a:rPr lang="de-DE" smtClean="0"/>
+              <a:rPr lang="de-DE"/>
               <a:t>Vierte Ebene</a:t>
             </a:r>
           </a:p>
           <a:p>
             <a:pPr lvl="4"/>
             <a:r>
-              <a:rPr lang="de-DE" smtClean="0"/>
+              <a:rPr lang="de-DE"/>
               <a:t>Fünfte Ebene</a:t>
             </a:r>
-            <a:endParaRPr lang="de-DE"/>
           </a:p>
         </p:txBody>
       </p:sp>
@@ -1645,7 +2170,7 @@
           <a:p>
             <a:pPr lvl="0"/>
             <a:r>
-              <a:rPr lang="de-DE" smtClean="0"/>
+              <a:rPr lang="de-DE"/>
               <a:t>Textmasterformate durch Klicken bearbeiten</a:t>
             </a:r>
           </a:p>
@@ -1701,38 +2226,37 @@
           <a:p>
             <a:pPr lvl="0"/>
             <a:r>
-              <a:rPr lang="de-DE" smtClean="0"/>
+              <a:rPr lang="de-DE"/>
               <a:t>Textmasterformate durch Klicken bearbeiten</a:t>
             </a:r>
           </a:p>
           <a:p>
             <a:pPr lvl="1"/>
             <a:r>
-              <a:rPr lang="de-DE" smtClean="0"/>
+              <a:rPr lang="de-DE"/>
               <a:t>Zweite Ebene</a:t>
             </a:r>
           </a:p>
           <a:p>
             <a:pPr lvl="2"/>
             <a:r>
-              <a:rPr lang="de-DE" smtClean="0"/>
+              <a:rPr lang="de-DE"/>
               <a:t>Dritte Ebene</a:t>
             </a:r>
           </a:p>
           <a:p>
             <a:pPr lvl="3"/>
             <a:r>
-              <a:rPr lang="de-DE" smtClean="0"/>
+              <a:rPr lang="de-DE"/>
               <a:t>Vierte Ebene</a:t>
             </a:r>
           </a:p>
           <a:p>
             <a:pPr lvl="4"/>
             <a:r>
-              <a:rPr lang="de-DE" smtClean="0"/>
+              <a:rPr lang="de-DE"/>
               <a:t>Fünfte Ebene</a:t>
             </a:r>
-            <a:endParaRPr lang="de-DE"/>
           </a:p>
         </p:txBody>
       </p:sp>
@@ -1754,7 +2278,7 @@
             <a:fld id="{1EFAB2E7-15A8-48F2-861E-A5AFD18AE688}" type="datetimeFigureOut">
               <a:rPr lang="de-DE" smtClean="0"/>
               <a:pPr/>
-              <a:t>09.02.2018</a:t>
+              <a:t>06.03.18</a:t>
             </a:fld>
             <a:endParaRPr lang="de-DE"/>
           </a:p>
@@ -1797,7 +2321,7 @@
             <a:fld id="{2B6CA301-5879-49B1-A708-5ED718A0C0A4}" type="slidenum">
               <a:rPr lang="de-DE" smtClean="0"/>
               <a:pPr/>
-              <a:t>‹Nr.›</a:t>
+              <a:t>‹#›</a:t>
             </a:fld>
             <a:endParaRPr lang="de-DE"/>
           </a:p>
@@ -1844,10 +2368,9 @@
           <a:lstStyle/>
           <a:p>
             <a:r>
-              <a:rPr lang="de-DE" smtClean="0"/>
+              <a:rPr lang="de-DE"/>
               <a:t>Titelmasterformat durch Klicken bearbeiten</a:t>
             </a:r>
-            <a:endParaRPr lang="de-DE"/>
           </a:p>
         </p:txBody>
       </p:sp>
@@ -1869,7 +2392,7 @@
             <a:fld id="{1EFAB2E7-15A8-48F2-861E-A5AFD18AE688}" type="datetimeFigureOut">
               <a:rPr lang="de-DE" smtClean="0"/>
               <a:pPr/>
-              <a:t>09.02.2018</a:t>
+              <a:t>06.03.18</a:t>
             </a:fld>
             <a:endParaRPr lang="de-DE"/>
           </a:p>
@@ -1912,7 +2435,7 @@
             <a:fld id="{2B6CA301-5879-49B1-A708-5ED718A0C0A4}" type="slidenum">
               <a:rPr lang="de-DE" smtClean="0"/>
               <a:pPr/>
-              <a:t>‹Nr.›</a:t>
+              <a:t>‹#›</a:t>
             </a:fld>
             <a:endParaRPr lang="de-DE"/>
           </a:p>
@@ -1961,7 +2484,7 @@
             <a:fld id="{1EFAB2E7-15A8-48F2-861E-A5AFD18AE688}" type="datetimeFigureOut">
               <a:rPr lang="de-DE" smtClean="0"/>
               <a:pPr/>
-              <a:t>09.02.2018</a:t>
+              <a:t>06.03.18</a:t>
             </a:fld>
             <a:endParaRPr lang="de-DE"/>
           </a:p>
@@ -2004,7 +2527,7 @@
             <a:fld id="{2B6CA301-5879-49B1-A708-5ED718A0C0A4}" type="slidenum">
               <a:rPr lang="de-DE" smtClean="0"/>
               <a:pPr/>
-              <a:t>‹Nr.›</a:t>
+              <a:t>‹#›</a:t>
             </a:fld>
             <a:endParaRPr lang="de-DE"/>
           </a:p>
@@ -2060,10 +2583,9 @@
           </a:lstStyle>
           <a:p>
             <a:r>
-              <a:rPr lang="de-DE" smtClean="0"/>
+              <a:rPr lang="de-DE"/>
               <a:t>Titelmasterformat durch Klicken bearbeiten</a:t>
             </a:r>
-            <a:endParaRPr lang="de-DE"/>
           </a:p>
         </p:txBody>
       </p:sp>
@@ -2117,38 +2639,37 @@
           <a:p>
             <a:pPr lvl="0"/>
             <a:r>
-              <a:rPr lang="de-DE" smtClean="0"/>
+              <a:rPr lang="de-DE"/>
               <a:t>Textmasterformate durch Klicken bearbeiten</a:t>
             </a:r>
           </a:p>
           <a:p>
             <a:pPr lvl="1"/>
             <a:r>
-              <a:rPr lang="de-DE" smtClean="0"/>
+              <a:rPr lang="de-DE"/>
               <a:t>Zweite Ebene</a:t>
             </a:r>
           </a:p>
           <a:p>
             <a:pPr lvl="2"/>
             <a:r>
-              <a:rPr lang="de-DE" smtClean="0"/>
+              <a:rPr lang="de-DE"/>
               <a:t>Dritte Ebene</a:t>
             </a:r>
           </a:p>
           <a:p>
             <a:pPr lvl="3"/>
             <a:r>
-              <a:rPr lang="de-DE" smtClean="0"/>
+              <a:rPr lang="de-DE"/>
               <a:t>Vierte Ebene</a:t>
             </a:r>
           </a:p>
           <a:p>
             <a:pPr lvl="4"/>
             <a:r>
-              <a:rPr lang="de-DE" smtClean="0"/>
+              <a:rPr lang="de-DE"/>
               <a:t>Fünfte Ebene</a:t>
             </a:r>
-            <a:endParaRPr lang="de-DE"/>
           </a:p>
         </p:txBody>
       </p:sp>
@@ -2211,7 +2732,7 @@
           <a:p>
             <a:pPr lvl="0"/>
             <a:r>
-              <a:rPr lang="de-DE" smtClean="0"/>
+              <a:rPr lang="de-DE"/>
               <a:t>Textmasterformate durch Klicken bearbeiten</a:t>
             </a:r>
           </a:p>
@@ -2235,7 +2756,7 @@
             <a:fld id="{1EFAB2E7-15A8-48F2-861E-A5AFD18AE688}" type="datetimeFigureOut">
               <a:rPr lang="de-DE" smtClean="0"/>
               <a:pPr/>
-              <a:t>09.02.2018</a:t>
+              <a:t>06.03.18</a:t>
             </a:fld>
             <a:endParaRPr lang="de-DE"/>
           </a:p>
@@ -2278,7 +2799,7 @@
             <a:fld id="{2B6CA301-5879-49B1-A708-5ED718A0C0A4}" type="slidenum">
               <a:rPr lang="de-DE" smtClean="0"/>
               <a:pPr/>
-              <a:t>‹Nr.›</a:t>
+              <a:t>‹#›</a:t>
             </a:fld>
             <a:endParaRPr lang="de-DE"/>
           </a:p>
@@ -2334,10 +2855,9 @@
           </a:lstStyle>
           <a:p>
             <a:r>
-              <a:rPr lang="de-DE" smtClean="0"/>
+              <a:rPr lang="de-DE"/>
               <a:t>Titelmasterformat durch Klicken bearbeiten</a:t>
             </a:r>
-            <a:endParaRPr lang="de-DE"/>
           </a:p>
         </p:txBody>
       </p:sp>
@@ -2461,7 +2981,7 @@
           <a:p>
             <a:pPr lvl="0"/>
             <a:r>
-              <a:rPr lang="de-DE" smtClean="0"/>
+              <a:rPr lang="de-DE"/>
               <a:t>Textmasterformate durch Klicken bearbeiten</a:t>
             </a:r>
           </a:p>
@@ -2485,7 +3005,7 @@
             <a:fld id="{1EFAB2E7-15A8-48F2-861E-A5AFD18AE688}" type="datetimeFigureOut">
               <a:rPr lang="de-DE" smtClean="0"/>
               <a:pPr/>
-              <a:t>09.02.2018</a:t>
+              <a:t>06.03.18</a:t>
             </a:fld>
             <a:endParaRPr lang="de-DE"/>
           </a:p>
@@ -2528,7 +3048,7 @@
             <a:fld id="{2B6CA301-5879-49B1-A708-5ED718A0C0A4}" type="slidenum">
               <a:rPr lang="de-DE" smtClean="0"/>
               <a:pPr/>
-              <a:t>‹Nr.›</a:t>
+              <a:t>‹#›</a:t>
             </a:fld>
             <a:endParaRPr lang="de-DE"/>
           </a:p>
@@ -2590,10 +3110,9 @@
           <a:lstStyle/>
           <a:p>
             <a:r>
-              <a:rPr lang="de-DE" smtClean="0"/>
+              <a:rPr lang="de-DE"/>
               <a:t>Titelmasterformat durch Klicken bearbeiten</a:t>
             </a:r>
-            <a:endParaRPr lang="de-DE"/>
           </a:p>
         </p:txBody>
       </p:sp>
@@ -2624,38 +3143,37 @@
           <a:p>
             <a:pPr lvl="0"/>
             <a:r>
-              <a:rPr lang="de-DE" smtClean="0"/>
+              <a:rPr lang="de-DE"/>
               <a:t>Textmasterformate durch Klicken bearbeiten</a:t>
             </a:r>
           </a:p>
           <a:p>
             <a:pPr lvl="1"/>
             <a:r>
-              <a:rPr lang="de-DE" smtClean="0"/>
+              <a:rPr lang="de-DE"/>
               <a:t>Zweite Ebene</a:t>
             </a:r>
           </a:p>
           <a:p>
             <a:pPr lvl="2"/>
             <a:r>
-              <a:rPr lang="de-DE" smtClean="0"/>
+              <a:rPr lang="de-DE"/>
               <a:t>Dritte Ebene</a:t>
             </a:r>
           </a:p>
           <a:p>
             <a:pPr lvl="3"/>
             <a:r>
-              <a:rPr lang="de-DE" smtClean="0"/>
+              <a:rPr lang="de-DE"/>
               <a:t>Vierte Ebene</a:t>
             </a:r>
           </a:p>
           <a:p>
             <a:pPr lvl="4"/>
             <a:r>
-              <a:rPr lang="de-DE" smtClean="0"/>
+              <a:rPr lang="de-DE"/>
               <a:t>Fünfte Ebene</a:t>
             </a:r>
-            <a:endParaRPr lang="de-DE"/>
           </a:p>
         </p:txBody>
       </p:sp>
@@ -2695,7 +3213,7 @@
             <a:fld id="{1EFAB2E7-15A8-48F2-861E-A5AFD18AE688}" type="datetimeFigureOut">
               <a:rPr lang="de-DE" smtClean="0"/>
               <a:pPr/>
-              <a:t>09.02.2018</a:t>
+              <a:t>06.03.18</a:t>
             </a:fld>
             <a:endParaRPr lang="de-DE"/>
           </a:p>
@@ -2774,7 +3292,7 @@
             <a:fld id="{2B6CA301-5879-49B1-A708-5ED718A0C0A4}" type="slidenum">
               <a:rPr lang="de-DE" smtClean="0"/>
               <a:pPr/>
-              <a:t>‹Nr.›</a:t>
+              <a:t>‹#›</a:t>
             </a:fld>
             <a:endParaRPr lang="de-DE"/>
           </a:p>
@@ -3082,15 +3600,15 @@
           <a:lstStyle/>
           <a:p>
             <a:r>
-              <a:rPr lang="en-US" dirty="0" smtClean="0"/>
+              <a:rPr lang="en-US" dirty="0"/>
               <a:t>W3C </a:t>
             </a:r>
             <a:r>
-              <a:rPr lang="en-US" smtClean="0"/>
+              <a:rPr lang="en-US"/>
               <a:t>WoT - Prague </a:t>
             </a:r>
             <a:r>
-              <a:rPr lang="en-US" dirty="0" err="1" smtClean="0"/>
+              <a:rPr lang="en-US" dirty="0" err="1"/>
               <a:t>Plugfest</a:t>
             </a:r>
             <a:endParaRPr lang="en-US" dirty="0"/>
@@ -3113,18 +3631,14 @@
           <a:lstStyle/>
           <a:p>
             <a:r>
-              <a:rPr lang="en-US" dirty="0" smtClean="0"/>
+              <a:rPr lang="en-US" dirty="0"/>
               <a:t>Semantic Integration</a:t>
             </a:r>
           </a:p>
           <a:p>
             <a:r>
               <a:rPr lang="en-US" dirty="0"/>
-              <a:t>i</a:t>
-            </a:r>
-            <a:r>
-              <a:rPr lang="en-US" dirty="0" smtClean="0"/>
-              <a:t>n preparation</a:t>
+              <a:t>in preparation</a:t>
             </a:r>
             <a:endParaRPr lang="de-DE" dirty="0"/>
           </a:p>
@@ -3135,13 +3649,1764 @@
   <p:clrMapOvr>
     <a:masterClrMapping/>
   </p:clrMapOvr>
-  <p:timing>
-    <p:tnLst>
-      <p:par>
-        <p:cTn id="1" dur="indefinite" restart="never" nodeType="tmRoot"/>
-      </p:par>
-    </p:tnLst>
-  </p:timing>
+</p:sld>
+</file>
+
+<file path=ppt/slides/slide10.xml><?xml version="1.0" encoding="utf-8"?>
+<p:sld xmlns:a="http://schemas.openxmlformats.org/drawingml/2006/main" xmlns:r="http://schemas.openxmlformats.org/officeDocument/2006/relationships" xmlns:p="http://schemas.openxmlformats.org/presentationml/2006/main">
+  <p:cSld>
+    <p:spTree>
+      <p:nvGrpSpPr>
+        <p:cNvPr id="1" name=""/>
+        <p:cNvGrpSpPr/>
+        <p:nvPr/>
+      </p:nvGrpSpPr>
+      <p:grpSpPr>
+        <a:xfrm>
+          <a:off x="0" y="0"/>
+          <a:ext cx="0" cy="0"/>
+          <a:chOff x="0" y="0"/>
+          <a:chExt cx="0" cy="0"/>
+        </a:xfrm>
+      </p:grpSpPr>
+      <p:sp>
+        <p:nvSpPr>
+          <p:cNvPr id="2" name="Title 1">
+            <a:extLst>
+              <a:ext uri="{FF2B5EF4-FFF2-40B4-BE49-F238E27FC236}">
+                <a16:creationId xmlns:a16="http://schemas.microsoft.com/office/drawing/2014/main" id="{9045EEE5-DB47-3E47-ADA4-6215DFDB97AB}"/>
+              </a:ext>
+            </a:extLst>
+          </p:cNvPr>
+          <p:cNvSpPr>
+            <a:spLocks noGrp="1"/>
+          </p:cNvSpPr>
+          <p:nvPr>
+            <p:ph type="title"/>
+          </p:nvPr>
+        </p:nvSpPr>
+        <p:spPr/>
+        <p:txBody>
+          <a:bodyPr>
+            <a:normAutofit/>
+          </a:bodyPr>
+          <a:lstStyle/>
+          <a:p>
+            <a:r>
+              <a:rPr lang="en-US" sz="3200" dirty="0"/>
+              <a:t>Semantic Discovery by SPARQL &amp; </a:t>
+            </a:r>
+            <a:r>
+              <a:rPr lang="en-US" sz="3200" dirty="0" err="1"/>
+              <a:t>GraphQL</a:t>
+            </a:r>
+            <a:endParaRPr lang="en-US" sz="3200" dirty="0"/>
+          </a:p>
+        </p:txBody>
+      </p:sp>
+      <p:sp>
+        <p:nvSpPr>
+          <p:cNvPr id="3" name="Content Placeholder 2">
+            <a:extLst>
+              <a:ext uri="{FF2B5EF4-FFF2-40B4-BE49-F238E27FC236}">
+                <a16:creationId xmlns:a16="http://schemas.microsoft.com/office/drawing/2014/main" id="{B0087305-B303-774E-98CC-821F2D2A1B59}"/>
+              </a:ext>
+            </a:extLst>
+          </p:cNvPr>
+          <p:cNvSpPr>
+            <a:spLocks noGrp="1"/>
+          </p:cNvSpPr>
+          <p:nvPr>
+            <p:ph idx="1"/>
+          </p:nvPr>
+        </p:nvSpPr>
+        <p:spPr>
+          <a:xfrm>
+            <a:off x="443963" y="1825481"/>
+            <a:ext cx="3898776" cy="3556992"/>
+          </a:xfrm>
+          <a:ln>
+            <a:solidFill>
+              <a:schemeClr val="accent1"/>
+            </a:solidFill>
+          </a:ln>
+        </p:spPr>
+        <p:txBody>
+          <a:bodyPr>
+            <a:normAutofit fontScale="92500" lnSpcReduction="10000"/>
+          </a:bodyPr>
+          <a:lstStyle/>
+          <a:p>
+            <a:pPr marL="0" indent="0">
+              <a:buNone/>
+            </a:pPr>
+            <a:r>
+              <a:rPr lang="en-GB" sz="1400" dirty="0">
+                <a:latin typeface="Arial" panose="020B0604020202020204" pitchFamily="34" charset="0"/>
+                <a:cs typeface="Arial" panose="020B0604020202020204" pitchFamily="34" charset="0"/>
+              </a:rPr>
+              <a:t>{ </a:t>
+            </a:r>
+          </a:p>
+          <a:p>
+            <a:pPr marL="0" indent="0">
+              <a:buNone/>
+            </a:pPr>
+            <a:r>
+              <a:rPr lang="en-GB" sz="1400" dirty="0" err="1">
+                <a:latin typeface="Arial" panose="020B0604020202020204" pitchFamily="34" charset="0"/>
+                <a:cs typeface="Arial" panose="020B0604020202020204" pitchFamily="34" charset="0"/>
+              </a:rPr>
+              <a:t>Things_with_Interaction</a:t>
+            </a:r>
+            <a:r>
+              <a:rPr lang="en-GB" sz="1400" dirty="0">
+                <a:latin typeface="Arial" panose="020B0604020202020204" pitchFamily="34" charset="0"/>
+                <a:cs typeface="Arial" panose="020B0604020202020204" pitchFamily="34" charset="0"/>
+              </a:rPr>
+              <a:t>(limit: 1, offset: 6) {</a:t>
+            </a:r>
+          </a:p>
+          <a:p>
+            <a:pPr marL="0" indent="0">
+              <a:buNone/>
+            </a:pPr>
+            <a:r>
+              <a:rPr lang="en-GB" sz="1400" dirty="0">
+                <a:latin typeface="Arial" panose="020B0604020202020204" pitchFamily="34" charset="0"/>
+                <a:cs typeface="Arial" panose="020B0604020202020204" pitchFamily="34" charset="0"/>
+              </a:rPr>
+              <a:t>   _id </a:t>
+            </a:r>
+          </a:p>
+          <a:p>
+            <a:pPr marL="0" indent="0">
+              <a:buNone/>
+            </a:pPr>
+            <a:r>
+              <a:rPr lang="en-GB" sz="1400" dirty="0">
+                <a:latin typeface="Arial" panose="020B0604020202020204" pitchFamily="34" charset="0"/>
+                <a:cs typeface="Arial" panose="020B0604020202020204" pitchFamily="34" charset="0"/>
+              </a:rPr>
+              <a:t>  _type</a:t>
+            </a:r>
+          </a:p>
+          <a:p>
+            <a:pPr marL="0" indent="0">
+              <a:buNone/>
+            </a:pPr>
+            <a:r>
+              <a:rPr lang="en-GB" sz="1400" dirty="0">
+                <a:latin typeface="Arial" panose="020B0604020202020204" pitchFamily="34" charset="0"/>
+                <a:cs typeface="Arial" panose="020B0604020202020204" pitchFamily="34" charset="0"/>
+              </a:rPr>
+              <a:t>    base</a:t>
+            </a:r>
+          </a:p>
+          <a:p>
+            <a:pPr marL="0" indent="0">
+              <a:buNone/>
+            </a:pPr>
+            <a:r>
+              <a:rPr lang="en-GB" sz="1400" dirty="0">
+                <a:latin typeface="Arial" panose="020B0604020202020204" pitchFamily="34" charset="0"/>
+                <a:cs typeface="Arial" panose="020B0604020202020204" pitchFamily="34" charset="0"/>
+              </a:rPr>
+              <a:t>  interaction {</a:t>
+            </a:r>
+          </a:p>
+          <a:p>
+            <a:pPr marL="0" indent="0">
+              <a:buNone/>
+            </a:pPr>
+            <a:r>
+              <a:rPr lang="en-GB" sz="1400" dirty="0">
+                <a:latin typeface="Arial" panose="020B0604020202020204" pitchFamily="34" charset="0"/>
+                <a:cs typeface="Arial" panose="020B0604020202020204" pitchFamily="34" charset="0"/>
+              </a:rPr>
+              <a:t>               [ { _id </a:t>
+            </a:r>
+          </a:p>
+          <a:p>
+            <a:pPr marL="0" indent="0">
+              <a:buNone/>
+            </a:pPr>
+            <a:r>
+              <a:rPr lang="en-GB" sz="1400" dirty="0">
+                <a:latin typeface="Arial" panose="020B0604020202020204" pitchFamily="34" charset="0"/>
+                <a:cs typeface="Arial" panose="020B0604020202020204" pitchFamily="34" charset="0"/>
+              </a:rPr>
+              <a:t>                   name</a:t>
+            </a:r>
+          </a:p>
+          <a:p>
+            <a:pPr marL="0" indent="0">
+              <a:buNone/>
+            </a:pPr>
+            <a:r>
+              <a:rPr lang="en-GB" sz="1400" dirty="0">
+                <a:latin typeface="Arial" panose="020B0604020202020204" pitchFamily="34" charset="0"/>
+                <a:cs typeface="Arial" panose="020B0604020202020204" pitchFamily="34" charset="0"/>
+              </a:rPr>
+              <a:t>                   type:”</a:t>
+            </a:r>
+            <a:r>
+              <a:rPr lang="en-GB" sz="1400" dirty="0" err="1">
+                <a:latin typeface="Arial" panose="020B0604020202020204" pitchFamily="34" charset="0"/>
+                <a:cs typeface="Arial" panose="020B0604020202020204" pitchFamily="34" charset="0"/>
+              </a:rPr>
+              <a:t>iot</a:t>
+            </a:r>
+            <a:r>
+              <a:rPr lang="en-GB" sz="1400" dirty="0">
+                <a:latin typeface="Arial" panose="020B0604020202020204" pitchFamily="34" charset="0"/>
+                <a:cs typeface="Arial" panose="020B0604020202020204" pitchFamily="34" charset="0"/>
+              </a:rPr>
+              <a:t>: Illuminance”},</a:t>
+            </a:r>
+          </a:p>
+          <a:p>
+            <a:pPr marL="0" indent="0">
+              <a:buNone/>
+            </a:pPr>
+            <a:r>
+              <a:rPr lang="en-GB" sz="1400" dirty="0">
+                <a:latin typeface="Arial" panose="020B0604020202020204" pitchFamily="34" charset="0"/>
+                <a:cs typeface="Arial" panose="020B0604020202020204" pitchFamily="34" charset="0"/>
+              </a:rPr>
+              <a:t>                 { _id </a:t>
+            </a:r>
+          </a:p>
+          <a:p>
+            <a:pPr marL="0" indent="0">
+              <a:buNone/>
+            </a:pPr>
+            <a:r>
+              <a:rPr lang="en-GB" sz="1400" dirty="0">
+                <a:latin typeface="Arial" panose="020B0604020202020204" pitchFamily="34" charset="0"/>
+                <a:cs typeface="Arial" panose="020B0604020202020204" pitchFamily="34" charset="0"/>
+              </a:rPr>
+              <a:t>                   name</a:t>
+            </a:r>
+          </a:p>
+          <a:p>
+            <a:pPr marL="0" indent="0">
+              <a:buNone/>
+            </a:pPr>
+            <a:r>
+              <a:rPr lang="en-GB" sz="1400" dirty="0">
+                <a:latin typeface="Arial" panose="020B0604020202020204" pitchFamily="34" charset="0"/>
+                <a:cs typeface="Arial" panose="020B0604020202020204" pitchFamily="34" charset="0"/>
+              </a:rPr>
+              <a:t>                   type:”</a:t>
+            </a:r>
+            <a:r>
+              <a:rPr lang="en-GB" sz="1400" dirty="0" err="1">
+                <a:latin typeface="Arial" panose="020B0604020202020204" pitchFamily="34" charset="0"/>
+                <a:cs typeface="Arial" panose="020B0604020202020204" pitchFamily="34" charset="0"/>
+              </a:rPr>
+              <a:t>iot:ChangeIlluminance</a:t>
+            </a:r>
+            <a:r>
+              <a:rPr lang="en-GB" sz="1400" dirty="0">
+                <a:latin typeface="Arial" panose="020B0604020202020204" pitchFamily="34" charset="0"/>
+                <a:cs typeface="Arial" panose="020B0604020202020204" pitchFamily="34" charset="0"/>
+              </a:rPr>
+              <a:t>”}</a:t>
+            </a:r>
+          </a:p>
+          <a:p>
+            <a:pPr marL="0" indent="0">
+              <a:buNone/>
+            </a:pPr>
+            <a:r>
+              <a:rPr lang="en-GB" sz="1400" dirty="0">
+                <a:latin typeface="Arial" panose="020B0604020202020204" pitchFamily="34" charset="0"/>
+                <a:cs typeface="Arial" panose="020B0604020202020204" pitchFamily="34" charset="0"/>
+              </a:rPr>
+              <a:t>               ]</a:t>
+            </a:r>
+          </a:p>
+          <a:p>
+            <a:pPr marL="0" indent="0">
+              <a:buNone/>
+            </a:pPr>
+            <a:r>
+              <a:rPr lang="en-GB" sz="1400" dirty="0">
+                <a:latin typeface="Arial" panose="020B0604020202020204" pitchFamily="34" charset="0"/>
+                <a:cs typeface="Arial" panose="020B0604020202020204" pitchFamily="34" charset="0"/>
+              </a:rPr>
+              <a:t>  }</a:t>
+            </a:r>
+          </a:p>
+          <a:p>
+            <a:pPr marL="0" indent="0">
+              <a:buNone/>
+            </a:pPr>
+            <a:r>
+              <a:rPr lang="en-GB" sz="1400" dirty="0">
+                <a:latin typeface="Arial" panose="020B0604020202020204" pitchFamily="34" charset="0"/>
+                <a:cs typeface="Arial" panose="020B0604020202020204" pitchFamily="34" charset="0"/>
+              </a:rPr>
+              <a:t>}</a:t>
+            </a:r>
+          </a:p>
+          <a:p>
+            <a:pPr marL="0" indent="0">
+              <a:buNone/>
+            </a:pPr>
+            <a:r>
+              <a:rPr lang="en-GB" sz="1400" dirty="0">
+                <a:latin typeface="Arial" panose="020B0604020202020204" pitchFamily="34" charset="0"/>
+                <a:cs typeface="Arial" panose="020B0604020202020204" pitchFamily="34" charset="0"/>
+              </a:rPr>
+              <a:t>               </a:t>
+            </a:r>
+            <a:endParaRPr lang="en-US" sz="1400" dirty="0">
+              <a:latin typeface="Arial" panose="020B0604020202020204" pitchFamily="34" charset="0"/>
+              <a:cs typeface="Arial" panose="020B0604020202020204" pitchFamily="34" charset="0"/>
+            </a:endParaRPr>
+          </a:p>
+        </p:txBody>
+      </p:sp>
+      <p:sp>
+        <p:nvSpPr>
+          <p:cNvPr id="4" name="Content Placeholder 2">
+            <a:extLst>
+              <a:ext uri="{FF2B5EF4-FFF2-40B4-BE49-F238E27FC236}">
+                <a16:creationId xmlns:a16="http://schemas.microsoft.com/office/drawing/2014/main" id="{3C0E0BD4-4E8D-3548-BE4D-B1D5C30FC27C}"/>
+              </a:ext>
+            </a:extLst>
+          </p:cNvPr>
+          <p:cNvSpPr txBox="1">
+            <a:spLocks/>
+          </p:cNvSpPr>
+          <p:nvPr/>
+        </p:nvSpPr>
+        <p:spPr>
+          <a:xfrm>
+            <a:off x="4572000" y="1840429"/>
+            <a:ext cx="4572000" cy="3586584"/>
+          </a:xfrm>
+          <a:prstGeom prst="rect">
+            <a:avLst/>
+          </a:prstGeom>
+          <a:ln>
+            <a:solidFill>
+              <a:schemeClr val="accent1"/>
+            </a:solidFill>
+          </a:ln>
+        </p:spPr>
+        <p:txBody>
+          <a:bodyPr vert="horz" lIns="91440" tIns="45720" rIns="91440" bIns="45720" rtlCol="0">
+            <a:normAutofit/>
+          </a:bodyPr>
+          <a:lstStyle>
+            <a:lvl1pPr marL="342900" indent="-342900" algn="l" defTabSz="914400" rtl="0" eaLnBrk="1" latinLnBrk="0" hangingPunct="1">
+              <a:spcBef>
+                <a:spcPct val="20000"/>
+              </a:spcBef>
+              <a:buFont typeface="Arial" pitchFamily="34" charset="0"/>
+              <a:buChar char="•"/>
+              <a:defRPr sz="3200" kern="1200">
+                <a:solidFill>
+                  <a:schemeClr val="tx1"/>
+                </a:solidFill>
+                <a:latin typeface="+mn-lt"/>
+                <a:ea typeface="+mn-ea"/>
+                <a:cs typeface="+mn-cs"/>
+              </a:defRPr>
+            </a:lvl1pPr>
+            <a:lvl2pPr marL="742950" indent="-285750" algn="l" defTabSz="914400" rtl="0" eaLnBrk="1" latinLnBrk="0" hangingPunct="1">
+              <a:spcBef>
+                <a:spcPct val="20000"/>
+              </a:spcBef>
+              <a:buFont typeface="Arial" pitchFamily="34" charset="0"/>
+              <a:buChar char="–"/>
+              <a:defRPr sz="2800" kern="1200">
+                <a:solidFill>
+                  <a:schemeClr val="tx1"/>
+                </a:solidFill>
+                <a:latin typeface="+mn-lt"/>
+                <a:ea typeface="+mn-ea"/>
+                <a:cs typeface="+mn-cs"/>
+              </a:defRPr>
+            </a:lvl2pPr>
+            <a:lvl3pPr marL="1143000" indent="-228600" algn="l" defTabSz="914400" rtl="0" eaLnBrk="1" latinLnBrk="0" hangingPunct="1">
+              <a:spcBef>
+                <a:spcPct val="20000"/>
+              </a:spcBef>
+              <a:buFont typeface="Arial" pitchFamily="34" charset="0"/>
+              <a:buChar char="•"/>
+              <a:defRPr sz="2400" kern="1200">
+                <a:solidFill>
+                  <a:schemeClr val="tx1"/>
+                </a:solidFill>
+                <a:latin typeface="+mn-lt"/>
+                <a:ea typeface="+mn-ea"/>
+                <a:cs typeface="+mn-cs"/>
+              </a:defRPr>
+            </a:lvl3pPr>
+            <a:lvl4pPr marL="1600200" indent="-228600" algn="l" defTabSz="914400" rtl="0" eaLnBrk="1" latinLnBrk="0" hangingPunct="1">
+              <a:spcBef>
+                <a:spcPct val="20000"/>
+              </a:spcBef>
+              <a:buFont typeface="Arial" pitchFamily="34" charset="0"/>
+              <a:buChar char="–"/>
+              <a:defRPr sz="2000" kern="1200">
+                <a:solidFill>
+                  <a:schemeClr val="tx1"/>
+                </a:solidFill>
+                <a:latin typeface="+mn-lt"/>
+                <a:ea typeface="+mn-ea"/>
+                <a:cs typeface="+mn-cs"/>
+              </a:defRPr>
+            </a:lvl4pPr>
+            <a:lvl5pPr marL="2057400" indent="-228600" algn="l" defTabSz="914400" rtl="0" eaLnBrk="1" latinLnBrk="0" hangingPunct="1">
+              <a:spcBef>
+                <a:spcPct val="20000"/>
+              </a:spcBef>
+              <a:buFont typeface="Arial" pitchFamily="34" charset="0"/>
+              <a:buChar char="»"/>
+              <a:defRPr sz="2000" kern="1200">
+                <a:solidFill>
+                  <a:schemeClr val="tx1"/>
+                </a:solidFill>
+                <a:latin typeface="+mn-lt"/>
+                <a:ea typeface="+mn-ea"/>
+                <a:cs typeface="+mn-cs"/>
+              </a:defRPr>
+            </a:lvl5pPr>
+            <a:lvl6pPr marL="2514600" indent="-228600" algn="l" defTabSz="914400" rtl="0" eaLnBrk="1" latinLnBrk="0" hangingPunct="1">
+              <a:spcBef>
+                <a:spcPct val="20000"/>
+              </a:spcBef>
+              <a:buFont typeface="Arial" pitchFamily="34" charset="0"/>
+              <a:buChar char="•"/>
+              <a:defRPr sz="2000" kern="1200">
+                <a:solidFill>
+                  <a:schemeClr val="tx1"/>
+                </a:solidFill>
+                <a:latin typeface="+mn-lt"/>
+                <a:ea typeface="+mn-ea"/>
+                <a:cs typeface="+mn-cs"/>
+              </a:defRPr>
+            </a:lvl6pPr>
+            <a:lvl7pPr marL="2971800" indent="-228600" algn="l" defTabSz="914400" rtl="0" eaLnBrk="1" latinLnBrk="0" hangingPunct="1">
+              <a:spcBef>
+                <a:spcPct val="20000"/>
+              </a:spcBef>
+              <a:buFont typeface="Arial" pitchFamily="34" charset="0"/>
+              <a:buChar char="•"/>
+              <a:defRPr sz="2000" kern="1200">
+                <a:solidFill>
+                  <a:schemeClr val="tx1"/>
+                </a:solidFill>
+                <a:latin typeface="+mn-lt"/>
+                <a:ea typeface="+mn-ea"/>
+                <a:cs typeface="+mn-cs"/>
+              </a:defRPr>
+            </a:lvl7pPr>
+            <a:lvl8pPr marL="3429000" indent="-228600" algn="l" defTabSz="914400" rtl="0" eaLnBrk="1" latinLnBrk="0" hangingPunct="1">
+              <a:spcBef>
+                <a:spcPct val="20000"/>
+              </a:spcBef>
+              <a:buFont typeface="Arial" pitchFamily="34" charset="0"/>
+              <a:buChar char="•"/>
+              <a:defRPr sz="2000" kern="1200">
+                <a:solidFill>
+                  <a:schemeClr val="tx1"/>
+                </a:solidFill>
+                <a:latin typeface="+mn-lt"/>
+                <a:ea typeface="+mn-ea"/>
+                <a:cs typeface="+mn-cs"/>
+              </a:defRPr>
+            </a:lvl8pPr>
+            <a:lvl9pPr marL="3886200" indent="-228600" algn="l" defTabSz="914400" rtl="0" eaLnBrk="1" latinLnBrk="0" hangingPunct="1">
+              <a:spcBef>
+                <a:spcPct val="20000"/>
+              </a:spcBef>
+              <a:buFont typeface="Arial" pitchFamily="34" charset="0"/>
+              <a:buChar char="•"/>
+              <a:defRPr sz="2000" kern="1200">
+                <a:solidFill>
+                  <a:schemeClr val="tx1"/>
+                </a:solidFill>
+                <a:latin typeface="+mn-lt"/>
+                <a:ea typeface="+mn-ea"/>
+                <a:cs typeface="+mn-cs"/>
+              </a:defRPr>
+            </a:lvl9pPr>
+          </a:lstStyle>
+          <a:p>
+            <a:pPr marL="0" indent="0">
+              <a:buNone/>
+            </a:pPr>
+            <a:r>
+              <a:rPr lang="en-GB" sz="1400" dirty="0">
+                <a:latin typeface="Arial" panose="020B0604020202020204" pitchFamily="34" charset="0"/>
+                <a:cs typeface="Arial" panose="020B0604020202020204" pitchFamily="34" charset="0"/>
+              </a:rPr>
+              <a:t>Select ?thing ?</a:t>
+            </a:r>
+            <a:r>
+              <a:rPr lang="en-GB" sz="1400" dirty="0" err="1">
+                <a:latin typeface="Arial" panose="020B0604020202020204" pitchFamily="34" charset="0"/>
+                <a:cs typeface="Arial" panose="020B0604020202020204" pitchFamily="34" charset="0"/>
+              </a:rPr>
+              <a:t>illuninanceProp</a:t>
+            </a:r>
+            <a:r>
+              <a:rPr lang="en-GB" sz="1400" dirty="0">
+                <a:latin typeface="Arial" panose="020B0604020202020204" pitchFamily="34" charset="0"/>
+                <a:cs typeface="Arial" panose="020B0604020202020204" pitchFamily="34" charset="0"/>
+              </a:rPr>
+              <a:t> ? ?</a:t>
+            </a:r>
+            <a:r>
+              <a:rPr lang="en-GB" sz="1400" dirty="0" err="1">
+                <a:latin typeface="Arial" panose="020B0604020202020204" pitchFamily="34" charset="0"/>
+                <a:cs typeface="Arial" panose="020B0604020202020204" pitchFamily="34" charset="0"/>
+              </a:rPr>
+              <a:t>illuminaceChange</a:t>
+            </a:r>
+            <a:endParaRPr lang="en-GB" sz="1400" dirty="0">
+              <a:latin typeface="Arial" panose="020B0604020202020204" pitchFamily="34" charset="0"/>
+              <a:cs typeface="Arial" panose="020B0604020202020204" pitchFamily="34" charset="0"/>
+            </a:endParaRPr>
+          </a:p>
+          <a:p>
+            <a:pPr marL="0" indent="0">
+              <a:buFont typeface="Arial" pitchFamily="34" charset="0"/>
+              <a:buNone/>
+            </a:pPr>
+            <a:r>
+              <a:rPr lang="en-GB" sz="1400" dirty="0">
+                <a:latin typeface="Arial" panose="020B0604020202020204" pitchFamily="34" charset="0"/>
+                <a:cs typeface="Arial" panose="020B0604020202020204" pitchFamily="34" charset="0"/>
+              </a:rPr>
+              <a:t>WHERE{</a:t>
+            </a:r>
+          </a:p>
+          <a:p>
+            <a:pPr marL="0" indent="0">
+              <a:buFont typeface="Arial" pitchFamily="34" charset="0"/>
+              <a:buNone/>
+            </a:pPr>
+            <a:r>
+              <a:rPr lang="en-GB" sz="1400" dirty="0">
+                <a:latin typeface="Arial" panose="020B0604020202020204" pitchFamily="34" charset="0"/>
+                <a:cs typeface="Arial" panose="020B0604020202020204" pitchFamily="34" charset="0"/>
+              </a:rPr>
+              <a:t>   ?thing </a:t>
+            </a:r>
+            <a:r>
+              <a:rPr lang="en-GB" sz="1400" dirty="0" err="1">
+                <a:latin typeface="Arial" panose="020B0604020202020204" pitchFamily="34" charset="0"/>
+                <a:cs typeface="Arial" panose="020B0604020202020204" pitchFamily="34" charset="0"/>
+              </a:rPr>
+              <a:t>td:interaction</a:t>
+            </a:r>
+            <a:r>
+              <a:rPr lang="en-GB" sz="1400" dirty="0">
+                <a:latin typeface="Arial" panose="020B0604020202020204" pitchFamily="34" charset="0"/>
+                <a:cs typeface="Arial" panose="020B0604020202020204" pitchFamily="34" charset="0"/>
+              </a:rPr>
+              <a:t> ?</a:t>
+            </a:r>
+            <a:r>
+              <a:rPr lang="en-GB" sz="1400" dirty="0" err="1">
+                <a:latin typeface="Arial" panose="020B0604020202020204" pitchFamily="34" charset="0"/>
+                <a:cs typeface="Arial" panose="020B0604020202020204" pitchFamily="34" charset="0"/>
+              </a:rPr>
+              <a:t>illminanceProp</a:t>
+            </a:r>
+            <a:r>
+              <a:rPr lang="en-GB" sz="1400" dirty="0">
+                <a:latin typeface="Arial" panose="020B0604020202020204" pitchFamily="34" charset="0"/>
+                <a:cs typeface="Arial" panose="020B0604020202020204" pitchFamily="34" charset="0"/>
+              </a:rPr>
+              <a:t>.</a:t>
+            </a:r>
+          </a:p>
+          <a:p>
+            <a:pPr marL="0" indent="0">
+              <a:buNone/>
+            </a:pPr>
+            <a:r>
+              <a:rPr lang="en-GB" sz="1400" dirty="0">
+                <a:latin typeface="Arial" panose="020B0604020202020204" pitchFamily="34" charset="0"/>
+                <a:cs typeface="Arial" panose="020B0604020202020204" pitchFamily="34" charset="0"/>
+              </a:rPr>
+              <a:t>    ?</a:t>
+            </a:r>
+            <a:r>
+              <a:rPr lang="en-GB" sz="1400" dirty="0" err="1">
+                <a:latin typeface="Arial" panose="020B0604020202020204" pitchFamily="34" charset="0"/>
+                <a:cs typeface="Arial" panose="020B0604020202020204" pitchFamily="34" charset="0"/>
+              </a:rPr>
+              <a:t>illuminaceProp</a:t>
+            </a:r>
+            <a:r>
+              <a:rPr lang="en-GB" sz="1400" dirty="0">
+                <a:latin typeface="Arial" panose="020B0604020202020204" pitchFamily="34" charset="0"/>
+                <a:cs typeface="Arial" panose="020B0604020202020204" pitchFamily="34" charset="0"/>
+              </a:rPr>
+              <a:t>. a </a:t>
+            </a:r>
+            <a:r>
+              <a:rPr lang="en-GB" sz="1400" dirty="0" err="1">
+                <a:latin typeface="Arial" panose="020B0604020202020204" pitchFamily="34" charset="0"/>
+                <a:cs typeface="Arial" panose="020B0604020202020204" pitchFamily="34" charset="0"/>
+              </a:rPr>
+              <a:t>iot:Illuminance</a:t>
+            </a:r>
+            <a:r>
+              <a:rPr lang="en-GB" sz="1400" dirty="0">
+                <a:latin typeface="Arial" panose="020B0604020202020204" pitchFamily="34" charset="0"/>
+                <a:cs typeface="Arial" panose="020B0604020202020204" pitchFamily="34" charset="0"/>
+              </a:rPr>
+              <a:t>; </a:t>
+            </a:r>
+            <a:r>
+              <a:rPr lang="en-GB" sz="1400" dirty="0" err="1">
+                <a:latin typeface="Arial" panose="020B0604020202020204" pitchFamily="34" charset="0"/>
+                <a:cs typeface="Arial" panose="020B0604020202020204" pitchFamily="34" charset="0"/>
+              </a:rPr>
+              <a:t>td:name</a:t>
+            </a:r>
+            <a:r>
+              <a:rPr lang="en-GB" sz="1400" dirty="0">
+                <a:latin typeface="Arial" panose="020B0604020202020204" pitchFamily="34" charset="0"/>
+                <a:cs typeface="Arial" panose="020B0604020202020204" pitchFamily="34" charset="0"/>
+              </a:rPr>
+              <a:t> ?</a:t>
+            </a:r>
+            <a:r>
+              <a:rPr lang="en-GB" sz="1400" dirty="0" err="1">
+                <a:latin typeface="Arial" panose="020B0604020202020204" pitchFamily="34" charset="0"/>
+                <a:cs typeface="Arial" panose="020B0604020202020204" pitchFamily="34" charset="0"/>
+              </a:rPr>
+              <a:t>iname</a:t>
+            </a:r>
+            <a:r>
+              <a:rPr lang="en-GB" sz="1400" dirty="0">
+                <a:latin typeface="Arial" panose="020B0604020202020204" pitchFamily="34" charset="0"/>
+                <a:cs typeface="Arial" panose="020B0604020202020204" pitchFamily="34" charset="0"/>
+              </a:rPr>
+              <a:t>.</a:t>
+            </a:r>
+          </a:p>
+          <a:p>
+            <a:pPr marL="0" indent="0">
+              <a:buNone/>
+            </a:pPr>
+            <a:r>
+              <a:rPr lang="en-GB" sz="1400" dirty="0">
+                <a:latin typeface="Arial" panose="020B0604020202020204" pitchFamily="34" charset="0"/>
+                <a:cs typeface="Arial" panose="020B0604020202020204" pitchFamily="34" charset="0"/>
+              </a:rPr>
+              <a:t>    ?thing </a:t>
+            </a:r>
+            <a:r>
+              <a:rPr lang="en-GB" sz="1400" dirty="0" err="1">
+                <a:latin typeface="Arial" panose="020B0604020202020204" pitchFamily="34" charset="0"/>
+                <a:cs typeface="Arial" panose="020B0604020202020204" pitchFamily="34" charset="0"/>
+              </a:rPr>
+              <a:t>td:interaction</a:t>
+            </a:r>
+            <a:r>
+              <a:rPr lang="en-GB" sz="1400" dirty="0">
+                <a:latin typeface="Arial" panose="020B0604020202020204" pitchFamily="34" charset="0"/>
+                <a:cs typeface="Arial" panose="020B0604020202020204" pitchFamily="34" charset="0"/>
+              </a:rPr>
+              <a:t> ?</a:t>
+            </a:r>
+            <a:r>
+              <a:rPr lang="en-GB" sz="1400" dirty="0" err="1">
+                <a:latin typeface="Arial" panose="020B0604020202020204" pitchFamily="34" charset="0"/>
+                <a:cs typeface="Arial" panose="020B0604020202020204" pitchFamily="34" charset="0"/>
+              </a:rPr>
+              <a:t>illuminaceChange</a:t>
+            </a:r>
+            <a:r>
+              <a:rPr lang="en-GB" sz="1400" dirty="0">
+                <a:latin typeface="Arial" panose="020B0604020202020204" pitchFamily="34" charset="0"/>
+                <a:cs typeface="Arial" panose="020B0604020202020204" pitchFamily="34" charset="0"/>
+              </a:rPr>
+              <a:t>.</a:t>
+            </a:r>
+          </a:p>
+          <a:p>
+            <a:pPr marL="0" indent="0">
+              <a:buNone/>
+            </a:pPr>
+            <a:r>
+              <a:rPr lang="en-GB" sz="1400" dirty="0">
+                <a:latin typeface="Arial" panose="020B0604020202020204" pitchFamily="34" charset="0"/>
+                <a:cs typeface="Arial" panose="020B0604020202020204" pitchFamily="34" charset="0"/>
+              </a:rPr>
+              <a:t>   ?</a:t>
+            </a:r>
+            <a:r>
+              <a:rPr lang="en-GB" sz="1400" dirty="0" err="1">
+                <a:latin typeface="Arial" panose="020B0604020202020204" pitchFamily="34" charset="0"/>
+                <a:cs typeface="Arial" panose="020B0604020202020204" pitchFamily="34" charset="0"/>
+              </a:rPr>
+              <a:t>illuminaceChange</a:t>
+            </a:r>
+            <a:r>
+              <a:rPr lang="en-GB" sz="1400" dirty="0">
+                <a:latin typeface="Arial" panose="020B0604020202020204" pitchFamily="34" charset="0"/>
+                <a:cs typeface="Arial" panose="020B0604020202020204" pitchFamily="34" charset="0"/>
+              </a:rPr>
+              <a:t>. a </a:t>
+            </a:r>
+            <a:r>
+              <a:rPr lang="en-GB" sz="1400" dirty="0" err="1">
+                <a:latin typeface="Arial" panose="020B0604020202020204" pitchFamily="34" charset="0"/>
+                <a:cs typeface="Arial" panose="020B0604020202020204" pitchFamily="34" charset="0"/>
+              </a:rPr>
+              <a:t>iot:ChangeIlluminance</a:t>
+            </a:r>
+            <a:r>
+              <a:rPr lang="en-GB" sz="1400" dirty="0">
+                <a:latin typeface="Arial" panose="020B0604020202020204" pitchFamily="34" charset="0"/>
+                <a:cs typeface="Arial" panose="020B0604020202020204" pitchFamily="34" charset="0"/>
+              </a:rPr>
+              <a:t>; </a:t>
+            </a:r>
+          </a:p>
+          <a:p>
+            <a:pPr marL="0" indent="0">
+              <a:buNone/>
+            </a:pPr>
+            <a:r>
+              <a:rPr lang="en-GB" sz="1400" dirty="0">
+                <a:latin typeface="Arial" panose="020B0604020202020204" pitchFamily="34" charset="0"/>
+                <a:cs typeface="Arial" panose="020B0604020202020204" pitchFamily="34" charset="0"/>
+              </a:rPr>
+              <a:t>	</a:t>
+            </a:r>
+            <a:r>
+              <a:rPr lang="en-GB" sz="1400" dirty="0" err="1">
+                <a:latin typeface="Arial" panose="020B0604020202020204" pitchFamily="34" charset="0"/>
+                <a:cs typeface="Arial" panose="020B0604020202020204" pitchFamily="34" charset="0"/>
+              </a:rPr>
+              <a:t>td:name</a:t>
+            </a:r>
+            <a:r>
+              <a:rPr lang="en-GB" sz="1400" dirty="0">
+                <a:latin typeface="Arial" panose="020B0604020202020204" pitchFamily="34" charset="0"/>
+                <a:cs typeface="Arial" panose="020B0604020202020204" pitchFamily="34" charset="0"/>
+              </a:rPr>
+              <a:t> ?</a:t>
+            </a:r>
+            <a:r>
+              <a:rPr lang="en-GB" sz="1400" dirty="0" err="1">
+                <a:latin typeface="Arial" panose="020B0604020202020204" pitchFamily="34" charset="0"/>
+                <a:cs typeface="Arial" panose="020B0604020202020204" pitchFamily="34" charset="0"/>
+              </a:rPr>
+              <a:t>cname</a:t>
+            </a:r>
+            <a:r>
+              <a:rPr lang="en-GB" sz="1400" dirty="0">
+                <a:latin typeface="Arial" panose="020B0604020202020204" pitchFamily="34" charset="0"/>
+                <a:cs typeface="Arial" panose="020B0604020202020204" pitchFamily="34" charset="0"/>
+              </a:rPr>
+              <a:t>.</a:t>
+            </a:r>
+          </a:p>
+          <a:p>
+            <a:pPr marL="0" indent="0">
+              <a:buFont typeface="Arial" pitchFamily="34" charset="0"/>
+              <a:buNone/>
+            </a:pPr>
+            <a:r>
+              <a:rPr lang="en-GB" sz="1400" dirty="0">
+                <a:latin typeface="Arial" panose="020B0604020202020204" pitchFamily="34" charset="0"/>
+                <a:cs typeface="Arial" panose="020B0604020202020204" pitchFamily="34" charset="0"/>
+              </a:rPr>
+              <a:t>}</a:t>
+            </a:r>
+          </a:p>
+          <a:p>
+            <a:pPr marL="0" indent="0">
+              <a:buFont typeface="Arial" pitchFamily="34" charset="0"/>
+              <a:buNone/>
+            </a:pPr>
+            <a:endParaRPr lang="en-GB" sz="1400" dirty="0">
+              <a:latin typeface="Arial" panose="020B0604020202020204" pitchFamily="34" charset="0"/>
+              <a:cs typeface="Arial" panose="020B0604020202020204" pitchFamily="34" charset="0"/>
+            </a:endParaRPr>
+          </a:p>
+          <a:p>
+            <a:pPr marL="0" indent="0">
+              <a:buFont typeface="Arial" pitchFamily="34" charset="0"/>
+              <a:buNone/>
+            </a:pPr>
+            <a:endParaRPr lang="en-GB" sz="1400" dirty="0">
+              <a:latin typeface="Arial" panose="020B0604020202020204" pitchFamily="34" charset="0"/>
+              <a:cs typeface="Arial" panose="020B0604020202020204" pitchFamily="34" charset="0"/>
+            </a:endParaRPr>
+          </a:p>
+          <a:p>
+            <a:pPr marL="0" indent="0">
+              <a:buFont typeface="Arial" pitchFamily="34" charset="0"/>
+              <a:buNone/>
+            </a:pPr>
+            <a:r>
+              <a:rPr lang="en-GB" sz="1400" dirty="0">
+                <a:latin typeface="Arial" panose="020B0604020202020204" pitchFamily="34" charset="0"/>
+                <a:cs typeface="Arial" panose="020B0604020202020204" pitchFamily="34" charset="0"/>
+              </a:rPr>
+              <a:t>               </a:t>
+            </a:r>
+            <a:endParaRPr lang="en-US" sz="1400" dirty="0">
+              <a:latin typeface="Arial" panose="020B0604020202020204" pitchFamily="34" charset="0"/>
+              <a:cs typeface="Arial" panose="020B0604020202020204" pitchFamily="34" charset="0"/>
+            </a:endParaRPr>
+          </a:p>
+        </p:txBody>
+      </p:sp>
+      <p:sp>
+        <p:nvSpPr>
+          <p:cNvPr id="5" name="TextBox 4">
+            <a:extLst>
+              <a:ext uri="{FF2B5EF4-FFF2-40B4-BE49-F238E27FC236}">
+                <a16:creationId xmlns:a16="http://schemas.microsoft.com/office/drawing/2014/main" id="{4150CEFC-AC32-6342-BFFF-7E5C47BE5FDB}"/>
+              </a:ext>
+            </a:extLst>
+          </p:cNvPr>
+          <p:cNvSpPr txBox="1"/>
+          <p:nvPr/>
+        </p:nvSpPr>
+        <p:spPr>
+          <a:xfrm>
+            <a:off x="1979712" y="5661248"/>
+            <a:ext cx="6006965" cy="923330"/>
+          </a:xfrm>
+          <a:prstGeom prst="rect">
+            <a:avLst/>
+          </a:prstGeom>
+          <a:noFill/>
+          <a:ln>
+            <a:solidFill>
+              <a:schemeClr val="accent1"/>
+            </a:solidFill>
+            <a:prstDash val="sysDot"/>
+          </a:ln>
+        </p:spPr>
+        <p:txBody>
+          <a:bodyPr wrap="none" rtlCol="0">
+            <a:spAutoFit/>
+          </a:bodyPr>
+          <a:lstStyle/>
+          <a:p>
+            <a:r>
+              <a:rPr lang="en-US" dirty="0"/>
+              <a:t>Discover the things that can provide two types of interactions:</a:t>
+            </a:r>
+          </a:p>
+          <a:p>
+            <a:pPr marL="342900" indent="-342900">
+              <a:buAutoNum type="arabicPeriod"/>
+            </a:pPr>
+            <a:r>
+              <a:rPr lang="en-US" dirty="0"/>
+              <a:t>Illuminance property</a:t>
+            </a:r>
+          </a:p>
+          <a:p>
+            <a:pPr marL="342900" indent="-342900">
+              <a:buAutoNum type="arabicPeriod"/>
+            </a:pPr>
+            <a:r>
+              <a:rPr lang="en-US" dirty="0"/>
+              <a:t>The ability to change Illuminance.</a:t>
+            </a:r>
+          </a:p>
+        </p:txBody>
+      </p:sp>
+      <p:sp>
+        <p:nvSpPr>
+          <p:cNvPr id="6" name="TextBox 5">
+            <a:extLst>
+              <a:ext uri="{FF2B5EF4-FFF2-40B4-BE49-F238E27FC236}">
+                <a16:creationId xmlns:a16="http://schemas.microsoft.com/office/drawing/2014/main" id="{58C04354-F247-0140-8D40-930E2A67B0F9}"/>
+              </a:ext>
+            </a:extLst>
+          </p:cNvPr>
+          <p:cNvSpPr txBox="1"/>
+          <p:nvPr/>
+        </p:nvSpPr>
+        <p:spPr>
+          <a:xfrm>
+            <a:off x="1547664" y="1285096"/>
+            <a:ext cx="1496051" cy="523220"/>
+          </a:xfrm>
+          <a:prstGeom prst="rect">
+            <a:avLst/>
+          </a:prstGeom>
+          <a:noFill/>
+        </p:spPr>
+        <p:txBody>
+          <a:bodyPr wrap="none" rtlCol="0">
+            <a:spAutoFit/>
+          </a:bodyPr>
+          <a:lstStyle/>
+          <a:p>
+            <a:r>
+              <a:rPr lang="en-US" sz="2800" b="1" dirty="0" err="1"/>
+              <a:t>GraphQL</a:t>
+            </a:r>
+            <a:endParaRPr lang="en-US" sz="2800" b="1" dirty="0"/>
+          </a:p>
+        </p:txBody>
+      </p:sp>
+      <p:sp>
+        <p:nvSpPr>
+          <p:cNvPr id="7" name="TextBox 6">
+            <a:extLst>
+              <a:ext uri="{FF2B5EF4-FFF2-40B4-BE49-F238E27FC236}">
+                <a16:creationId xmlns:a16="http://schemas.microsoft.com/office/drawing/2014/main" id="{AED8852C-3E8C-134C-8E9A-05597FB76F8B}"/>
+              </a:ext>
+            </a:extLst>
+          </p:cNvPr>
+          <p:cNvSpPr txBox="1"/>
+          <p:nvPr/>
+        </p:nvSpPr>
+        <p:spPr>
+          <a:xfrm>
+            <a:off x="6189708" y="1394785"/>
+            <a:ext cx="1336584" cy="523220"/>
+          </a:xfrm>
+          <a:prstGeom prst="rect">
+            <a:avLst/>
+          </a:prstGeom>
+          <a:noFill/>
+        </p:spPr>
+        <p:txBody>
+          <a:bodyPr wrap="none" rtlCol="0">
+            <a:spAutoFit/>
+          </a:bodyPr>
+          <a:lstStyle/>
+          <a:p>
+            <a:r>
+              <a:rPr lang="en-US" sz="2800" b="1" dirty="0"/>
+              <a:t>SPARQL</a:t>
+            </a:r>
+          </a:p>
+        </p:txBody>
+      </p:sp>
+    </p:spTree>
+    <p:extLst>
+      <p:ext uri="{BB962C8B-B14F-4D97-AF65-F5344CB8AC3E}">
+        <p14:creationId xmlns:p14="http://schemas.microsoft.com/office/powerpoint/2010/main" val="2182857345"/>
+      </p:ext>
+    </p:extLst>
+  </p:cSld>
+  <p:clrMapOvr>
+    <a:masterClrMapping/>
+  </p:clrMapOvr>
+</p:sld>
+</file>
+
+<file path=ppt/slides/slide11.xml><?xml version="1.0" encoding="utf-8"?>
+<p:sld xmlns:a="http://schemas.openxmlformats.org/drawingml/2006/main" xmlns:r="http://schemas.openxmlformats.org/officeDocument/2006/relationships" xmlns:p="http://schemas.openxmlformats.org/presentationml/2006/main">
+  <p:cSld>
+    <p:spTree>
+      <p:nvGrpSpPr>
+        <p:cNvPr id="1" name=""/>
+        <p:cNvGrpSpPr/>
+        <p:nvPr/>
+      </p:nvGrpSpPr>
+      <p:grpSpPr>
+        <a:xfrm>
+          <a:off x="0" y="0"/>
+          <a:ext cx="0" cy="0"/>
+          <a:chOff x="0" y="0"/>
+          <a:chExt cx="0" cy="0"/>
+        </a:xfrm>
+      </p:grpSpPr>
+      <p:sp>
+        <p:nvSpPr>
+          <p:cNvPr id="2" name="Title 1">
+            <a:extLst>
+              <a:ext uri="{FF2B5EF4-FFF2-40B4-BE49-F238E27FC236}">
+                <a16:creationId xmlns:a16="http://schemas.microsoft.com/office/drawing/2014/main" id="{9045EEE5-DB47-3E47-ADA4-6215DFDB97AB}"/>
+              </a:ext>
+            </a:extLst>
+          </p:cNvPr>
+          <p:cNvSpPr>
+            <a:spLocks noGrp="1"/>
+          </p:cNvSpPr>
+          <p:nvPr>
+            <p:ph type="title"/>
+          </p:nvPr>
+        </p:nvSpPr>
+        <p:spPr/>
+        <p:txBody>
+          <a:bodyPr>
+            <a:normAutofit/>
+          </a:bodyPr>
+          <a:lstStyle/>
+          <a:p>
+            <a:r>
+              <a:rPr lang="en-US" sz="3200" dirty="0"/>
+              <a:t>Semantic Discovery by SPARQL &amp; </a:t>
+            </a:r>
+            <a:r>
+              <a:rPr lang="en-US" sz="3200" dirty="0" err="1"/>
+              <a:t>GraphQL</a:t>
+            </a:r>
+            <a:endParaRPr lang="en-US" sz="3200" dirty="0"/>
+          </a:p>
+        </p:txBody>
+      </p:sp>
+      <p:sp>
+        <p:nvSpPr>
+          <p:cNvPr id="3" name="Content Placeholder 2">
+            <a:extLst>
+              <a:ext uri="{FF2B5EF4-FFF2-40B4-BE49-F238E27FC236}">
+                <a16:creationId xmlns:a16="http://schemas.microsoft.com/office/drawing/2014/main" id="{B0087305-B303-774E-98CC-821F2D2A1B59}"/>
+              </a:ext>
+            </a:extLst>
+          </p:cNvPr>
+          <p:cNvSpPr>
+            <a:spLocks noGrp="1"/>
+          </p:cNvSpPr>
+          <p:nvPr>
+            <p:ph idx="1"/>
+          </p:nvPr>
+        </p:nvSpPr>
+        <p:spPr>
+          <a:xfrm>
+            <a:off x="443963" y="1825481"/>
+            <a:ext cx="3898776" cy="3556992"/>
+          </a:xfrm>
+          <a:ln>
+            <a:solidFill>
+              <a:schemeClr val="accent1"/>
+            </a:solidFill>
+          </a:ln>
+        </p:spPr>
+        <p:txBody>
+          <a:bodyPr>
+            <a:normAutofit/>
+          </a:bodyPr>
+          <a:lstStyle/>
+          <a:p>
+            <a:pPr marL="0" indent="0">
+              <a:buNone/>
+            </a:pPr>
+            <a:r>
+              <a:rPr lang="en-GB" sz="1400" dirty="0">
+                <a:latin typeface="Arial" panose="020B0604020202020204" pitchFamily="34" charset="0"/>
+                <a:cs typeface="Arial" panose="020B0604020202020204" pitchFamily="34" charset="0"/>
+              </a:rPr>
+              <a:t>{ </a:t>
+            </a:r>
+          </a:p>
+          <a:p>
+            <a:pPr marL="0" indent="0">
+              <a:buNone/>
+            </a:pPr>
+            <a:r>
+              <a:rPr lang="en-GB" sz="1400" dirty="0" err="1">
+                <a:latin typeface="Arial" panose="020B0604020202020204" pitchFamily="34" charset="0"/>
+                <a:cs typeface="Arial" panose="020B0604020202020204" pitchFamily="34" charset="0"/>
+              </a:rPr>
+              <a:t>Things_with_Interaction</a:t>
+            </a:r>
+            <a:r>
+              <a:rPr lang="en-GB" sz="1400" dirty="0">
+                <a:latin typeface="Arial" panose="020B0604020202020204" pitchFamily="34" charset="0"/>
+                <a:cs typeface="Arial" panose="020B0604020202020204" pitchFamily="34" charset="0"/>
+              </a:rPr>
+              <a:t>(limit: 1, offset: 6) {</a:t>
+            </a:r>
+          </a:p>
+          <a:p>
+            <a:pPr marL="0" indent="0">
+              <a:buNone/>
+            </a:pPr>
+            <a:r>
+              <a:rPr lang="en-GB" sz="1400" dirty="0">
+                <a:latin typeface="Arial" panose="020B0604020202020204" pitchFamily="34" charset="0"/>
+                <a:cs typeface="Arial" panose="020B0604020202020204" pitchFamily="34" charset="0"/>
+              </a:rPr>
+              <a:t>   _id </a:t>
+            </a:r>
+          </a:p>
+          <a:p>
+            <a:pPr marL="0" indent="0">
+              <a:buNone/>
+            </a:pPr>
+            <a:r>
+              <a:rPr lang="en-GB" sz="1400" dirty="0">
+                <a:latin typeface="Arial" panose="020B0604020202020204" pitchFamily="34" charset="0"/>
+                <a:cs typeface="Arial" panose="020B0604020202020204" pitchFamily="34" charset="0"/>
+              </a:rPr>
+              <a:t>  _type</a:t>
+            </a:r>
+          </a:p>
+          <a:p>
+            <a:pPr marL="0" indent="0">
+              <a:buNone/>
+            </a:pPr>
+            <a:r>
+              <a:rPr lang="en-GB" sz="1400" dirty="0">
+                <a:latin typeface="Arial" panose="020B0604020202020204" pitchFamily="34" charset="0"/>
+                <a:cs typeface="Arial" panose="020B0604020202020204" pitchFamily="34" charset="0"/>
+              </a:rPr>
+              <a:t>    base</a:t>
+            </a:r>
+          </a:p>
+          <a:p>
+            <a:pPr marL="0" indent="0">
+              <a:buNone/>
+            </a:pPr>
+            <a:r>
+              <a:rPr lang="en-GB" sz="1400" dirty="0">
+                <a:latin typeface="Arial" panose="020B0604020202020204" pitchFamily="34" charset="0"/>
+                <a:cs typeface="Arial" panose="020B0604020202020204" pitchFamily="34" charset="0"/>
+              </a:rPr>
+              <a:t>  interaction {</a:t>
+            </a:r>
+          </a:p>
+          <a:p>
+            <a:pPr marL="0" indent="0">
+              <a:buNone/>
+            </a:pPr>
+            <a:r>
+              <a:rPr lang="en-GB" sz="1400" dirty="0">
+                <a:latin typeface="Arial" panose="020B0604020202020204" pitchFamily="34" charset="0"/>
+                <a:cs typeface="Arial" panose="020B0604020202020204" pitchFamily="34" charset="0"/>
+              </a:rPr>
+              <a:t>              { _id </a:t>
+            </a:r>
+          </a:p>
+          <a:p>
+            <a:pPr marL="0" indent="0">
+              <a:buNone/>
+            </a:pPr>
+            <a:r>
+              <a:rPr lang="en-GB" sz="1400" dirty="0">
+                <a:latin typeface="Arial" panose="020B0604020202020204" pitchFamily="34" charset="0"/>
+                <a:cs typeface="Arial" panose="020B0604020202020204" pitchFamily="34" charset="0"/>
+              </a:rPr>
+              <a:t>                   name</a:t>
+            </a:r>
+          </a:p>
+          <a:p>
+            <a:pPr marL="0" indent="0">
+              <a:buNone/>
+            </a:pPr>
+            <a:r>
+              <a:rPr lang="en-GB" sz="1400" dirty="0">
+                <a:latin typeface="Arial" panose="020B0604020202020204" pitchFamily="34" charset="0"/>
+                <a:cs typeface="Arial" panose="020B0604020202020204" pitchFamily="34" charset="0"/>
+              </a:rPr>
+              <a:t>                   type:”</a:t>
+            </a:r>
+            <a:r>
+              <a:rPr lang="en-GB" sz="1400" dirty="0" err="1">
+                <a:latin typeface="Arial" panose="020B0604020202020204" pitchFamily="34" charset="0"/>
+                <a:cs typeface="Arial" panose="020B0604020202020204" pitchFamily="34" charset="0"/>
+              </a:rPr>
+              <a:t>iot:ChangePropertyAction</a:t>
+            </a:r>
+            <a:r>
+              <a:rPr lang="en-GB" sz="1400" dirty="0">
+                <a:latin typeface="Arial" panose="020B0604020202020204" pitchFamily="34" charset="0"/>
+                <a:cs typeface="Arial" panose="020B0604020202020204" pitchFamily="34" charset="0"/>
+              </a:rPr>
+              <a:t>”</a:t>
+            </a:r>
+          </a:p>
+          <a:p>
+            <a:pPr marL="0" indent="0">
+              <a:buNone/>
+            </a:pPr>
+            <a:r>
+              <a:rPr lang="en-GB" sz="1400" dirty="0">
+                <a:latin typeface="Arial" panose="020B0604020202020204" pitchFamily="34" charset="0"/>
+                <a:cs typeface="Arial" panose="020B0604020202020204" pitchFamily="34" charset="0"/>
+              </a:rPr>
+              <a:t>              }</a:t>
+            </a:r>
+          </a:p>
+          <a:p>
+            <a:pPr marL="0" indent="0">
+              <a:buNone/>
+            </a:pPr>
+            <a:r>
+              <a:rPr lang="en-GB" sz="1400" dirty="0">
+                <a:latin typeface="Arial" panose="020B0604020202020204" pitchFamily="34" charset="0"/>
+                <a:cs typeface="Arial" panose="020B0604020202020204" pitchFamily="34" charset="0"/>
+              </a:rPr>
+              <a:t>  }</a:t>
+            </a:r>
+          </a:p>
+          <a:p>
+            <a:pPr marL="0" indent="0">
+              <a:buNone/>
+            </a:pPr>
+            <a:r>
+              <a:rPr lang="en-GB" sz="1400" dirty="0">
+                <a:latin typeface="Arial" panose="020B0604020202020204" pitchFamily="34" charset="0"/>
+                <a:cs typeface="Arial" panose="020B0604020202020204" pitchFamily="34" charset="0"/>
+              </a:rPr>
+              <a:t>}</a:t>
+            </a:r>
+          </a:p>
+          <a:p>
+            <a:pPr marL="0" indent="0">
+              <a:buNone/>
+            </a:pPr>
+            <a:r>
+              <a:rPr lang="en-GB" sz="1400" dirty="0">
+                <a:latin typeface="Arial" panose="020B0604020202020204" pitchFamily="34" charset="0"/>
+                <a:cs typeface="Arial" panose="020B0604020202020204" pitchFamily="34" charset="0"/>
+              </a:rPr>
+              <a:t>               </a:t>
+            </a:r>
+            <a:endParaRPr lang="en-US" sz="1400" dirty="0">
+              <a:latin typeface="Arial" panose="020B0604020202020204" pitchFamily="34" charset="0"/>
+              <a:cs typeface="Arial" panose="020B0604020202020204" pitchFamily="34" charset="0"/>
+            </a:endParaRPr>
+          </a:p>
+        </p:txBody>
+      </p:sp>
+      <p:sp>
+        <p:nvSpPr>
+          <p:cNvPr id="4" name="Content Placeholder 2">
+            <a:extLst>
+              <a:ext uri="{FF2B5EF4-FFF2-40B4-BE49-F238E27FC236}">
+                <a16:creationId xmlns:a16="http://schemas.microsoft.com/office/drawing/2014/main" id="{3C0E0BD4-4E8D-3548-BE4D-B1D5C30FC27C}"/>
+              </a:ext>
+            </a:extLst>
+          </p:cNvPr>
+          <p:cNvSpPr txBox="1">
+            <a:spLocks/>
+          </p:cNvSpPr>
+          <p:nvPr/>
+        </p:nvSpPr>
+        <p:spPr>
+          <a:xfrm>
+            <a:off x="4572000" y="1840429"/>
+            <a:ext cx="4572000" cy="3586584"/>
+          </a:xfrm>
+          <a:prstGeom prst="rect">
+            <a:avLst/>
+          </a:prstGeom>
+          <a:ln>
+            <a:solidFill>
+              <a:schemeClr val="accent1"/>
+            </a:solidFill>
+          </a:ln>
+        </p:spPr>
+        <p:txBody>
+          <a:bodyPr vert="horz" lIns="91440" tIns="45720" rIns="91440" bIns="45720" rtlCol="0">
+            <a:normAutofit/>
+          </a:bodyPr>
+          <a:lstStyle>
+            <a:lvl1pPr marL="342900" indent="-342900" algn="l" defTabSz="914400" rtl="0" eaLnBrk="1" latinLnBrk="0" hangingPunct="1">
+              <a:spcBef>
+                <a:spcPct val="20000"/>
+              </a:spcBef>
+              <a:buFont typeface="Arial" pitchFamily="34" charset="0"/>
+              <a:buChar char="•"/>
+              <a:defRPr sz="3200" kern="1200">
+                <a:solidFill>
+                  <a:schemeClr val="tx1"/>
+                </a:solidFill>
+                <a:latin typeface="+mn-lt"/>
+                <a:ea typeface="+mn-ea"/>
+                <a:cs typeface="+mn-cs"/>
+              </a:defRPr>
+            </a:lvl1pPr>
+            <a:lvl2pPr marL="742950" indent="-285750" algn="l" defTabSz="914400" rtl="0" eaLnBrk="1" latinLnBrk="0" hangingPunct="1">
+              <a:spcBef>
+                <a:spcPct val="20000"/>
+              </a:spcBef>
+              <a:buFont typeface="Arial" pitchFamily="34" charset="0"/>
+              <a:buChar char="–"/>
+              <a:defRPr sz="2800" kern="1200">
+                <a:solidFill>
+                  <a:schemeClr val="tx1"/>
+                </a:solidFill>
+                <a:latin typeface="+mn-lt"/>
+                <a:ea typeface="+mn-ea"/>
+                <a:cs typeface="+mn-cs"/>
+              </a:defRPr>
+            </a:lvl2pPr>
+            <a:lvl3pPr marL="1143000" indent="-228600" algn="l" defTabSz="914400" rtl="0" eaLnBrk="1" latinLnBrk="0" hangingPunct="1">
+              <a:spcBef>
+                <a:spcPct val="20000"/>
+              </a:spcBef>
+              <a:buFont typeface="Arial" pitchFamily="34" charset="0"/>
+              <a:buChar char="•"/>
+              <a:defRPr sz="2400" kern="1200">
+                <a:solidFill>
+                  <a:schemeClr val="tx1"/>
+                </a:solidFill>
+                <a:latin typeface="+mn-lt"/>
+                <a:ea typeface="+mn-ea"/>
+                <a:cs typeface="+mn-cs"/>
+              </a:defRPr>
+            </a:lvl3pPr>
+            <a:lvl4pPr marL="1600200" indent="-228600" algn="l" defTabSz="914400" rtl="0" eaLnBrk="1" latinLnBrk="0" hangingPunct="1">
+              <a:spcBef>
+                <a:spcPct val="20000"/>
+              </a:spcBef>
+              <a:buFont typeface="Arial" pitchFamily="34" charset="0"/>
+              <a:buChar char="–"/>
+              <a:defRPr sz="2000" kern="1200">
+                <a:solidFill>
+                  <a:schemeClr val="tx1"/>
+                </a:solidFill>
+                <a:latin typeface="+mn-lt"/>
+                <a:ea typeface="+mn-ea"/>
+                <a:cs typeface="+mn-cs"/>
+              </a:defRPr>
+            </a:lvl4pPr>
+            <a:lvl5pPr marL="2057400" indent="-228600" algn="l" defTabSz="914400" rtl="0" eaLnBrk="1" latinLnBrk="0" hangingPunct="1">
+              <a:spcBef>
+                <a:spcPct val="20000"/>
+              </a:spcBef>
+              <a:buFont typeface="Arial" pitchFamily="34" charset="0"/>
+              <a:buChar char="»"/>
+              <a:defRPr sz="2000" kern="1200">
+                <a:solidFill>
+                  <a:schemeClr val="tx1"/>
+                </a:solidFill>
+                <a:latin typeface="+mn-lt"/>
+                <a:ea typeface="+mn-ea"/>
+                <a:cs typeface="+mn-cs"/>
+              </a:defRPr>
+            </a:lvl5pPr>
+            <a:lvl6pPr marL="2514600" indent="-228600" algn="l" defTabSz="914400" rtl="0" eaLnBrk="1" latinLnBrk="0" hangingPunct="1">
+              <a:spcBef>
+                <a:spcPct val="20000"/>
+              </a:spcBef>
+              <a:buFont typeface="Arial" pitchFamily="34" charset="0"/>
+              <a:buChar char="•"/>
+              <a:defRPr sz="2000" kern="1200">
+                <a:solidFill>
+                  <a:schemeClr val="tx1"/>
+                </a:solidFill>
+                <a:latin typeface="+mn-lt"/>
+                <a:ea typeface="+mn-ea"/>
+                <a:cs typeface="+mn-cs"/>
+              </a:defRPr>
+            </a:lvl6pPr>
+            <a:lvl7pPr marL="2971800" indent="-228600" algn="l" defTabSz="914400" rtl="0" eaLnBrk="1" latinLnBrk="0" hangingPunct="1">
+              <a:spcBef>
+                <a:spcPct val="20000"/>
+              </a:spcBef>
+              <a:buFont typeface="Arial" pitchFamily="34" charset="0"/>
+              <a:buChar char="•"/>
+              <a:defRPr sz="2000" kern="1200">
+                <a:solidFill>
+                  <a:schemeClr val="tx1"/>
+                </a:solidFill>
+                <a:latin typeface="+mn-lt"/>
+                <a:ea typeface="+mn-ea"/>
+                <a:cs typeface="+mn-cs"/>
+              </a:defRPr>
+            </a:lvl7pPr>
+            <a:lvl8pPr marL="3429000" indent="-228600" algn="l" defTabSz="914400" rtl="0" eaLnBrk="1" latinLnBrk="0" hangingPunct="1">
+              <a:spcBef>
+                <a:spcPct val="20000"/>
+              </a:spcBef>
+              <a:buFont typeface="Arial" pitchFamily="34" charset="0"/>
+              <a:buChar char="•"/>
+              <a:defRPr sz="2000" kern="1200">
+                <a:solidFill>
+                  <a:schemeClr val="tx1"/>
+                </a:solidFill>
+                <a:latin typeface="+mn-lt"/>
+                <a:ea typeface="+mn-ea"/>
+                <a:cs typeface="+mn-cs"/>
+              </a:defRPr>
+            </a:lvl8pPr>
+            <a:lvl9pPr marL="3886200" indent="-228600" algn="l" defTabSz="914400" rtl="0" eaLnBrk="1" latinLnBrk="0" hangingPunct="1">
+              <a:spcBef>
+                <a:spcPct val="20000"/>
+              </a:spcBef>
+              <a:buFont typeface="Arial" pitchFamily="34" charset="0"/>
+              <a:buChar char="•"/>
+              <a:defRPr sz="2000" kern="1200">
+                <a:solidFill>
+                  <a:schemeClr val="tx1"/>
+                </a:solidFill>
+                <a:latin typeface="+mn-lt"/>
+                <a:ea typeface="+mn-ea"/>
+                <a:cs typeface="+mn-cs"/>
+              </a:defRPr>
+            </a:lvl9pPr>
+          </a:lstStyle>
+          <a:p>
+            <a:pPr marL="0" indent="0">
+              <a:buNone/>
+            </a:pPr>
+            <a:r>
+              <a:rPr lang="en-GB" sz="1400" dirty="0">
+                <a:latin typeface="Arial" panose="020B0604020202020204" pitchFamily="34" charset="0"/>
+                <a:cs typeface="Arial" panose="020B0604020202020204" pitchFamily="34" charset="0"/>
+              </a:rPr>
+              <a:t>Select ?thing ?interaction ?name</a:t>
+            </a:r>
+          </a:p>
+          <a:p>
+            <a:pPr marL="0" indent="0">
+              <a:buFont typeface="Arial" pitchFamily="34" charset="0"/>
+              <a:buNone/>
+            </a:pPr>
+            <a:r>
+              <a:rPr lang="en-GB" sz="1400" dirty="0">
+                <a:latin typeface="Arial" panose="020B0604020202020204" pitchFamily="34" charset="0"/>
+                <a:cs typeface="Arial" panose="020B0604020202020204" pitchFamily="34" charset="0"/>
+              </a:rPr>
+              <a:t>WHERE{</a:t>
+            </a:r>
+          </a:p>
+          <a:p>
+            <a:pPr marL="0" indent="0">
+              <a:buFont typeface="Arial" pitchFamily="34" charset="0"/>
+              <a:buNone/>
+            </a:pPr>
+            <a:r>
+              <a:rPr lang="en-GB" sz="1400" dirty="0">
+                <a:latin typeface="Arial" panose="020B0604020202020204" pitchFamily="34" charset="0"/>
+                <a:cs typeface="Arial" panose="020B0604020202020204" pitchFamily="34" charset="0"/>
+              </a:rPr>
+              <a:t>   ?thing </a:t>
+            </a:r>
+            <a:r>
+              <a:rPr lang="en-GB" sz="1400" dirty="0" err="1">
+                <a:latin typeface="Arial" panose="020B0604020202020204" pitchFamily="34" charset="0"/>
+                <a:cs typeface="Arial" panose="020B0604020202020204" pitchFamily="34" charset="0"/>
+              </a:rPr>
+              <a:t>td:interaction</a:t>
+            </a:r>
+            <a:r>
+              <a:rPr lang="en-GB" sz="1400" dirty="0">
+                <a:latin typeface="Arial" panose="020B0604020202020204" pitchFamily="34" charset="0"/>
+                <a:cs typeface="Arial" panose="020B0604020202020204" pitchFamily="34" charset="0"/>
+              </a:rPr>
+              <a:t> ?interaction.</a:t>
+            </a:r>
+          </a:p>
+          <a:p>
+            <a:pPr marL="0" indent="0">
+              <a:buNone/>
+            </a:pPr>
+            <a:r>
+              <a:rPr lang="en-GB" sz="1400" dirty="0">
+                <a:latin typeface="Arial" panose="020B0604020202020204" pitchFamily="34" charset="0"/>
+                <a:cs typeface="Arial" panose="020B0604020202020204" pitchFamily="34" charset="0"/>
+              </a:rPr>
+              <a:t>    ?interaction a </a:t>
+            </a:r>
+            <a:r>
+              <a:rPr lang="en-GB" sz="1400" dirty="0" err="1">
+                <a:latin typeface="Arial" panose="020B0604020202020204" pitchFamily="34" charset="0"/>
+                <a:cs typeface="Arial" panose="020B0604020202020204" pitchFamily="34" charset="0"/>
+              </a:rPr>
+              <a:t>iot</a:t>
+            </a:r>
+            <a:r>
+              <a:rPr lang="en-GB" sz="1400" dirty="0">
+                <a:latin typeface="Arial" panose="020B0604020202020204" pitchFamily="34" charset="0"/>
+                <a:cs typeface="Arial" panose="020B0604020202020204" pitchFamily="34" charset="0"/>
+              </a:rPr>
+              <a:t>: </a:t>
+            </a:r>
+            <a:r>
+              <a:rPr lang="en-GB" sz="1400" dirty="0" err="1">
+                <a:latin typeface="Arial" panose="020B0604020202020204" pitchFamily="34" charset="0"/>
+                <a:cs typeface="Arial" panose="020B0604020202020204" pitchFamily="34" charset="0"/>
+              </a:rPr>
+              <a:t>ChangePropertyAction</a:t>
+            </a:r>
+            <a:r>
+              <a:rPr lang="en-GB" sz="1400" dirty="0">
+                <a:latin typeface="Arial" panose="020B0604020202020204" pitchFamily="34" charset="0"/>
+                <a:cs typeface="Arial" panose="020B0604020202020204" pitchFamily="34" charset="0"/>
+              </a:rPr>
+              <a:t>;</a:t>
+            </a:r>
+          </a:p>
+          <a:p>
+            <a:pPr marL="0" indent="0">
+              <a:buNone/>
+            </a:pPr>
+            <a:r>
+              <a:rPr lang="en-GB" sz="1400" dirty="0">
+                <a:latin typeface="Arial" panose="020B0604020202020204" pitchFamily="34" charset="0"/>
+                <a:cs typeface="Arial" panose="020B0604020202020204" pitchFamily="34" charset="0"/>
+              </a:rPr>
+              <a:t>	    </a:t>
+            </a:r>
+            <a:r>
+              <a:rPr lang="en-GB" sz="1400" dirty="0" err="1">
+                <a:latin typeface="Arial" panose="020B0604020202020204" pitchFamily="34" charset="0"/>
+                <a:cs typeface="Arial" panose="020B0604020202020204" pitchFamily="34" charset="0"/>
+              </a:rPr>
+              <a:t>td:name</a:t>
+            </a:r>
+            <a:r>
+              <a:rPr lang="en-GB" sz="1400" dirty="0">
+                <a:latin typeface="Arial" panose="020B0604020202020204" pitchFamily="34" charset="0"/>
+                <a:cs typeface="Arial" panose="020B0604020202020204" pitchFamily="34" charset="0"/>
+              </a:rPr>
+              <a:t> ?name.</a:t>
+            </a:r>
+          </a:p>
+          <a:p>
+            <a:pPr marL="0" indent="0">
+              <a:buNone/>
+            </a:pPr>
+            <a:r>
+              <a:rPr lang="en-GB" sz="1400" dirty="0">
+                <a:latin typeface="Arial" panose="020B0604020202020204" pitchFamily="34" charset="0"/>
+                <a:cs typeface="Arial" panose="020B0604020202020204" pitchFamily="34" charset="0"/>
+              </a:rPr>
+              <a:t>} </a:t>
+            </a:r>
+          </a:p>
+          <a:p>
+            <a:pPr marL="0" indent="0">
+              <a:buFont typeface="Arial" pitchFamily="34" charset="0"/>
+              <a:buNone/>
+            </a:pPr>
+            <a:endParaRPr lang="en-GB" sz="1400" dirty="0">
+              <a:latin typeface="Arial" panose="020B0604020202020204" pitchFamily="34" charset="0"/>
+              <a:cs typeface="Arial" panose="020B0604020202020204" pitchFamily="34" charset="0"/>
+            </a:endParaRPr>
+          </a:p>
+          <a:p>
+            <a:pPr marL="0" indent="0">
+              <a:buFont typeface="Arial" pitchFamily="34" charset="0"/>
+              <a:buNone/>
+            </a:pPr>
+            <a:r>
+              <a:rPr lang="en-GB" sz="1400" dirty="0">
+                <a:latin typeface="Arial" panose="020B0604020202020204" pitchFamily="34" charset="0"/>
+                <a:cs typeface="Arial" panose="020B0604020202020204" pitchFamily="34" charset="0"/>
+              </a:rPr>
+              <a:t>               </a:t>
+            </a:r>
+            <a:endParaRPr lang="en-US" sz="1400" dirty="0">
+              <a:latin typeface="Arial" panose="020B0604020202020204" pitchFamily="34" charset="0"/>
+              <a:cs typeface="Arial" panose="020B0604020202020204" pitchFamily="34" charset="0"/>
+            </a:endParaRPr>
+          </a:p>
+        </p:txBody>
+      </p:sp>
+      <p:sp>
+        <p:nvSpPr>
+          <p:cNvPr id="5" name="TextBox 4">
+            <a:extLst>
+              <a:ext uri="{FF2B5EF4-FFF2-40B4-BE49-F238E27FC236}">
+                <a16:creationId xmlns:a16="http://schemas.microsoft.com/office/drawing/2014/main" id="{4150CEFC-AC32-6342-BFFF-7E5C47BE5FDB}"/>
+              </a:ext>
+            </a:extLst>
+          </p:cNvPr>
+          <p:cNvSpPr txBox="1"/>
+          <p:nvPr/>
+        </p:nvSpPr>
+        <p:spPr>
+          <a:xfrm>
+            <a:off x="683568" y="5576058"/>
+            <a:ext cx="8460432" cy="1200329"/>
+          </a:xfrm>
+          <a:prstGeom prst="rect">
+            <a:avLst/>
+          </a:prstGeom>
+          <a:noFill/>
+          <a:ln>
+            <a:solidFill>
+              <a:schemeClr val="accent1"/>
+            </a:solidFill>
+            <a:prstDash val="sysDot"/>
+          </a:ln>
+        </p:spPr>
+        <p:txBody>
+          <a:bodyPr wrap="square" rtlCol="0">
+            <a:spAutoFit/>
+          </a:bodyPr>
+          <a:lstStyle/>
+          <a:p>
+            <a:r>
+              <a:rPr lang="en-US" dirty="0"/>
+              <a:t>Discover the things that can provide interaction </a:t>
+            </a:r>
+            <a:r>
+              <a:rPr lang="en-US" b="1" i="1" dirty="0"/>
+              <a:t>that is subtype of an Abstract type</a:t>
+            </a:r>
+            <a:r>
+              <a:rPr lang="en-US" dirty="0"/>
+              <a:t>:</a:t>
+            </a:r>
+          </a:p>
+          <a:p>
+            <a:r>
+              <a:rPr lang="en-US" dirty="0"/>
+              <a:t>- All interactions with following subtypes of </a:t>
+            </a:r>
+            <a:r>
+              <a:rPr lang="en-US" dirty="0" err="1"/>
+              <a:t>ChangePropertyAction</a:t>
+            </a:r>
+            <a:r>
+              <a:rPr lang="en-US" dirty="0"/>
+              <a:t>: </a:t>
+            </a:r>
+            <a:r>
+              <a:rPr lang="en-US" dirty="0" err="1"/>
+              <a:t>ChangeTargetTemperature</a:t>
+            </a:r>
+            <a:r>
+              <a:rPr lang="en-US" dirty="0"/>
+              <a:t>, </a:t>
+            </a:r>
+            <a:r>
+              <a:rPr lang="en-US" dirty="0" err="1"/>
+              <a:t>ChangeSwitchStatusChange</a:t>
+            </a:r>
+            <a:r>
+              <a:rPr lang="en-US" dirty="0"/>
+              <a:t>, </a:t>
+            </a:r>
+            <a:r>
+              <a:rPr lang="en-US" dirty="0" err="1"/>
+              <a:t>MotionDetectedExt</a:t>
+            </a:r>
+            <a:r>
+              <a:rPr lang="en-US" dirty="0"/>
+              <a:t>, </a:t>
+            </a:r>
+            <a:r>
+              <a:rPr lang="en-US" dirty="0" err="1"/>
+              <a:t>ChangeOperationStatus</a:t>
+            </a:r>
+            <a:r>
+              <a:rPr lang="en-US" dirty="0"/>
+              <a:t>, </a:t>
+            </a:r>
+            <a:r>
+              <a:rPr lang="en-US" dirty="0" err="1"/>
+              <a:t>ChangeTargetHumidity</a:t>
+            </a:r>
+            <a:r>
+              <a:rPr lang="en-US" dirty="0"/>
+              <a:t>, </a:t>
+            </a:r>
+            <a:r>
+              <a:rPr lang="en-US" dirty="0" err="1"/>
+              <a:t>ChangeCurrentColour</a:t>
+            </a:r>
+            <a:r>
+              <a:rPr lang="en-US" dirty="0"/>
+              <a:t>, </a:t>
+            </a:r>
+            <a:r>
+              <a:rPr lang="en-US" dirty="0" err="1"/>
+              <a:t>etc</a:t>
+            </a:r>
+            <a:r>
+              <a:rPr lang="en-US" dirty="0"/>
+              <a:t>,</a:t>
+            </a:r>
+          </a:p>
+        </p:txBody>
+      </p:sp>
+      <p:sp>
+        <p:nvSpPr>
+          <p:cNvPr id="6" name="TextBox 5">
+            <a:extLst>
+              <a:ext uri="{FF2B5EF4-FFF2-40B4-BE49-F238E27FC236}">
+                <a16:creationId xmlns:a16="http://schemas.microsoft.com/office/drawing/2014/main" id="{58C04354-F247-0140-8D40-930E2A67B0F9}"/>
+              </a:ext>
+            </a:extLst>
+          </p:cNvPr>
+          <p:cNvSpPr txBox="1"/>
+          <p:nvPr/>
+        </p:nvSpPr>
+        <p:spPr>
+          <a:xfrm>
+            <a:off x="1763688" y="1417638"/>
+            <a:ext cx="1013483" cy="369332"/>
+          </a:xfrm>
+          <a:prstGeom prst="rect">
+            <a:avLst/>
+          </a:prstGeom>
+          <a:noFill/>
+        </p:spPr>
+        <p:txBody>
+          <a:bodyPr wrap="none" rtlCol="0">
+            <a:spAutoFit/>
+          </a:bodyPr>
+          <a:lstStyle/>
+          <a:p>
+            <a:r>
+              <a:rPr lang="en-US" dirty="0" err="1"/>
+              <a:t>GraphQL</a:t>
+            </a:r>
+            <a:endParaRPr lang="en-US" dirty="0"/>
+          </a:p>
+        </p:txBody>
+      </p:sp>
+      <p:sp>
+        <p:nvSpPr>
+          <p:cNvPr id="7" name="TextBox 6">
+            <a:extLst>
+              <a:ext uri="{FF2B5EF4-FFF2-40B4-BE49-F238E27FC236}">
+                <a16:creationId xmlns:a16="http://schemas.microsoft.com/office/drawing/2014/main" id="{AED8852C-3E8C-134C-8E9A-05597FB76F8B}"/>
+              </a:ext>
+            </a:extLst>
+          </p:cNvPr>
+          <p:cNvSpPr txBox="1"/>
+          <p:nvPr/>
+        </p:nvSpPr>
+        <p:spPr>
+          <a:xfrm>
+            <a:off x="6444208" y="1277512"/>
+            <a:ext cx="901209" cy="369332"/>
+          </a:xfrm>
+          <a:prstGeom prst="rect">
+            <a:avLst/>
+          </a:prstGeom>
+          <a:noFill/>
+        </p:spPr>
+        <p:txBody>
+          <a:bodyPr wrap="none" rtlCol="0">
+            <a:spAutoFit/>
+          </a:bodyPr>
+          <a:lstStyle/>
+          <a:p>
+            <a:r>
+              <a:rPr lang="en-US" dirty="0"/>
+              <a:t>SPARQL</a:t>
+            </a:r>
+          </a:p>
+        </p:txBody>
+      </p:sp>
+    </p:spTree>
+    <p:extLst>
+      <p:ext uri="{BB962C8B-B14F-4D97-AF65-F5344CB8AC3E}">
+        <p14:creationId xmlns:p14="http://schemas.microsoft.com/office/powerpoint/2010/main" val="2817985432"/>
+      </p:ext>
+    </p:extLst>
+  </p:cSld>
+  <p:clrMapOvr>
+    <a:masterClrMapping/>
+  </p:clrMapOvr>
 </p:sld>
 </file>
 
@@ -3178,7 +5443,7 @@
           <a:lstStyle/>
           <a:p>
             <a:r>
-              <a:rPr lang="de-DE" dirty="0" err="1" smtClean="0"/>
+              <a:rPr lang="de-DE" dirty="0" err="1"/>
               <a:t>Scope</a:t>
             </a:r>
             <a:endParaRPr lang="de-DE" dirty="0"/>
@@ -3201,36 +5466,36 @@
           <a:lstStyle/>
           <a:p>
             <a:r>
-              <a:rPr lang="en-US" dirty="0" smtClean="0"/>
+              <a:rPr lang="en-US" dirty="0"/>
               <a:t>Preparation for W3C WoT Prague </a:t>
             </a:r>
             <a:r>
-              <a:rPr lang="en-US" dirty="0" err="1" smtClean="0"/>
+              <a:rPr lang="en-US" dirty="0" err="1"/>
               <a:t>Plugfest</a:t>
             </a:r>
             <a:r>
-              <a:rPr lang="en-US" dirty="0" smtClean="0"/>
+              <a:rPr lang="en-US" dirty="0"/>
               <a:t> </a:t>
             </a:r>
             <a:r>
-              <a:rPr lang="en-US" dirty="0" err="1" smtClean="0"/>
+              <a:rPr lang="en-US" dirty="0" err="1"/>
               <a:t>w.r.t</a:t>
             </a:r>
             <a:r>
-              <a:rPr lang="en-US" dirty="0" smtClean="0"/>
+              <a:rPr lang="en-US" dirty="0"/>
               <a:t> Semantic Integration</a:t>
             </a:r>
           </a:p>
           <a:p>
             <a:r>
-              <a:rPr lang="en-US" dirty="0" smtClean="0"/>
+              <a:rPr lang="en-US" dirty="0"/>
               <a:t>The slides are to be continually updated (mostly in the scope of TF-LD Web meetings) in order </a:t>
             </a:r>
             <a:r>
-              <a:rPr lang="en-US" smtClean="0"/>
+              <a:rPr lang="en-US"/>
               <a:t>to demonstrate Semantic Integration</a:t>
             </a:r>
-            <a:endParaRPr lang="en-US" dirty="0" smtClean="0"/>
+            <a:endParaRPr lang="en-US" dirty="0"/>
           </a:p>
           <a:p>
             <a:endParaRPr lang="de-DE" dirty="0"/>
@@ -3278,10 +5543,9 @@
           <a:lstStyle/>
           <a:p>
             <a:r>
-              <a:rPr lang="de-DE" dirty="0" smtClean="0"/>
+              <a:rPr lang="de-DE" dirty="0"/>
               <a:t>Goal</a:t>
             </a:r>
-            <a:endParaRPr lang="de-DE" dirty="0"/>
           </a:p>
         </p:txBody>
       </p:sp>
@@ -3301,22 +5565,14 @@
           <a:lstStyle/>
           <a:p>
             <a:r>
-              <a:rPr lang="en-US" dirty="0" smtClean="0"/>
-              <a:t>What is the goal related to </a:t>
-            </a:r>
-            <a:r>
               <a:rPr lang="en-US" dirty="0"/>
-              <a:t>s</a:t>
-            </a:r>
-            <a:r>
-              <a:rPr lang="en-US" dirty="0" smtClean="0"/>
-              <a:t>emantic interoperability that we want to demonstrate?</a:t>
+              <a:t>What is the goal related to semantic interoperability that we want to demonstrate?</a:t>
             </a:r>
           </a:p>
           <a:p>
             <a:pPr lvl="1"/>
             <a:r>
-              <a:rPr lang="en-US" dirty="0" smtClean="0"/>
+              <a:rPr lang="en-US" dirty="0"/>
               <a:t>Define what it means to achieve semantic interoperability in a concrete scenario.</a:t>
             </a:r>
           </a:p>
@@ -3333,13 +5589,6 @@
   <p:clrMapOvr>
     <a:masterClrMapping/>
   </p:clrMapOvr>
-  <p:timing>
-    <p:tnLst>
-      <p:par>
-        <p:cTn id="1" dur="indefinite" restart="never" nodeType="tmRoot"/>
-      </p:par>
-    </p:tnLst>
-  </p:timing>
 </p:sld>
 </file>
 
@@ -3378,10 +5627,9 @@
           <a:lstStyle/>
           <a:p>
             <a:r>
-              <a:rPr lang="en-US" dirty="0" smtClean="0"/>
+              <a:rPr lang="en-US" dirty="0"/>
               <a:t>Guideline for semantic interoperability</a:t>
             </a:r>
-            <a:endParaRPr lang="en-US" dirty="0"/>
           </a:p>
         </p:txBody>
       </p:sp>
@@ -3403,20 +5651,8 @@
           <a:lstStyle/>
           <a:p>
             <a:r>
-              <a:rPr lang="en-US" dirty="0" smtClean="0"/>
-              <a:t>The </a:t>
-            </a:r>
-            <a:r>
               <a:rPr lang="en-US" dirty="0"/>
-              <a:t>minimum sets of the </a:t>
-            </a:r>
-            <a:r>
-              <a:rPr lang="en-US" dirty="0" smtClean="0"/>
-              <a:t>requirements that </a:t>
-            </a:r>
-            <a:r>
-              <a:rPr lang="en-US" dirty="0"/>
-              <a:t>the </a:t>
+              <a:t>The minimum sets of the requirements that the </a:t>
             </a:r>
             <a:r>
               <a:rPr lang="en-US" dirty="0" err="1"/>
@@ -3424,57 +5660,45 @@
             </a:r>
             <a:r>
               <a:rPr lang="en-US" dirty="0"/>
-              <a:t> participants have </a:t>
-            </a:r>
-            <a:r>
-              <a:rPr lang="en-US" dirty="0" smtClean="0"/>
-              <a:t>to meet in order to demonstrate semantic integration</a:t>
+              <a:t> participants have to meet in order to demonstrate semantic integration</a:t>
             </a:r>
           </a:p>
           <a:p>
             <a:pPr lvl="1"/>
             <a:r>
-              <a:rPr lang="en-US" dirty="0" smtClean="0"/>
-              <a:t>Template with available things, TDs </a:t>
-            </a:r>
-            <a:r>
               <a:rPr lang="en-US" dirty="0"/>
-              <a:t>e</a:t>
-            </a:r>
-            <a:r>
-              <a:rPr lang="en-US" dirty="0" smtClean="0"/>
-              <a:t>tc.</a:t>
-            </a:r>
-          </a:p>
-          <a:p>
-            <a:r>
-              <a:rPr lang="en-US" dirty="0" smtClean="0"/>
+              <a:t>Template with available things, TDs etc.</a:t>
+            </a:r>
+          </a:p>
+          <a:p>
+            <a:r>
+              <a:rPr lang="en-US" dirty="0"/>
               <a:t>Requirements for iot.schema.org</a:t>
             </a:r>
           </a:p>
           <a:p>
             <a:pPr lvl="1"/>
             <a:r>
-              <a:rPr lang="en-US" dirty="0" smtClean="0"/>
+              <a:rPr lang="en-US" dirty="0"/>
               <a:t>Required Capabilities, shapes etc.</a:t>
             </a:r>
           </a:p>
           <a:p>
             <a:r>
-              <a:rPr lang="en-US" dirty="0" smtClean="0"/>
+              <a:rPr lang="en-US" dirty="0"/>
               <a:t>Requirements for TD Directory</a:t>
             </a:r>
           </a:p>
           <a:p>
             <a:pPr lvl="1"/>
             <a:r>
-              <a:rPr lang="en-US" dirty="0" smtClean="0"/>
+              <a:rPr lang="en-US" dirty="0"/>
               <a:t>Any improvement on usability</a:t>
             </a:r>
           </a:p>
           <a:p>
             <a:r>
-              <a:rPr lang="en-US" dirty="0" smtClean="0"/>
+              <a:rPr lang="en-US" dirty="0"/>
               <a:t>Other requirements?</a:t>
             </a:r>
           </a:p>
@@ -3488,13 +5712,6 @@
   <p:clrMapOvr>
     <a:masterClrMapping/>
   </p:clrMapOvr>
-  <p:timing>
-    <p:tnLst>
-      <p:par>
-        <p:cTn id="1" dur="indefinite" restart="never" nodeType="tmRoot"/>
-      </p:par>
-    </p:tnLst>
-  </p:timing>
 </p:sld>
 </file>
 
@@ -3531,10 +5748,9 @@
           <a:lstStyle/>
           <a:p>
             <a:r>
-              <a:rPr lang="en-US" dirty="0" smtClean="0"/>
+              <a:rPr lang="en-US" dirty="0"/>
               <a:t>Further proposals</a:t>
             </a:r>
-            <a:endParaRPr lang="en-US" dirty="0"/>
           </a:p>
         </p:txBody>
       </p:sp>
@@ -3554,19 +5770,19 @@
           <a:lstStyle/>
           <a:p>
             <a:r>
-              <a:rPr lang="en-US" dirty="0" smtClean="0"/>
+              <a:rPr lang="en-US" dirty="0"/>
               <a:t>On-line participants invited</a:t>
             </a:r>
           </a:p>
           <a:p>
             <a:r>
-              <a:rPr lang="en-US" dirty="0" smtClean="0"/>
+              <a:rPr lang="en-US" dirty="0"/>
               <a:t>Involve participants from OCF etc.</a:t>
             </a:r>
           </a:p>
           <a:p>
             <a:r>
-              <a:rPr lang="en-US" dirty="0" smtClean="0"/>
+              <a:rPr lang="en-US" dirty="0"/>
               <a:t>…</a:t>
             </a:r>
           </a:p>
@@ -3580,13 +5796,6 @@
   <p:clrMapOvr>
     <a:masterClrMapping/>
   </p:clrMapOvr>
-  <p:timing>
-    <p:tnLst>
-      <p:par>
-        <p:cTn id="1" dur="indefinite" restart="never" nodeType="tmRoot"/>
-      </p:par>
-    </p:tnLst>
-  </p:timing>
 </p:sld>
 </file>
 
@@ -3623,10 +5832,9 @@
           <a:lstStyle/>
           <a:p>
             <a:r>
-              <a:rPr lang="en-US" dirty="0" smtClean="0"/>
+              <a:rPr lang="en-US" dirty="0"/>
               <a:t>Next Steps</a:t>
             </a:r>
-            <a:endParaRPr lang="en-US" dirty="0"/>
           </a:p>
         </p:txBody>
       </p:sp>
@@ -3652,7 +5860,7 @@
               <a:buAutoNum type="arabicPeriod"/>
             </a:pPr>
             <a:r>
-              <a:rPr lang="en-US" dirty="0" smtClean="0"/>
+              <a:rPr lang="en-US" dirty="0"/>
               <a:t>Define a set of scenarios that can be implemented with available things (TDs)</a:t>
             </a:r>
           </a:p>
@@ -3662,15 +5870,15 @@
               <a:buAutoNum type="arabicPeriod"/>
             </a:pPr>
             <a:r>
-              <a:rPr lang="en-US" dirty="0" smtClean="0"/>
+              <a:rPr lang="en-US" dirty="0"/>
               <a:t>Extend scenarios into WoT challenges, which in order to be implemented require </a:t>
             </a:r>
             <a:r>
-              <a:rPr lang="en-US" b="1" dirty="0" smtClean="0"/>
+              <a:rPr lang="en-US" b="1" dirty="0"/>
               <a:t>semantic integration</a:t>
             </a:r>
             <a:r>
-              <a:rPr lang="en-US" dirty="0" smtClean="0"/>
+              <a:rPr lang="en-US" dirty="0"/>
               <a:t>  </a:t>
             </a:r>
           </a:p>
@@ -3680,7 +5888,7 @@
               <a:buAutoNum type="arabicPeriod"/>
             </a:pPr>
             <a:r>
-              <a:rPr lang="en-US" dirty="0" smtClean="0"/>
+              <a:rPr lang="en-US" dirty="0"/>
               <a:t>Provide semantic artifacts required for these scenarios, i.e., semantic queries, iot.schema.org Capabilities, Recipes etc.</a:t>
             </a:r>
           </a:p>
@@ -3697,13 +5905,6 @@
   <p:clrMapOvr>
     <a:masterClrMapping/>
   </p:clrMapOvr>
-  <p:timing>
-    <p:tnLst>
-      <p:par>
-        <p:cTn id="1" dur="indefinite" restart="never" nodeType="tmRoot"/>
-      </p:par>
-    </p:tnLst>
-  </p:timing>
 </p:sld>
 </file>
 
@@ -3742,11 +5943,11 @@
           <a:lstStyle/>
           <a:p>
             <a:r>
-              <a:rPr lang="de-DE" dirty="0" smtClean="0"/>
+              <a:rPr lang="de-DE" dirty="0"/>
               <a:t>Scenarios </a:t>
             </a:r>
             <a:r>
-              <a:rPr lang="en-US" dirty="0" smtClean="0"/>
+              <a:rPr lang="en-US" dirty="0"/>
               <a:t>that can be implemented with available things </a:t>
             </a:r>
             <a:endParaRPr lang="de-DE" dirty="0"/>
@@ -3774,7 +5975,7 @@
               <a:buNone/>
             </a:pPr>
             <a:r>
-              <a:rPr lang="en-US" sz="1600" dirty="0" smtClean="0"/>
+              <a:rPr lang="en-US" sz="1600" dirty="0"/>
               <a:t>1. An application which detects the motion in a room and controls the AC operation in  a room. </a:t>
             </a:r>
           </a:p>
@@ -3783,15 +5984,15 @@
               <a:buNone/>
             </a:pPr>
             <a:r>
-              <a:rPr lang="en-US" sz="1600" dirty="0" smtClean="0"/>
+              <a:rPr lang="en-US" sz="1600" dirty="0"/>
               <a:t>	Devices: air conditioner (Fujitsu and Panasonic), human detection sensor (Panasonic and </a:t>
             </a:r>
             <a:r>
-              <a:rPr lang="en-US" sz="1600" dirty="0" err="1" smtClean="0"/>
+              <a:rPr lang="en-US" sz="1600" dirty="0" err="1"/>
               <a:t>SmartThings</a:t>
             </a:r>
             <a:r>
-              <a:rPr lang="en-US" sz="1600" dirty="0" smtClean="0"/>
+              <a:rPr lang="en-US" sz="1600" dirty="0"/>
               <a:t>)</a:t>
             </a:r>
           </a:p>
@@ -3799,14 +6000,14 @@
             <a:pPr>
               <a:buNone/>
             </a:pPr>
-            <a:endParaRPr lang="en-US" sz="1600" dirty="0" smtClean="0"/>
+            <a:endParaRPr lang="en-US" sz="1600" dirty="0"/>
           </a:p>
           <a:p>
             <a:pPr>
               <a:buNone/>
             </a:pPr>
             <a:r>
-              <a:rPr lang="en-US" sz="1600" dirty="0" smtClean="0"/>
+              <a:rPr lang="en-US" sz="1600" dirty="0"/>
               <a:t>2. An application which controls the AC in  a room based on the room temperature.</a:t>
             </a:r>
           </a:p>
@@ -3815,23 +6016,23 @@
               <a:buNone/>
             </a:pPr>
             <a:r>
-              <a:rPr lang="en-US" sz="1600" dirty="0" smtClean="0"/>
+              <a:rPr lang="en-US" sz="1600" dirty="0"/>
               <a:t>	Devices: air conditioner (Fujitsu and Panasonic), temperature sensor (</a:t>
             </a:r>
             <a:r>
-              <a:rPr lang="en-US" sz="1600" dirty="0" err="1" smtClean="0"/>
+              <a:rPr lang="en-US" sz="1600" dirty="0" err="1"/>
               <a:t>Lemonbeat</a:t>
             </a:r>
             <a:r>
-              <a:rPr lang="en-US" sz="1600" dirty="0" smtClean="0"/>
+              <a:rPr lang="en-US" sz="1600" dirty="0"/>
               <a:t>, Intel, </a:t>
             </a:r>
             <a:r>
-              <a:rPr lang="en-US" sz="1600" dirty="0" err="1" smtClean="0"/>
+              <a:rPr lang="en-US" sz="1600" dirty="0" err="1"/>
               <a:t>SmartThings</a:t>
             </a:r>
             <a:r>
-              <a:rPr lang="en-US" sz="1600" dirty="0" smtClean="0"/>
+              <a:rPr lang="en-US" sz="1600" dirty="0"/>
               <a:t>)</a:t>
             </a:r>
           </a:p>
@@ -3839,14 +6040,14 @@
             <a:pPr>
               <a:buNone/>
             </a:pPr>
-            <a:endParaRPr lang="en-US" sz="1600" dirty="0" smtClean="0"/>
+            <a:endParaRPr lang="en-US" sz="1600" dirty="0"/>
           </a:p>
           <a:p>
             <a:pPr>
               <a:buNone/>
             </a:pPr>
             <a:r>
-              <a:rPr lang="en-US" sz="1600" dirty="0" smtClean="0"/>
+              <a:rPr lang="en-US" sz="1600" dirty="0"/>
               <a:t>3. An application which controls a lamp in  a room based on the brightness in the room.</a:t>
             </a:r>
           </a:p>
@@ -3855,31 +6056,31 @@
               <a:buNone/>
             </a:pPr>
             <a:r>
-              <a:rPr lang="en-US" sz="1600" dirty="0" smtClean="0"/>
+              <a:rPr lang="en-US" sz="1600" dirty="0"/>
               <a:t>	Devices: light (Fujitsu, Intel, </a:t>
             </a:r>
             <a:r>
-              <a:rPr lang="en-US" sz="1600" dirty="0" err="1" smtClean="0"/>
+              <a:rPr lang="en-US" sz="1600" dirty="0" err="1"/>
               <a:t>SmartThings</a:t>
             </a:r>
             <a:r>
-              <a:rPr lang="en-US" sz="1600" dirty="0" smtClean="0"/>
+              <a:rPr lang="en-US" sz="1600" dirty="0"/>
               <a:t>), Luminous sensor (</a:t>
             </a:r>
             <a:r>
-              <a:rPr lang="en-US" sz="1600" dirty="0" err="1" smtClean="0"/>
+              <a:rPr lang="en-US" sz="1600" dirty="0" err="1"/>
               <a:t>Lemonbeat</a:t>
             </a:r>
             <a:r>
-              <a:rPr lang="en-US" sz="1600" dirty="0" smtClean="0"/>
+              <a:rPr lang="en-US" sz="1600" dirty="0"/>
               <a:t>, </a:t>
             </a:r>
             <a:r>
-              <a:rPr lang="en-US" sz="1600" dirty="0" err="1" smtClean="0"/>
+              <a:rPr lang="en-US" sz="1600" dirty="0" err="1"/>
               <a:t>SmartThings</a:t>
             </a:r>
             <a:r>
-              <a:rPr lang="en-US" sz="1600" dirty="0" smtClean="0"/>
+              <a:rPr lang="en-US" sz="1600" dirty="0"/>
               <a:t>)</a:t>
             </a:r>
           </a:p>
@@ -3887,14 +6088,14 @@
             <a:pPr>
               <a:buNone/>
             </a:pPr>
-            <a:endParaRPr lang="en-US" sz="1600" dirty="0" smtClean="0"/>
+            <a:endParaRPr lang="en-US" sz="1600" dirty="0"/>
           </a:p>
           <a:p>
             <a:pPr>
               <a:buNone/>
             </a:pPr>
             <a:r>
-              <a:rPr lang="en-US" sz="1600" dirty="0" smtClean="0"/>
+              <a:rPr lang="en-US" sz="1600" dirty="0"/>
               <a:t>4. An application which controls a lamp in  a room based on the motion detection in the room.</a:t>
             </a:r>
           </a:p>
@@ -3903,23 +6104,23 @@
               <a:buNone/>
             </a:pPr>
             <a:r>
-              <a:rPr lang="en-US" sz="1600" dirty="0" smtClean="0"/>
+              <a:rPr lang="en-US" sz="1600" dirty="0"/>
               <a:t>	Devices: light (Fujitsu, Intel, </a:t>
             </a:r>
             <a:r>
-              <a:rPr lang="en-US" sz="1600" dirty="0" err="1" smtClean="0"/>
+              <a:rPr lang="en-US" sz="1600" dirty="0" err="1"/>
               <a:t>SmartThings</a:t>
             </a:r>
             <a:r>
-              <a:rPr lang="en-US" sz="1600" dirty="0" smtClean="0"/>
+              <a:rPr lang="en-US" sz="1600" dirty="0"/>
               <a:t>), human detection sensor (Panasonic and </a:t>
             </a:r>
             <a:r>
-              <a:rPr lang="en-US" sz="1600" dirty="0" err="1" smtClean="0"/>
+              <a:rPr lang="en-US" sz="1600" dirty="0" err="1"/>
               <a:t>SmartThings</a:t>
             </a:r>
             <a:r>
-              <a:rPr lang="en-US" sz="1600" dirty="0" smtClean="0"/>
+              <a:rPr lang="en-US" sz="1600" dirty="0"/>
               <a:t>)</a:t>
             </a:r>
             <a:endParaRPr lang="de-DE" sz="1600" dirty="0"/>
@@ -3931,13 +6132,6 @@
   <p:clrMapOvr>
     <a:masterClrMapping/>
   </p:clrMapOvr>
-  <p:timing>
-    <p:tnLst>
-      <p:par>
-        <p:cTn id="1" dur="indefinite" restart="never" nodeType="tmRoot"/>
-      </p:par>
-    </p:tnLst>
-  </p:timing>
 </p:sld>
 </file>
 
@@ -3974,10 +6168,9 @@
           <a:lstStyle/>
           <a:p>
             <a:r>
-              <a:rPr lang="en-US" dirty="0" smtClean="0"/>
+              <a:rPr lang="en-US" dirty="0"/>
               <a:t>Semantic challenges</a:t>
             </a:r>
-            <a:endParaRPr lang="en-US" dirty="0"/>
           </a:p>
         </p:txBody>
       </p:sp>
@@ -4002,7 +6195,7 @@
               <a:buNone/>
             </a:pPr>
             <a:r>
-              <a:rPr lang="en-US" dirty="0" smtClean="0"/>
+              <a:rPr lang="en-US" dirty="0"/>
               <a:t>1. Semantic discovery</a:t>
             </a:r>
           </a:p>
@@ -4011,7 +6204,7 @@
               <a:buNone/>
             </a:pPr>
             <a:r>
-              <a:rPr lang="en-US" dirty="0" smtClean="0"/>
+              <a:rPr lang="en-US" dirty="0"/>
               <a:t>   - A client discovers things that implement, e.g. the air conditioner Capability</a:t>
             </a:r>
           </a:p>
@@ -4020,7 +6213,7 @@
               <a:buNone/>
             </a:pPr>
             <a:r>
-              <a:rPr lang="en-US" dirty="0" smtClean="0"/>
+              <a:rPr lang="en-US" dirty="0"/>
               <a:t>2. Dynamic binding to the things</a:t>
             </a:r>
           </a:p>
@@ -4029,7 +6222,7 @@
               <a:buNone/>
             </a:pPr>
             <a:r>
-              <a:rPr lang="en-US" dirty="0" smtClean="0"/>
+              <a:rPr lang="en-US" dirty="0"/>
               <a:t>   - Thing A interacts with thing B (as it supports Capability C). If B does not function, then A dynamically establishes an interaction with another thing, which implements C. </a:t>
             </a:r>
           </a:p>
@@ -4038,7 +6231,7 @@
               <a:buNone/>
             </a:pPr>
             <a:r>
-              <a:rPr lang="en-US" dirty="0" smtClean="0"/>
+              <a:rPr lang="en-US" dirty="0"/>
               <a:t>  -  Interoperability at the interaction level, e.g., a replacement thing with Int. Property</a:t>
             </a:r>
           </a:p>
@@ -4047,7 +6240,7 @@
               <a:buNone/>
             </a:pPr>
             <a:r>
-              <a:rPr lang="en-US" dirty="0" smtClean="0"/>
+              <a:rPr lang="en-US" dirty="0"/>
               <a:t>3. Semantic validation</a:t>
             </a:r>
           </a:p>
@@ -4056,7 +6249,7 @@
               <a:buNone/>
             </a:pPr>
             <a:r>
-              <a:rPr lang="en-US" dirty="0" smtClean="0"/>
+              <a:rPr lang="en-US" dirty="0"/>
               <a:t>   - Check whether a TD implements everything as specified by a Capability it claims to support.</a:t>
             </a:r>
           </a:p>
@@ -4065,21 +6258,16 @@
               <a:buNone/>
             </a:pPr>
             <a:r>
-              <a:rPr lang="en-US" dirty="0" smtClean="0"/>
-              <a:t>   - Check whether an interaction at the data level is possible: Integer, 0 &lt;= value &lt;= </a:t>
-            </a:r>
-            <a:r>
-              <a:rPr lang="en-US" dirty="0" smtClean="0"/>
-              <a:t>255, or check the units</a:t>
-            </a:r>
-            <a:endParaRPr lang="en-US" dirty="0" smtClean="0"/>
+              <a:rPr lang="en-US" dirty="0"/>
+              <a:t>   - Check whether an interaction at the data level is possible: Integer, 0 &lt;= value &lt;= 255, or check the units</a:t>
+            </a:r>
           </a:p>
           <a:p>
             <a:pPr>
               <a:buNone/>
             </a:pPr>
             <a:r>
-              <a:rPr lang="en-US" dirty="0" smtClean="0"/>
+              <a:rPr lang="en-US" dirty="0"/>
               <a:t>   - If writable is true, then the Interaction Property should have input data. </a:t>
             </a:r>
           </a:p>
@@ -4088,7 +6276,7 @@
               <a:buNone/>
             </a:pPr>
             <a:r>
-              <a:rPr lang="en-US" dirty="0" smtClean="0"/>
+              <a:rPr lang="en-US" dirty="0"/>
               <a:t>   - More examples?</a:t>
             </a:r>
           </a:p>
@@ -4097,19 +6285,19 @@
               <a:buNone/>
             </a:pPr>
             <a:r>
-              <a:rPr lang="en-US" smtClean="0"/>
+              <a:rPr lang="en-US"/>
               <a:t> 4. Introduce </a:t>
             </a:r>
             <a:r>
-              <a:rPr lang="en-US" dirty="0" smtClean="0"/>
+              <a:rPr lang="en-US" dirty="0"/>
               <a:t>the Feature of Interest (</a:t>
             </a:r>
             <a:r>
-              <a:rPr lang="en-US" dirty="0" err="1" smtClean="0"/>
+              <a:rPr lang="en-US" dirty="0" err="1"/>
               <a:t>FoI</a:t>
             </a:r>
             <a:r>
-              <a:rPr lang="en-US" dirty="0" smtClean="0"/>
+              <a:rPr lang="en-US" dirty="0"/>
               <a:t>) as a pattern in iot.schema.org</a:t>
             </a:r>
           </a:p>
@@ -4119,11 +6307,11 @@
               <a:buChar char="-"/>
             </a:pPr>
             <a:r>
-              <a:rPr lang="en-US" dirty="0" smtClean="0"/>
+              <a:rPr lang="en-US" dirty="0"/>
               <a:t>Replacement possible only for things with the same </a:t>
             </a:r>
             <a:r>
-              <a:rPr lang="en-US" dirty="0" err="1" smtClean="0"/>
+              <a:rPr lang="en-US" dirty="0" err="1"/>
               <a:t>FoI</a:t>
             </a:r>
             <a:endParaRPr lang="de-DE" dirty="0"/>
@@ -4135,13 +6323,90 @@
   <p:clrMapOvr>
     <a:masterClrMapping/>
   </p:clrMapOvr>
-  <p:timing>
-    <p:tnLst>
-      <p:par>
-        <p:cTn id="1" dur="indefinite" restart="never" nodeType="tmRoot"/>
-      </p:par>
-    </p:tnLst>
-  </p:timing>
+</p:sld>
+</file>
+
+<file path=ppt/slides/slide9.xml><?xml version="1.0" encoding="utf-8"?>
+<p:sld xmlns:a="http://schemas.openxmlformats.org/drawingml/2006/main" xmlns:r="http://schemas.openxmlformats.org/officeDocument/2006/relationships" xmlns:p="http://schemas.openxmlformats.org/presentationml/2006/main">
+  <p:cSld>
+    <p:spTree>
+      <p:nvGrpSpPr>
+        <p:cNvPr id="1" name=""/>
+        <p:cNvGrpSpPr/>
+        <p:nvPr/>
+      </p:nvGrpSpPr>
+      <p:grpSpPr>
+        <a:xfrm>
+          <a:off x="0" y="0"/>
+          <a:ext cx="0" cy="0"/>
+          <a:chOff x="0" y="0"/>
+          <a:chExt cx="0" cy="0"/>
+        </a:xfrm>
+      </p:grpSpPr>
+      <p:sp>
+        <p:nvSpPr>
+          <p:cNvPr id="2" name="Title 1">
+            <a:extLst>
+              <a:ext uri="{FF2B5EF4-FFF2-40B4-BE49-F238E27FC236}">
+                <a16:creationId xmlns:a16="http://schemas.microsoft.com/office/drawing/2014/main" id="{EABE243B-A41E-084A-9AD6-79A32BB335B0}"/>
+              </a:ext>
+            </a:extLst>
+          </p:cNvPr>
+          <p:cNvSpPr>
+            <a:spLocks noGrp="1"/>
+          </p:cNvSpPr>
+          <p:nvPr>
+            <p:ph type="ctrTitle"/>
+          </p:nvPr>
+        </p:nvSpPr>
+        <p:spPr/>
+        <p:txBody>
+          <a:bodyPr/>
+          <a:lstStyle/>
+          <a:p>
+            <a:r>
+              <a:rPr lang="en-US"/>
+              <a:t>Demonstration Realizations</a:t>
+            </a:r>
+            <a:endParaRPr lang="en-US" dirty="0"/>
+          </a:p>
+        </p:txBody>
+      </p:sp>
+      <p:sp>
+        <p:nvSpPr>
+          <p:cNvPr id="3" name="Subtitle 2">
+            <a:extLst>
+              <a:ext uri="{FF2B5EF4-FFF2-40B4-BE49-F238E27FC236}">
+                <a16:creationId xmlns:a16="http://schemas.microsoft.com/office/drawing/2014/main" id="{36921F66-5708-5B49-8D0C-7F60D6BDC137}"/>
+              </a:ext>
+            </a:extLst>
+          </p:cNvPr>
+          <p:cNvSpPr>
+            <a:spLocks noGrp="1"/>
+          </p:cNvSpPr>
+          <p:nvPr>
+            <p:ph type="subTitle" idx="1"/>
+          </p:nvPr>
+        </p:nvSpPr>
+        <p:spPr/>
+        <p:txBody>
+          <a:bodyPr/>
+          <a:lstStyle/>
+          <a:p>
+            <a:endParaRPr lang="en-US" dirty="0"/>
+          </a:p>
+        </p:txBody>
+      </p:sp>
+    </p:spTree>
+    <p:extLst>
+      <p:ext uri="{BB962C8B-B14F-4D97-AF65-F5344CB8AC3E}">
+        <p14:creationId xmlns:p14="http://schemas.microsoft.com/office/powerpoint/2010/main" val="2903822714"/>
+      </p:ext>
+    </p:extLst>
+  </p:cSld>
+  <p:clrMapOvr>
+    <a:masterClrMapping/>
+  </p:clrMapOvr>
 </p:sld>
 </file>
 
@@ -4426,4 +6691,299 @@
   <a:objectDefaults/>
   <a:extraClrSchemeLst/>
 </a:theme>
+</file>
+
+<file path=ppt/theme/theme2.xml><?xml version="1.0" encoding="utf-8"?>
+<a:theme xmlns:a="http://schemas.openxmlformats.org/drawingml/2006/main" name="Office Theme">
+  <a:themeElements>
+    <a:clrScheme name="Office">
+      <a:dk1>
+        <a:sysClr val="windowText" lastClr="000000"/>
+      </a:dk1>
+      <a:lt1>
+        <a:sysClr val="window" lastClr="FFFFFF"/>
+      </a:lt1>
+      <a:dk2>
+        <a:srgbClr val="44546A"/>
+      </a:dk2>
+      <a:lt2>
+        <a:srgbClr val="E7E6E6"/>
+      </a:lt2>
+      <a:accent1>
+        <a:srgbClr val="4472C4"/>
+      </a:accent1>
+      <a:accent2>
+        <a:srgbClr val="ED7D31"/>
+      </a:accent2>
+      <a:accent3>
+        <a:srgbClr val="A5A5A5"/>
+      </a:accent3>
+      <a:accent4>
+        <a:srgbClr val="FFC000"/>
+      </a:accent4>
+      <a:accent5>
+        <a:srgbClr val="5B9BD5"/>
+      </a:accent5>
+      <a:accent6>
+        <a:srgbClr val="70AD47"/>
+      </a:accent6>
+      <a:hlink>
+        <a:srgbClr val="0563C1"/>
+      </a:hlink>
+      <a:folHlink>
+        <a:srgbClr val="954F72"/>
+      </a:folHlink>
+    </a:clrScheme>
+    <a:fontScheme name="Office">
+      <a:majorFont>
+        <a:latin typeface="Calibri Light" panose="020F0302020204030204"/>
+        <a:ea typeface=""/>
+        <a:cs typeface=""/>
+        <a:font script="Jpan" typeface="游ゴシック Light"/>
+        <a:font script="Hang" typeface="맑은 고딕"/>
+        <a:font script="Hans" typeface="等线 Light"/>
+        <a:font script="Hant" typeface="新細明體"/>
+        <a:font script="Arab" typeface="Times New Roman"/>
+        <a:font script="Hebr" typeface="Times New Roman"/>
+        <a:font script="Thai" typeface="Angsana New"/>
+        <a:font script="Ethi" typeface="Nyala"/>
+        <a:font script="Beng" typeface="Vrinda"/>
+        <a:font script="Gujr" typeface="Shruti"/>
+        <a:font script="Khmr" typeface="MoolBoran"/>
+        <a:font script="Knda" typeface="Tunga"/>
+        <a:font script="Guru" typeface="Raavi"/>
+        <a:font script="Cans" typeface="Euphemia"/>
+        <a:font script="Cher" typeface="Plantagenet Cherokee"/>
+        <a:font script="Yiii" typeface="Microsoft Yi Baiti"/>
+        <a:font script="Tibt" typeface="Microsoft Himalaya"/>
+        <a:font script="Thaa" typeface="MV Boli"/>
+        <a:font script="Deva" typeface="Mangal"/>
+        <a:font script="Telu" typeface="Gautami"/>
+        <a:font script="Taml" typeface="Latha"/>
+        <a:font script="Syrc" typeface="Estrangelo Edessa"/>
+        <a:font script="Orya" typeface="Kalinga"/>
+        <a:font script="Mlym" typeface="Kartika"/>
+        <a:font script="Laoo" typeface="DokChampa"/>
+        <a:font script="Sinh" typeface="Iskoola Pota"/>
+        <a:font script="Mong" typeface="Mongolian Baiti"/>
+        <a:font script="Viet" typeface="Times New Roman"/>
+        <a:font script="Uigh" typeface="Microsoft Uighur"/>
+        <a:font script="Geor" typeface="Sylfaen"/>
+        <a:font script="Armn" typeface="Arial"/>
+        <a:font script="Bugi" typeface="Leelawadee UI"/>
+        <a:font script="Bopo" typeface="Microsoft JhengHei"/>
+        <a:font script="Java" typeface="Javanese Text"/>
+        <a:font script="Lisu" typeface="Segoe UI"/>
+        <a:font script="Mymr" typeface="Myanmar Text"/>
+        <a:font script="Nkoo" typeface="Ebrima"/>
+        <a:font script="Olck" typeface="Nirmala UI"/>
+        <a:font script="Osma" typeface="Ebrima"/>
+        <a:font script="Phag" typeface="Phagspa"/>
+        <a:font script="Syrn" typeface="Estrangelo Edessa"/>
+        <a:font script="Syrj" typeface="Estrangelo Edessa"/>
+        <a:font script="Syre" typeface="Estrangelo Edessa"/>
+        <a:font script="Sora" typeface="Nirmala UI"/>
+        <a:font script="Tale" typeface="Microsoft Tai Le"/>
+        <a:font script="Talu" typeface="Microsoft New Tai Lue"/>
+        <a:font script="Tfng" typeface="Ebrima"/>
+      </a:majorFont>
+      <a:minorFont>
+        <a:latin typeface="Calibri" panose="020F0502020204030204"/>
+        <a:ea typeface=""/>
+        <a:cs typeface=""/>
+        <a:font script="Jpan" typeface="游ゴシック"/>
+        <a:font script="Hang" typeface="맑은 고딕"/>
+        <a:font script="Hans" typeface="等线"/>
+        <a:font script="Hant" typeface="新細明體"/>
+        <a:font script="Arab" typeface="Arial"/>
+        <a:font script="Hebr" typeface="Arial"/>
+        <a:font script="Thai" typeface="Cordia New"/>
+        <a:font script="Ethi" typeface="Nyala"/>
+        <a:font script="Beng" typeface="Vrinda"/>
+        <a:font script="Gujr" typeface="Shruti"/>
+        <a:font script="Khmr" typeface="DaunPenh"/>
+        <a:font script="Knda" typeface="Tunga"/>
+        <a:font script="Guru" typeface="Raavi"/>
+        <a:font script="Cans" typeface="Euphemia"/>
+        <a:font script="Cher" typeface="Plantagenet Cherokee"/>
+        <a:font script="Yiii" typeface="Microsoft Yi Baiti"/>
+        <a:font script="Tibt" typeface="Microsoft Himalaya"/>
+        <a:font script="Thaa" typeface="MV Boli"/>
+        <a:font script="Deva" typeface="Mangal"/>
+        <a:font script="Telu" typeface="Gautami"/>
+        <a:font script="Taml" typeface="Latha"/>
+        <a:font script="Syrc" typeface="Estrangelo Edessa"/>
+        <a:font script="Orya" typeface="Kalinga"/>
+        <a:font script="Mlym" typeface="Kartika"/>
+        <a:font script="Laoo" typeface="DokChampa"/>
+        <a:font script="Sinh" typeface="Iskoola Pota"/>
+        <a:font script="Mong" typeface="Mongolian Baiti"/>
+        <a:font script="Viet" typeface="Arial"/>
+        <a:font script="Uigh" typeface="Microsoft Uighur"/>
+        <a:font script="Geor" typeface="Sylfaen"/>
+        <a:font script="Armn" typeface="Arial"/>
+        <a:font script="Bugi" typeface="Leelawadee UI"/>
+        <a:font script="Bopo" typeface="Microsoft JhengHei"/>
+        <a:font script="Java" typeface="Javanese Text"/>
+        <a:font script="Lisu" typeface="Segoe UI"/>
+        <a:font script="Mymr" typeface="Myanmar Text"/>
+        <a:font script="Nkoo" typeface="Ebrima"/>
+        <a:font script="Olck" typeface="Nirmala UI"/>
+        <a:font script="Osma" typeface="Ebrima"/>
+        <a:font script="Phag" typeface="Phagspa"/>
+        <a:font script="Syrn" typeface="Estrangelo Edessa"/>
+        <a:font script="Syrj" typeface="Estrangelo Edessa"/>
+        <a:font script="Syre" typeface="Estrangelo Edessa"/>
+        <a:font script="Sora" typeface="Nirmala UI"/>
+        <a:font script="Tale" typeface="Microsoft Tai Le"/>
+        <a:font script="Talu" typeface="Microsoft New Tai Lue"/>
+        <a:font script="Tfng" typeface="Ebrima"/>
+      </a:minorFont>
+    </a:fontScheme>
+    <a:fmtScheme name="Office">
+      <a:fillStyleLst>
+        <a:solidFill>
+          <a:schemeClr val="phClr"/>
+        </a:solidFill>
+        <a:gradFill rotWithShape="1">
+          <a:gsLst>
+            <a:gs pos="0">
+              <a:schemeClr val="phClr">
+                <a:lumMod val="110000"/>
+                <a:satMod val="105000"/>
+                <a:tint val="67000"/>
+              </a:schemeClr>
+            </a:gs>
+            <a:gs pos="50000">
+              <a:schemeClr val="phClr">
+                <a:lumMod val="105000"/>
+                <a:satMod val="103000"/>
+                <a:tint val="73000"/>
+              </a:schemeClr>
+            </a:gs>
+            <a:gs pos="100000">
+              <a:schemeClr val="phClr">
+                <a:lumMod val="105000"/>
+                <a:satMod val="109000"/>
+                <a:tint val="81000"/>
+              </a:schemeClr>
+            </a:gs>
+          </a:gsLst>
+          <a:lin ang="5400000" scaled="0"/>
+        </a:gradFill>
+        <a:gradFill rotWithShape="1">
+          <a:gsLst>
+            <a:gs pos="0">
+              <a:schemeClr val="phClr">
+                <a:satMod val="103000"/>
+                <a:lumMod val="102000"/>
+                <a:tint val="94000"/>
+              </a:schemeClr>
+            </a:gs>
+            <a:gs pos="50000">
+              <a:schemeClr val="phClr">
+                <a:satMod val="110000"/>
+                <a:lumMod val="100000"/>
+                <a:shade val="100000"/>
+              </a:schemeClr>
+            </a:gs>
+            <a:gs pos="100000">
+              <a:schemeClr val="phClr">
+                <a:lumMod val="99000"/>
+                <a:satMod val="120000"/>
+                <a:shade val="78000"/>
+              </a:schemeClr>
+            </a:gs>
+          </a:gsLst>
+          <a:lin ang="5400000" scaled="0"/>
+        </a:gradFill>
+      </a:fillStyleLst>
+      <a:lnStyleLst>
+        <a:ln w="6350" cap="flat" cmpd="sng" algn="ctr">
+          <a:solidFill>
+            <a:schemeClr val="phClr"/>
+          </a:solidFill>
+          <a:prstDash val="solid"/>
+          <a:miter lim="800000"/>
+        </a:ln>
+        <a:ln w="12700" cap="flat" cmpd="sng" algn="ctr">
+          <a:solidFill>
+            <a:schemeClr val="phClr"/>
+          </a:solidFill>
+          <a:prstDash val="solid"/>
+          <a:miter lim="800000"/>
+        </a:ln>
+        <a:ln w="19050" cap="flat" cmpd="sng" algn="ctr">
+          <a:solidFill>
+            <a:schemeClr val="phClr"/>
+          </a:solidFill>
+          <a:prstDash val="solid"/>
+          <a:miter lim="800000"/>
+        </a:ln>
+      </a:lnStyleLst>
+      <a:effectStyleLst>
+        <a:effectStyle>
+          <a:effectLst/>
+        </a:effectStyle>
+        <a:effectStyle>
+          <a:effectLst/>
+        </a:effectStyle>
+        <a:effectStyle>
+          <a:effectLst>
+            <a:outerShdw blurRad="57150" dist="19050" dir="5400000" algn="ctr" rotWithShape="0">
+              <a:srgbClr val="000000">
+                <a:alpha val="63000"/>
+              </a:srgbClr>
+            </a:outerShdw>
+          </a:effectLst>
+        </a:effectStyle>
+      </a:effectStyleLst>
+      <a:bgFillStyleLst>
+        <a:solidFill>
+          <a:schemeClr val="phClr"/>
+        </a:solidFill>
+        <a:solidFill>
+          <a:schemeClr val="phClr">
+            <a:tint val="95000"/>
+            <a:satMod val="170000"/>
+          </a:schemeClr>
+        </a:solidFill>
+        <a:gradFill rotWithShape="1">
+          <a:gsLst>
+            <a:gs pos="0">
+              <a:schemeClr val="phClr">
+                <a:tint val="93000"/>
+                <a:satMod val="150000"/>
+                <a:shade val="98000"/>
+                <a:lumMod val="102000"/>
+              </a:schemeClr>
+            </a:gs>
+            <a:gs pos="50000">
+              <a:schemeClr val="phClr">
+                <a:tint val="98000"/>
+                <a:satMod val="130000"/>
+                <a:shade val="90000"/>
+                <a:lumMod val="103000"/>
+              </a:schemeClr>
+            </a:gs>
+            <a:gs pos="100000">
+              <a:schemeClr val="phClr">
+                <a:shade val="63000"/>
+                <a:satMod val="120000"/>
+              </a:schemeClr>
+            </a:gs>
+          </a:gsLst>
+          <a:lin ang="5400000" scaled="0"/>
+        </a:gradFill>
+      </a:bgFillStyleLst>
+    </a:fmtScheme>
+  </a:themeElements>
+  <a:objectDefaults/>
+  <a:extraClrSchemeLst/>
+  <a:extLst>
+    <a:ext uri="{05A4C25C-085E-4340-85A3-A5531E510DB2}">
+      <thm15:themeFamily xmlns:thm15="http://schemas.microsoft.com/office/thememl/2012/main" name="Office Theme" id="{62F939B6-93AF-4DB8-9C6B-D6C7DFDC589F}" vid="{4A3C46E8-61CC-4603-A589-7422A47A8E4A}"/>
+    </a:ext>
+  </a:extLst>
+</a:theme>
 </file>
</xml_diff>